<commit_message>
Modify documentations and diagrams for Description object
</commit_message>
<xml_diff>
--- a/docs/diagrams/ModelComponentClassBetterOopDiagram.pptx
+++ b/docs/diagrams/ModelComponentClassBetterOopDiagram.pptx
@@ -208,7 +208,7 @@
           <a:p>
             <a:fld id="{F5CC4B3F-88C1-4FFA-B1B6-F41C21DC6924}" type="datetimeFigureOut">
               <a:rPr lang="en-US" smtClean="0"/>
-              <a:t>12/5/2018</a:t>
+              <a:t>27-Feb-19</a:t>
             </a:fld>
             <a:endParaRPr lang="en-US"/>
           </a:p>
@@ -654,7 +654,7 @@
           <a:p>
             <a:fld id="{78C97017-6FC3-485B-9764-EAC9E56C1D49}" type="datetimeFigureOut">
               <a:rPr lang="en-US" smtClean="0"/>
-              <a:t>12/5/2018</a:t>
+              <a:t>27-Feb-19</a:t>
             </a:fld>
             <a:endParaRPr lang="en-US"/>
           </a:p>
@@ -822,7 +822,7 @@
           <a:p>
             <a:fld id="{78C97017-6FC3-485B-9764-EAC9E56C1D49}" type="datetimeFigureOut">
               <a:rPr lang="en-US" smtClean="0"/>
-              <a:t>12/5/2018</a:t>
+              <a:t>27-Feb-19</a:t>
             </a:fld>
             <a:endParaRPr lang="en-US"/>
           </a:p>
@@ -1000,7 +1000,7 @@
           <a:p>
             <a:fld id="{78C97017-6FC3-485B-9764-EAC9E56C1D49}" type="datetimeFigureOut">
               <a:rPr lang="en-US" smtClean="0"/>
-              <a:t>12/5/2018</a:t>
+              <a:t>27-Feb-19</a:t>
             </a:fld>
             <a:endParaRPr lang="en-US"/>
           </a:p>
@@ -1168,7 +1168,7 @@
           <a:p>
             <a:fld id="{78C97017-6FC3-485B-9764-EAC9E56C1D49}" type="datetimeFigureOut">
               <a:rPr lang="en-US" smtClean="0"/>
-              <a:t>12/5/2018</a:t>
+              <a:t>27-Feb-19</a:t>
             </a:fld>
             <a:endParaRPr lang="en-US"/>
           </a:p>
@@ -1413,7 +1413,7 @@
           <a:p>
             <a:fld id="{78C97017-6FC3-485B-9764-EAC9E56C1D49}" type="datetimeFigureOut">
               <a:rPr lang="en-US" smtClean="0"/>
-              <a:t>12/5/2018</a:t>
+              <a:t>27-Feb-19</a:t>
             </a:fld>
             <a:endParaRPr lang="en-US"/>
           </a:p>
@@ -1698,7 +1698,7 @@
           <a:p>
             <a:fld id="{78C97017-6FC3-485B-9764-EAC9E56C1D49}" type="datetimeFigureOut">
               <a:rPr lang="en-US" smtClean="0"/>
-              <a:t>12/5/2018</a:t>
+              <a:t>27-Feb-19</a:t>
             </a:fld>
             <a:endParaRPr lang="en-US"/>
           </a:p>
@@ -2117,7 +2117,7 @@
           <a:p>
             <a:fld id="{78C97017-6FC3-485B-9764-EAC9E56C1D49}" type="datetimeFigureOut">
               <a:rPr lang="en-US" smtClean="0"/>
-              <a:t>12/5/2018</a:t>
+              <a:t>27-Feb-19</a:t>
             </a:fld>
             <a:endParaRPr lang="en-US"/>
           </a:p>
@@ -2234,7 +2234,7 @@
           <a:p>
             <a:fld id="{78C97017-6FC3-485B-9764-EAC9E56C1D49}" type="datetimeFigureOut">
               <a:rPr lang="en-US" smtClean="0"/>
-              <a:t>12/5/2018</a:t>
+              <a:t>27-Feb-19</a:t>
             </a:fld>
             <a:endParaRPr lang="en-US"/>
           </a:p>
@@ -2329,7 +2329,7 @@
           <a:p>
             <a:fld id="{78C97017-6FC3-485B-9764-EAC9E56C1D49}" type="datetimeFigureOut">
               <a:rPr lang="en-US" smtClean="0"/>
-              <a:t>12/5/2018</a:t>
+              <a:t>27-Feb-19</a:t>
             </a:fld>
             <a:endParaRPr lang="en-US"/>
           </a:p>
@@ -2604,7 +2604,7 @@
           <a:p>
             <a:fld id="{78C97017-6FC3-485B-9764-EAC9E56C1D49}" type="datetimeFigureOut">
               <a:rPr lang="en-US" smtClean="0"/>
-              <a:t>12/5/2018</a:t>
+              <a:t>27-Feb-19</a:t>
             </a:fld>
             <a:endParaRPr lang="en-US"/>
           </a:p>
@@ -2856,7 +2856,7 @@
           <a:p>
             <a:fld id="{78C97017-6FC3-485B-9764-EAC9E56C1D49}" type="datetimeFigureOut">
               <a:rPr lang="en-US" smtClean="0"/>
-              <a:t>12/5/2018</a:t>
+              <a:t>27-Feb-19</a:t>
             </a:fld>
             <a:endParaRPr lang="en-US"/>
           </a:p>
@@ -3067,7 +3067,7 @@
           <a:p>
             <a:fld id="{78C97017-6FC3-485B-9764-EAC9E56C1D49}" type="datetimeFigureOut">
               <a:rPr lang="en-US" smtClean="0"/>
-              <a:t>12/5/2018</a:t>
+              <a:t>27-Feb-19</a:t>
             </a:fld>
             <a:endParaRPr lang="en-US"/>
           </a:p>
@@ -3793,8 +3793,8 @@
         </p:nvSpPr>
         <p:spPr>
           <a:xfrm>
-            <a:off x="6680903" y="3053948"/>
-            <a:ext cx="708186" cy="285783"/>
+            <a:off x="6680902" y="3053948"/>
+            <a:ext cx="862461" cy="285783"/>
           </a:xfrm>
           <a:prstGeom prst="rect">
             <a:avLst/>
@@ -3936,8 +3936,8 @@
         </p:nvSpPr>
         <p:spPr>
           <a:xfrm>
-            <a:off x="6680903" y="3376926"/>
-            <a:ext cx="708186" cy="285783"/>
+            <a:off x="6680902" y="3376926"/>
+            <a:ext cx="862461" cy="285783"/>
           </a:xfrm>
           <a:prstGeom prst="rect">
             <a:avLst/>
@@ -3988,6 +3988,7 @@
         <p:nvCxnSpPr>
           <p:cNvPr id="81" name="Elbow Connector 80"/>
           <p:cNvCxnSpPr>
+            <a:cxnSpLocks/>
             <a:stCxn id="78" idx="3"/>
             <a:endCxn id="80" idx="1"/>
           </p:cNvCxnSpPr>
@@ -3996,7 +3997,7 @@
         <p:spPr>
           <a:xfrm flipV="1">
             <a:off x="6246501" y="3519818"/>
-            <a:ext cx="434402" cy="4783"/>
+            <a:ext cx="434401" cy="4783"/>
           </a:xfrm>
           <a:prstGeom prst="bentConnector3">
             <a:avLst/>
@@ -4033,8 +4034,8 @@
         </p:nvSpPr>
         <p:spPr>
           <a:xfrm>
-            <a:off x="6680903" y="3699904"/>
-            <a:ext cx="708186" cy="285783"/>
+            <a:off x="6680902" y="3699904"/>
+            <a:ext cx="862461" cy="285783"/>
           </a:xfrm>
           <a:prstGeom prst="rect">
             <a:avLst/>
@@ -4071,7 +4072,7 @@
                   <a:srgbClr val="7030A0"/>
                 </a:solidFill>
               </a:rPr>
-              <a:t>Email</a:t>
+              <a:t>Description</a:t>
             </a:r>
             <a:endParaRPr lang="en-SG" sz="1050" dirty="0">
               <a:solidFill>
@@ -4085,6 +4086,7 @@
         <p:nvCxnSpPr>
           <p:cNvPr id="84" name="Elbow Connector 83"/>
           <p:cNvCxnSpPr>
+            <a:cxnSpLocks/>
             <a:stCxn id="78" idx="3"/>
             <a:endCxn id="83" idx="1"/>
           </p:cNvCxnSpPr>
@@ -4093,7 +4095,7 @@
         <p:spPr>
           <a:xfrm>
             <a:off x="6246501" y="3524601"/>
-            <a:ext cx="434402" cy="318195"/>
+            <a:ext cx="434401" cy="318195"/>
           </a:xfrm>
           <a:prstGeom prst="bentConnector3">
             <a:avLst/>
@@ -4130,8 +4132,8 @@
         </p:nvSpPr>
         <p:spPr>
           <a:xfrm>
-            <a:off x="6680903" y="4022881"/>
-            <a:ext cx="708186" cy="285783"/>
+            <a:off x="6680902" y="4022881"/>
+            <a:ext cx="862461" cy="285783"/>
           </a:xfrm>
           <a:prstGeom prst="rect">
             <a:avLst/>
@@ -4191,7 +4193,7 @@
         <p:spPr>
           <a:xfrm>
             <a:off x="6246501" y="3524601"/>
-            <a:ext cx="434402" cy="641172"/>
+            <a:ext cx="434401" cy="641172"/>
           </a:xfrm>
           <a:prstGeom prst="bentConnector3">
             <a:avLst/>

</xml_diff>

<commit_message>
(V1.2) Edit Pdf Model Diagram.
With the new Model Diagram, developers will be able to get a clearer
picture on how to proceed to make further morphs to the project.

Redolves: #83
</commit_message>
<xml_diff>
--- a/docs/diagrams/ModelComponentClassBetterOopDiagram.pptx
+++ b/docs/diagrams/ModelComponentClassBetterOopDiagram.pptx
@@ -208,7 +208,7 @@
           <a:p>
             <a:fld id="{F5CC4B3F-88C1-4FFA-B1B6-F41C21DC6924}" type="datetimeFigureOut">
               <a:rPr lang="en-US" smtClean="0"/>
-              <a:t>12/5/2018</a:t>
+              <a:t>3/9/19</a:t>
             </a:fld>
             <a:endParaRPr lang="en-US"/>
           </a:p>
@@ -654,7 +654,7 @@
           <a:p>
             <a:fld id="{78C97017-6FC3-485B-9764-EAC9E56C1D49}" type="datetimeFigureOut">
               <a:rPr lang="en-US" smtClean="0"/>
-              <a:t>12/5/2018</a:t>
+              <a:t>3/9/19</a:t>
             </a:fld>
             <a:endParaRPr lang="en-US"/>
           </a:p>
@@ -822,7 +822,7 @@
           <a:p>
             <a:fld id="{78C97017-6FC3-485B-9764-EAC9E56C1D49}" type="datetimeFigureOut">
               <a:rPr lang="en-US" smtClean="0"/>
-              <a:t>12/5/2018</a:t>
+              <a:t>3/9/19</a:t>
             </a:fld>
             <a:endParaRPr lang="en-US"/>
           </a:p>
@@ -1000,7 +1000,7 @@
           <a:p>
             <a:fld id="{78C97017-6FC3-485B-9764-EAC9E56C1D49}" type="datetimeFigureOut">
               <a:rPr lang="en-US" smtClean="0"/>
-              <a:t>12/5/2018</a:t>
+              <a:t>3/9/19</a:t>
             </a:fld>
             <a:endParaRPr lang="en-US"/>
           </a:p>
@@ -1168,7 +1168,7 @@
           <a:p>
             <a:fld id="{78C97017-6FC3-485B-9764-EAC9E56C1D49}" type="datetimeFigureOut">
               <a:rPr lang="en-US" smtClean="0"/>
-              <a:t>12/5/2018</a:t>
+              <a:t>3/9/19</a:t>
             </a:fld>
             <a:endParaRPr lang="en-US"/>
           </a:p>
@@ -1413,7 +1413,7 @@
           <a:p>
             <a:fld id="{78C97017-6FC3-485B-9764-EAC9E56C1D49}" type="datetimeFigureOut">
               <a:rPr lang="en-US" smtClean="0"/>
-              <a:t>12/5/2018</a:t>
+              <a:t>3/9/19</a:t>
             </a:fld>
             <a:endParaRPr lang="en-US"/>
           </a:p>
@@ -1698,7 +1698,7 @@
           <a:p>
             <a:fld id="{78C97017-6FC3-485B-9764-EAC9E56C1D49}" type="datetimeFigureOut">
               <a:rPr lang="en-US" smtClean="0"/>
-              <a:t>12/5/2018</a:t>
+              <a:t>3/9/19</a:t>
             </a:fld>
             <a:endParaRPr lang="en-US"/>
           </a:p>
@@ -2117,7 +2117,7 @@
           <a:p>
             <a:fld id="{78C97017-6FC3-485B-9764-EAC9E56C1D49}" type="datetimeFigureOut">
               <a:rPr lang="en-US" smtClean="0"/>
-              <a:t>12/5/2018</a:t>
+              <a:t>3/9/19</a:t>
             </a:fld>
             <a:endParaRPr lang="en-US"/>
           </a:p>
@@ -2234,7 +2234,7 @@
           <a:p>
             <a:fld id="{78C97017-6FC3-485B-9764-EAC9E56C1D49}" type="datetimeFigureOut">
               <a:rPr lang="en-US" smtClean="0"/>
-              <a:t>12/5/2018</a:t>
+              <a:t>3/9/19</a:t>
             </a:fld>
             <a:endParaRPr lang="en-US"/>
           </a:p>
@@ -2329,7 +2329,7 @@
           <a:p>
             <a:fld id="{78C97017-6FC3-485B-9764-EAC9E56C1D49}" type="datetimeFigureOut">
               <a:rPr lang="en-US" smtClean="0"/>
-              <a:t>12/5/2018</a:t>
+              <a:t>3/9/19</a:t>
             </a:fld>
             <a:endParaRPr lang="en-US"/>
           </a:p>
@@ -2604,7 +2604,7 @@
           <a:p>
             <a:fld id="{78C97017-6FC3-485B-9764-EAC9E56C1D49}" type="datetimeFigureOut">
               <a:rPr lang="en-US" smtClean="0"/>
-              <a:t>12/5/2018</a:t>
+              <a:t>3/9/19</a:t>
             </a:fld>
             <a:endParaRPr lang="en-US"/>
           </a:p>
@@ -2856,7 +2856,7 @@
           <a:p>
             <a:fld id="{78C97017-6FC3-485B-9764-EAC9E56C1D49}" type="datetimeFigureOut">
               <a:rPr lang="en-US" smtClean="0"/>
-              <a:t>12/5/2018</a:t>
+              <a:t>3/9/19</a:t>
             </a:fld>
             <a:endParaRPr lang="en-US"/>
           </a:p>
@@ -3067,7 +3067,7 @@
           <a:p>
             <a:fld id="{78C97017-6FC3-485B-9764-EAC9E56C1D49}" type="datetimeFigureOut">
               <a:rPr lang="en-US" smtClean="0"/>
-              <a:t>12/5/2018</a:t>
+              <a:t>3/9/19</a:t>
             </a:fld>
             <a:endParaRPr lang="en-US"/>
           </a:p>
@@ -3488,7 +3488,7 @@
                   <a:srgbClr val="7030A0"/>
                 </a:solidFill>
               </a:rPr>
-              <a:t>VersionedAddressBook</a:t>
+              <a:t>VersionedPdfBook</a:t>
             </a:r>
             <a:endParaRPr lang="en-SG" sz="1050" dirty="0">
               <a:solidFill>
@@ -3544,7 +3544,7 @@
                   <a:srgbClr val="7030A0"/>
                 </a:solidFill>
               </a:rPr>
-              <a:t>UniquePersonList</a:t>
+              <a:t>UniquePdfList</a:t>
             </a:r>
             <a:endParaRPr lang="en-SG" sz="1050" dirty="0">
               <a:solidFill>
@@ -3688,7 +3688,7 @@
                   <a:srgbClr val="7030A0"/>
                 </a:solidFill>
               </a:rPr>
-              <a:t>Person</a:t>
+              <a:t>Pdf</a:t>
             </a:r>
             <a:endParaRPr lang="en-SG" sz="1050" dirty="0">
               <a:solidFill>
@@ -3974,7 +3974,7 @@
                   <a:srgbClr val="7030A0"/>
                 </a:solidFill>
               </a:rPr>
-              <a:t>Phone</a:t>
+              <a:t>Size</a:t>
             </a:r>
             <a:endParaRPr lang="en-SG" sz="1050" dirty="0">
               <a:solidFill>
@@ -4071,7 +4071,7 @@
                   <a:srgbClr val="7030A0"/>
                 </a:solidFill>
               </a:rPr>
-              <a:t>Email</a:t>
+              <a:t>Location</a:t>
             </a:r>
             <a:endParaRPr lang="en-SG" sz="1050" dirty="0">
               <a:solidFill>
@@ -4124,14 +4124,98 @@
       </p:cxnSp>
       <p:sp>
         <p:nvSpPr>
-          <p:cNvPr id="85" name="Rectangle 8"/>
+          <p:cNvPr id="54" name="TextBox 53"/>
+          <p:cNvSpPr txBox="1"/>
+          <p:nvPr/>
+        </p:nvSpPr>
+        <p:spPr>
+          <a:xfrm>
+            <a:off x="3293478" y="3548574"/>
+            <a:ext cx="189257" cy="178683"/>
+          </a:xfrm>
+          <a:prstGeom prst="rect">
+            <a:avLst/>
+          </a:prstGeom>
+          <a:noFill/>
+        </p:spPr>
+        <p:txBody>
+          <a:bodyPr wrap="square" lIns="0" tIns="0" rIns="0" bIns="0" rtlCol="0">
+            <a:noAutofit/>
+          </a:bodyPr>
+          <a:lstStyle/>
+          <a:p>
+            <a:pPr algn="ctr"/>
+            <a:r>
+              <a:rPr lang="en-US" sz="1100" dirty="0">
+                <a:solidFill>
+                  <a:srgbClr val="7030A0"/>
+                </a:solidFill>
+              </a:rPr>
+              <a:t>1</a:t>
+            </a:r>
+            <a:endParaRPr lang="en-SG" sz="1100" dirty="0">
+              <a:solidFill>
+                <a:srgbClr val="7030A0"/>
+              </a:solidFill>
+            </a:endParaRPr>
+          </a:p>
+        </p:txBody>
+      </p:sp>
+      <p:sp>
+        <p:nvSpPr>
+          <p:cNvPr id="61" name="TextBox 60"/>
+          <p:cNvSpPr txBox="1"/>
+          <p:nvPr/>
+        </p:nvSpPr>
+        <p:spPr>
+          <a:xfrm>
+            <a:off x="5103762" y="3587627"/>
+            <a:ext cx="189257" cy="178683"/>
+          </a:xfrm>
+          <a:prstGeom prst="rect">
+            <a:avLst/>
+          </a:prstGeom>
+          <a:noFill/>
+        </p:spPr>
+        <p:txBody>
+          <a:bodyPr wrap="square" lIns="0" tIns="0" rIns="0" bIns="0" rtlCol="0">
+            <a:noAutofit/>
+          </a:bodyPr>
+          <a:lstStyle/>
+          <a:p>
+            <a:pPr algn="ctr"/>
+            <a:r>
+              <a:rPr lang="en-US" sz="1100" dirty="0">
+                <a:solidFill>
+                  <a:srgbClr val="7030A0"/>
+                </a:solidFill>
+              </a:rPr>
+              <a:t>*</a:t>
+            </a:r>
+            <a:endParaRPr lang="en-SG" sz="1100" dirty="0">
+              <a:solidFill>
+                <a:srgbClr val="7030A0"/>
+              </a:solidFill>
+            </a:endParaRPr>
+          </a:p>
+        </p:txBody>
+      </p:sp>
+      <p:sp>
+        <p:nvSpPr>
+          <p:cNvPr id="52" name="Rectangle 8">
+            <a:extLst>
+              <a:ext uri="{FF2B5EF4-FFF2-40B4-BE49-F238E27FC236}">
+                <a16:creationId xmlns:a16="http://schemas.microsoft.com/office/drawing/2014/main" id="{ABDCDBD2-131A-4B66-A2F2-43BBEE82C773}"/>
+              </a:ext>
+            </a:extLst>
+          </p:cNvPr>
           <p:cNvSpPr/>
           <p:nvPr/>
         </p:nvSpPr>
         <p:spPr>
           <a:xfrm>
-            <a:off x="6680903" y="4022881"/>
-            <a:ext cx="708186" cy="285783"/>
+            <a:off x="3724378" y="2696571"/>
+            <a:ext cx="1156969" cy="285783"/>
           </a:xfrm>
           <a:prstGeom prst="rect">
             <a:avLst/>
@@ -4163,194 +4247,12 @@
           <a:p>
             <a:pPr algn="ctr"/>
             <a:r>
-              <a:rPr lang="en-US" sz="1050" dirty="0">
-                <a:solidFill>
-                  <a:srgbClr val="7030A0"/>
-                </a:solidFill>
-              </a:rPr>
-              <a:t>Address</a:t>
-            </a:r>
-            <a:endParaRPr lang="en-SG" sz="1050" dirty="0">
-              <a:solidFill>
-                <a:srgbClr val="7030A0"/>
-              </a:solidFill>
-            </a:endParaRPr>
-          </a:p>
-        </p:txBody>
-      </p:sp>
-      <p:cxnSp>
-        <p:nvCxnSpPr>
-          <p:cNvPr id="86" name="Elbow Connector 85"/>
-          <p:cNvCxnSpPr>
-            <a:cxnSpLocks/>
-            <a:stCxn id="78" idx="3"/>
-            <a:endCxn id="85" idx="1"/>
-          </p:cNvCxnSpPr>
-          <p:nvPr/>
-        </p:nvCxnSpPr>
-        <p:spPr>
-          <a:xfrm>
-            <a:off x="6246501" y="3524601"/>
-            <a:ext cx="434402" cy="641172"/>
-          </a:xfrm>
-          <a:prstGeom prst="bentConnector3">
-            <a:avLst/>
-          </a:prstGeom>
-          <a:ln w="19050">
-            <a:solidFill>
-              <a:srgbClr val="7030A0"/>
-            </a:solidFill>
-            <a:headEnd type="none" w="med" len="med"/>
-            <a:tailEnd type="arrow" w="med" len="med"/>
-          </a:ln>
-          <a:effectLst/>
-        </p:spPr>
-        <p:style>
-          <a:lnRef idx="1">
-            <a:schemeClr val="accent2"/>
-          </a:lnRef>
-          <a:fillRef idx="2">
-            <a:schemeClr val="accent2"/>
-          </a:fillRef>
-          <a:effectRef idx="1">
-            <a:schemeClr val="accent2"/>
-          </a:effectRef>
-          <a:fontRef idx="minor">
-            <a:schemeClr val="dk1"/>
-          </a:fontRef>
-        </p:style>
-      </p:cxnSp>
-      <p:sp>
-        <p:nvSpPr>
-          <p:cNvPr id="54" name="TextBox 53"/>
-          <p:cNvSpPr txBox="1"/>
-          <p:nvPr/>
-        </p:nvSpPr>
-        <p:spPr>
-          <a:xfrm>
-            <a:off x="3293478" y="3548574"/>
-            <a:ext cx="189257" cy="178683"/>
-          </a:xfrm>
-          <a:prstGeom prst="rect">
-            <a:avLst/>
-          </a:prstGeom>
-          <a:noFill/>
-        </p:spPr>
-        <p:txBody>
-          <a:bodyPr wrap="square" lIns="0" tIns="0" rIns="0" bIns="0" rtlCol="0">
-            <a:noAutofit/>
-          </a:bodyPr>
-          <a:lstStyle/>
-          <a:p>
-            <a:pPr algn="ctr"/>
-            <a:r>
-              <a:rPr lang="en-US" sz="1100" dirty="0">
-                <a:solidFill>
-                  <a:srgbClr val="7030A0"/>
-                </a:solidFill>
-              </a:rPr>
-              <a:t>1</a:t>
-            </a:r>
-            <a:endParaRPr lang="en-SG" sz="1100" dirty="0">
-              <a:solidFill>
-                <a:srgbClr val="7030A0"/>
-              </a:solidFill>
-            </a:endParaRPr>
-          </a:p>
-        </p:txBody>
-      </p:sp>
-      <p:sp>
-        <p:nvSpPr>
-          <p:cNvPr id="61" name="TextBox 60"/>
-          <p:cNvSpPr txBox="1"/>
-          <p:nvPr/>
-        </p:nvSpPr>
-        <p:spPr>
-          <a:xfrm>
-            <a:off x="5103762" y="3587627"/>
-            <a:ext cx="189257" cy="178683"/>
-          </a:xfrm>
-          <a:prstGeom prst="rect">
-            <a:avLst/>
-          </a:prstGeom>
-          <a:noFill/>
-        </p:spPr>
-        <p:txBody>
-          <a:bodyPr wrap="square" lIns="0" tIns="0" rIns="0" bIns="0" rtlCol="0">
-            <a:noAutofit/>
-          </a:bodyPr>
-          <a:lstStyle/>
-          <a:p>
-            <a:pPr algn="ctr"/>
-            <a:r>
-              <a:rPr lang="en-US" sz="1100" dirty="0">
-                <a:solidFill>
-                  <a:srgbClr val="7030A0"/>
-                </a:solidFill>
-              </a:rPr>
-              <a:t>*</a:t>
-            </a:r>
-            <a:endParaRPr lang="en-SG" sz="1100" dirty="0">
-              <a:solidFill>
-                <a:srgbClr val="7030A0"/>
-              </a:solidFill>
-            </a:endParaRPr>
-          </a:p>
-        </p:txBody>
-      </p:sp>
-      <p:sp>
-        <p:nvSpPr>
-          <p:cNvPr id="52" name="Rectangle 8">
-            <a:extLst>
-              <a:ext uri="{FF2B5EF4-FFF2-40B4-BE49-F238E27FC236}">
-                <a16:creationId xmlns:a16="http://schemas.microsoft.com/office/drawing/2014/main" id="{ABDCDBD2-131A-4B66-A2F2-43BBEE82C773}"/>
-              </a:ext>
-            </a:extLst>
-          </p:cNvPr>
-          <p:cNvSpPr/>
-          <p:nvPr/>
-        </p:nvSpPr>
-        <p:spPr>
-          <a:xfrm>
-            <a:off x="3724378" y="2696571"/>
-            <a:ext cx="1156969" cy="285783"/>
-          </a:xfrm>
-          <a:prstGeom prst="rect">
-            <a:avLst/>
-          </a:prstGeom>
-          <a:ln w="19050">
-            <a:solidFill>
-              <a:srgbClr val="7030A0"/>
-            </a:solidFill>
-          </a:ln>
-          <a:effectLst/>
-        </p:spPr>
-        <p:style>
-          <a:lnRef idx="1">
-            <a:schemeClr val="accent4"/>
-          </a:lnRef>
-          <a:fillRef idx="2">
-            <a:schemeClr val="accent4"/>
-          </a:fillRef>
-          <a:effectRef idx="1">
-            <a:schemeClr val="accent4"/>
-          </a:effectRef>
-          <a:fontRef idx="minor">
-            <a:schemeClr val="dk1"/>
-          </a:fontRef>
-        </p:style>
-        <p:txBody>
-          <a:bodyPr rtlCol="0" anchor="ctr"/>
-          <a:lstStyle/>
-          <a:p>
-            <a:pPr algn="ctr"/>
-            <a:r>
               <a:rPr lang="en-US" sz="1050" dirty="0" err="1">
                 <a:solidFill>
                   <a:srgbClr val="7030A0"/>
                 </a:solidFill>
               </a:rPr>
-              <a:t>UniqueTagList</a:t>
+              <a:t>UniqueLabelList</a:t>
             </a:r>
             <a:endParaRPr lang="en-SG" sz="1050" dirty="0">
               <a:solidFill>
@@ -4603,7 +4505,7 @@
                   <a:srgbClr val="7030A0"/>
                 </a:solidFill>
               </a:rPr>
-              <a:t>Tag</a:t>
+              <a:t>Label</a:t>
             </a:r>
             <a:endParaRPr lang="en-SG" sz="1050" dirty="0">
               <a:solidFill>

</xml_diff>

<commit_message>
Update Model component diagrams
</commit_message>
<xml_diff>
--- a/docs/diagrams/ModelComponentClassBetterOopDiagram.pptx
+++ b/docs/diagrams/ModelComponentClassBetterOopDiagram.pptx
@@ -208,7 +208,7 @@
           <a:p>
             <a:fld id="{F5CC4B3F-88C1-4FFA-B1B6-F41C21DC6924}" type="datetimeFigureOut">
               <a:rPr lang="en-US" smtClean="0"/>
-              <a:t>12/5/2018</a:t>
+              <a:t>3/17/2019</a:t>
             </a:fld>
             <a:endParaRPr lang="en-US"/>
           </a:p>
@@ -654,7 +654,7 @@
           <a:p>
             <a:fld id="{78C97017-6FC3-485B-9764-EAC9E56C1D49}" type="datetimeFigureOut">
               <a:rPr lang="en-US" smtClean="0"/>
-              <a:t>12/5/2018</a:t>
+              <a:t>3/17/2019</a:t>
             </a:fld>
             <a:endParaRPr lang="en-US"/>
           </a:p>
@@ -822,7 +822,7 @@
           <a:p>
             <a:fld id="{78C97017-6FC3-485B-9764-EAC9E56C1D49}" type="datetimeFigureOut">
               <a:rPr lang="en-US" smtClean="0"/>
-              <a:t>12/5/2018</a:t>
+              <a:t>3/17/2019</a:t>
             </a:fld>
             <a:endParaRPr lang="en-US"/>
           </a:p>
@@ -1000,7 +1000,7 @@
           <a:p>
             <a:fld id="{78C97017-6FC3-485B-9764-EAC9E56C1D49}" type="datetimeFigureOut">
               <a:rPr lang="en-US" smtClean="0"/>
-              <a:t>12/5/2018</a:t>
+              <a:t>3/17/2019</a:t>
             </a:fld>
             <a:endParaRPr lang="en-US"/>
           </a:p>
@@ -1168,7 +1168,7 @@
           <a:p>
             <a:fld id="{78C97017-6FC3-485B-9764-EAC9E56C1D49}" type="datetimeFigureOut">
               <a:rPr lang="en-US" smtClean="0"/>
-              <a:t>12/5/2018</a:t>
+              <a:t>3/17/2019</a:t>
             </a:fld>
             <a:endParaRPr lang="en-US"/>
           </a:p>
@@ -1413,7 +1413,7 @@
           <a:p>
             <a:fld id="{78C97017-6FC3-485B-9764-EAC9E56C1D49}" type="datetimeFigureOut">
               <a:rPr lang="en-US" smtClean="0"/>
-              <a:t>12/5/2018</a:t>
+              <a:t>3/17/2019</a:t>
             </a:fld>
             <a:endParaRPr lang="en-US"/>
           </a:p>
@@ -1698,7 +1698,7 @@
           <a:p>
             <a:fld id="{78C97017-6FC3-485B-9764-EAC9E56C1D49}" type="datetimeFigureOut">
               <a:rPr lang="en-US" smtClean="0"/>
-              <a:t>12/5/2018</a:t>
+              <a:t>3/17/2019</a:t>
             </a:fld>
             <a:endParaRPr lang="en-US"/>
           </a:p>
@@ -2117,7 +2117,7 @@
           <a:p>
             <a:fld id="{78C97017-6FC3-485B-9764-EAC9E56C1D49}" type="datetimeFigureOut">
               <a:rPr lang="en-US" smtClean="0"/>
-              <a:t>12/5/2018</a:t>
+              <a:t>3/17/2019</a:t>
             </a:fld>
             <a:endParaRPr lang="en-US"/>
           </a:p>
@@ -2234,7 +2234,7 @@
           <a:p>
             <a:fld id="{78C97017-6FC3-485B-9764-EAC9E56C1D49}" type="datetimeFigureOut">
               <a:rPr lang="en-US" smtClean="0"/>
-              <a:t>12/5/2018</a:t>
+              <a:t>3/17/2019</a:t>
             </a:fld>
             <a:endParaRPr lang="en-US"/>
           </a:p>
@@ -2329,7 +2329,7 @@
           <a:p>
             <a:fld id="{78C97017-6FC3-485B-9764-EAC9E56C1D49}" type="datetimeFigureOut">
               <a:rPr lang="en-US" smtClean="0"/>
-              <a:t>12/5/2018</a:t>
+              <a:t>3/17/2019</a:t>
             </a:fld>
             <a:endParaRPr lang="en-US"/>
           </a:p>
@@ -2604,7 +2604,7 @@
           <a:p>
             <a:fld id="{78C97017-6FC3-485B-9764-EAC9E56C1D49}" type="datetimeFigureOut">
               <a:rPr lang="en-US" smtClean="0"/>
-              <a:t>12/5/2018</a:t>
+              <a:t>3/17/2019</a:t>
             </a:fld>
             <a:endParaRPr lang="en-US"/>
           </a:p>
@@ -2856,7 +2856,7 @@
           <a:p>
             <a:fld id="{78C97017-6FC3-485B-9764-EAC9E56C1D49}" type="datetimeFigureOut">
               <a:rPr lang="en-US" smtClean="0"/>
-              <a:t>12/5/2018</a:t>
+              <a:t>3/17/2019</a:t>
             </a:fld>
             <a:endParaRPr lang="en-US"/>
           </a:p>
@@ -3067,7 +3067,7 @@
           <a:p>
             <a:fld id="{78C97017-6FC3-485B-9764-EAC9E56C1D49}" type="datetimeFigureOut">
               <a:rPr lang="en-US" smtClean="0"/>
-              <a:t>12/5/2018</a:t>
+              <a:t>3/17/2019</a:t>
             </a:fld>
             <a:endParaRPr lang="en-US"/>
           </a:p>
@@ -3488,7 +3488,7 @@
                   <a:srgbClr val="7030A0"/>
                 </a:solidFill>
               </a:rPr>
-              <a:t>VersionedAddressBook</a:t>
+              <a:t>VersionedInventory</a:t>
             </a:r>
             <a:endParaRPr lang="en-SG" sz="1050" dirty="0">
               <a:solidFill>
@@ -3506,8 +3506,8 @@
         </p:nvSpPr>
         <p:spPr>
           <a:xfrm>
-            <a:off x="3730715" y="3353144"/>
-            <a:ext cx="1156969" cy="346760"/>
+            <a:off x="3596969" y="3353144"/>
+            <a:ext cx="1290715" cy="346760"/>
           </a:xfrm>
           <a:prstGeom prst="rect">
             <a:avLst/>
@@ -3544,7 +3544,7 @@
                   <a:srgbClr val="7030A0"/>
                 </a:solidFill>
               </a:rPr>
-              <a:t>UniquePersonList</a:t>
+              <a:t>UniqueMedicineList</a:t>
             </a:r>
             <a:endParaRPr lang="en-SG" sz="1050" dirty="0">
               <a:solidFill>
@@ -3605,6 +3605,7 @@
         <p:nvCxnSpPr>
           <p:cNvPr id="30" name="Elbow Connector 29"/>
           <p:cNvCxnSpPr>
+            <a:cxnSpLocks/>
             <a:stCxn id="51" idx="3"/>
             <a:endCxn id="49" idx="1"/>
           </p:cNvCxnSpPr>
@@ -3613,7 +3614,7 @@
         <p:spPr>
           <a:xfrm>
             <a:off x="3437800" y="3524601"/>
-            <a:ext cx="292915" cy="1923"/>
+            <a:ext cx="159169" cy="1923"/>
           </a:xfrm>
           <a:prstGeom prst="bentConnector3">
             <a:avLst/>
@@ -3688,7 +3689,7 @@
                   <a:srgbClr val="7030A0"/>
                 </a:solidFill>
               </a:rPr>
-              <a:t>Person</a:t>
+              <a:t>Medicine</a:t>
             </a:r>
             <a:endParaRPr lang="en-SG" sz="1050" dirty="0">
               <a:solidFill>
@@ -3974,7 +3975,7 @@
                   <a:srgbClr val="7030A0"/>
                 </a:solidFill>
               </a:rPr>
-              <a:t>Phone</a:t>
+              <a:t>Company</a:t>
             </a:r>
             <a:endParaRPr lang="en-SG" sz="1050" dirty="0">
               <a:solidFill>
@@ -4071,7 +4072,7 @@
                   <a:srgbClr val="7030A0"/>
                 </a:solidFill>
               </a:rPr>
-              <a:t>Email</a:t>
+              <a:t>Quantity</a:t>
             </a:r>
             <a:endParaRPr lang="en-SG" sz="1050" dirty="0">
               <a:solidFill>
@@ -4168,7 +4169,7 @@
                   <a:srgbClr val="7030A0"/>
                 </a:solidFill>
               </a:rPr>
-              <a:t>Address</a:t>
+              <a:t>Expiry</a:t>
             </a:r>
             <a:endParaRPr lang="en-SG" sz="1050" dirty="0">
               <a:solidFill>
@@ -4312,8 +4313,8 @@
         </p:nvSpPr>
         <p:spPr>
           <a:xfrm>
-            <a:off x="3724378" y="2696571"/>
-            <a:ext cx="1156969" cy="285783"/>
+            <a:off x="3590634" y="2696571"/>
+            <a:ext cx="1290714" cy="342914"/>
           </a:xfrm>
           <a:prstGeom prst="rect">
             <a:avLst/>
@@ -4378,8 +4379,8 @@
         </p:nvCxnSpPr>
         <p:spPr>
           <a:xfrm rot="5400000" flipH="1" flipV="1">
-            <a:off x="3201687" y="3025884"/>
-            <a:ext cx="709111" cy="336271"/>
+            <a:off x="3149097" y="3107038"/>
+            <a:ext cx="680546" cy="202527"/>
           </a:xfrm>
           <a:prstGeom prst="bentConnector2">
             <a:avLst/>
@@ -4515,17 +4516,20 @@
           </p:cNvPr>
           <p:cNvCxnSpPr>
             <a:cxnSpLocks/>
+            <a:stCxn id="71" idx="3"/>
             <a:endCxn id="67" idx="1"/>
           </p:cNvCxnSpPr>
           <p:nvPr/>
         </p:nvCxnSpPr>
         <p:spPr>
           <a:xfrm flipV="1">
-            <a:off x="4852786" y="2722716"/>
-            <a:ext cx="432916" cy="111294"/>
+            <a:off x="5129689" y="2722716"/>
+            <a:ext cx="156013" cy="139363"/>
           </a:xfrm>
           <a:prstGeom prst="bentConnector3">
-            <a:avLst/>
+            <a:avLst>
+              <a:gd name="adj1" fmla="val -1895"/>
+            </a:avLst>
           </a:prstGeom>
           <a:ln w="19050">
             <a:solidFill>
@@ -4627,7 +4631,7 @@
         </p:nvSpPr>
         <p:spPr>
           <a:xfrm>
-            <a:off x="5103762" y="2767724"/>
+            <a:off x="5046183" y="2605765"/>
             <a:ext cx="189257" cy="178683"/>
           </a:xfrm>
           <a:prstGeom prst="rect">
@@ -4717,7 +4721,7 @@
         </p:nvSpPr>
         <p:spPr>
           <a:xfrm>
-            <a:off x="4879835" y="2751791"/>
+            <a:off x="4893641" y="2775389"/>
             <a:ext cx="236048" cy="173380"/>
           </a:xfrm>
           <a:prstGeom prst="flowChartDecision">
@@ -4806,6 +4810,163 @@
           </a:fontRef>
         </p:style>
       </p:cxnSp>
+      <p:cxnSp>
+        <p:nvCxnSpPr>
+          <p:cNvPr id="41" name="Elbow Connector 85">
+            <a:extLst>
+              <a:ext uri="{FF2B5EF4-FFF2-40B4-BE49-F238E27FC236}">
+                <a16:creationId xmlns:a16="http://schemas.microsoft.com/office/drawing/2014/main" id="{C00630CA-1858-4F74-A024-3915E9F4A2AE}"/>
+              </a:ext>
+            </a:extLst>
+          </p:cNvPr>
+          <p:cNvCxnSpPr>
+            <a:cxnSpLocks/>
+            <a:stCxn id="78" idx="3"/>
+            <a:endCxn id="44" idx="1"/>
+          </p:cNvCxnSpPr>
+          <p:nvPr/>
+        </p:nvCxnSpPr>
+        <p:spPr>
+          <a:xfrm>
+            <a:off x="6246501" y="3524601"/>
+            <a:ext cx="434402" cy="980708"/>
+          </a:xfrm>
+          <a:prstGeom prst="bentConnector3">
+            <a:avLst>
+              <a:gd name="adj1" fmla="val 50000"/>
+            </a:avLst>
+          </a:prstGeom>
+          <a:ln w="19050">
+            <a:solidFill>
+              <a:srgbClr val="7030A0"/>
+            </a:solidFill>
+            <a:headEnd type="none" w="med" len="med"/>
+            <a:tailEnd type="arrow" w="med" len="med"/>
+          </a:ln>
+          <a:effectLst/>
+        </p:spPr>
+        <p:style>
+          <a:lnRef idx="1">
+            <a:schemeClr val="accent2"/>
+          </a:lnRef>
+          <a:fillRef idx="2">
+            <a:schemeClr val="accent2"/>
+          </a:fillRef>
+          <a:effectRef idx="1">
+            <a:schemeClr val="accent2"/>
+          </a:effectRef>
+          <a:fontRef idx="minor">
+            <a:schemeClr val="dk1"/>
+          </a:fontRef>
+        </p:style>
+      </p:cxnSp>
+      <p:sp>
+        <p:nvSpPr>
+          <p:cNvPr id="44" name="Rectangle 8">
+            <a:extLst>
+              <a:ext uri="{FF2B5EF4-FFF2-40B4-BE49-F238E27FC236}">
+                <a16:creationId xmlns:a16="http://schemas.microsoft.com/office/drawing/2014/main" id="{537203D7-2A9E-4C8C-A72A-204BA82BF9D0}"/>
+              </a:ext>
+            </a:extLst>
+          </p:cNvPr>
+          <p:cNvSpPr/>
+          <p:nvPr/>
+        </p:nvSpPr>
+        <p:spPr>
+          <a:xfrm>
+            <a:off x="6680903" y="4362417"/>
+            <a:ext cx="708186" cy="285783"/>
+          </a:xfrm>
+          <a:prstGeom prst="rect">
+            <a:avLst/>
+          </a:prstGeom>
+          <a:ln w="19050">
+            <a:solidFill>
+              <a:srgbClr val="7030A0"/>
+            </a:solidFill>
+          </a:ln>
+          <a:effectLst/>
+        </p:spPr>
+        <p:style>
+          <a:lnRef idx="1">
+            <a:schemeClr val="accent4"/>
+          </a:lnRef>
+          <a:fillRef idx="2">
+            <a:schemeClr val="accent4"/>
+          </a:fillRef>
+          <a:effectRef idx="1">
+            <a:schemeClr val="accent4"/>
+          </a:effectRef>
+          <a:fontRef idx="minor">
+            <a:schemeClr val="dk1"/>
+          </a:fontRef>
+        </p:style>
+        <p:txBody>
+          <a:bodyPr rtlCol="0" anchor="ctr"/>
+          <a:lstStyle/>
+          <a:p>
+            <a:pPr algn="ctr"/>
+            <a:r>
+              <a:rPr lang="en-US" sz="1050" dirty="0">
+                <a:solidFill>
+                  <a:srgbClr val="7030A0"/>
+                </a:solidFill>
+              </a:rPr>
+              <a:t>Batch</a:t>
+            </a:r>
+            <a:endParaRPr lang="en-SG" sz="1050" dirty="0">
+              <a:solidFill>
+                <a:srgbClr val="7030A0"/>
+              </a:solidFill>
+            </a:endParaRPr>
+          </a:p>
+        </p:txBody>
+      </p:sp>
+      <p:sp>
+        <p:nvSpPr>
+          <p:cNvPr id="47" name="TextBox 46">
+            <a:extLst>
+              <a:ext uri="{FF2B5EF4-FFF2-40B4-BE49-F238E27FC236}">
+                <a16:creationId xmlns:a16="http://schemas.microsoft.com/office/drawing/2014/main" id="{EF9E703D-C40D-483E-97DD-94EA44483C07}"/>
+              </a:ext>
+            </a:extLst>
+          </p:cNvPr>
+          <p:cNvSpPr txBox="1"/>
+          <p:nvPr/>
+        </p:nvSpPr>
+        <p:spPr>
+          <a:xfrm>
+            <a:off x="6463702" y="4362417"/>
+            <a:ext cx="189257" cy="178683"/>
+          </a:xfrm>
+          <a:prstGeom prst="rect">
+            <a:avLst/>
+          </a:prstGeom>
+          <a:noFill/>
+        </p:spPr>
+        <p:txBody>
+          <a:bodyPr wrap="square" lIns="0" tIns="0" rIns="0" bIns="0" rtlCol="0">
+            <a:noAutofit/>
+          </a:bodyPr>
+          <a:lstStyle/>
+          <a:p>
+            <a:pPr algn="ctr"/>
+            <a:r>
+              <a:rPr lang="en-US" sz="1100" dirty="0">
+                <a:solidFill>
+                  <a:srgbClr val="7030A0"/>
+                </a:solidFill>
+              </a:rPr>
+              <a:t>*</a:t>
+            </a:r>
+            <a:endParaRPr lang="en-SG" sz="1100" dirty="0">
+              <a:solidFill>
+                <a:srgbClr val="7030A0"/>
+              </a:solidFill>
+            </a:endParaRPr>
+          </a:p>
+        </p:txBody>
+      </p:sp>
     </p:spTree>
     <p:extLst>
       <p:ext uri="{BB962C8B-B14F-4D97-AF65-F5344CB8AC3E}">

</xml_diff>

<commit_message>
Adjust position of multiplicity in diagrams
</commit_message>
<xml_diff>
--- a/docs/diagrams/ModelComponentClassBetterOopDiagram.pptx
+++ b/docs/diagrams/ModelComponentClassBetterOopDiagram.pptx
@@ -3450,7 +3450,7 @@
         </p:nvSpPr>
         <p:spPr>
           <a:xfrm>
-            <a:off x="1754912" y="3324621"/>
+            <a:off x="1636303" y="3322617"/>
             <a:ext cx="1447688" cy="346760"/>
           </a:xfrm>
           <a:prstGeom prst="rect">
@@ -3506,8 +3506,8 @@
         </p:nvSpPr>
         <p:spPr>
           <a:xfrm>
-            <a:off x="3596969" y="3353144"/>
-            <a:ext cx="1290715" cy="346760"/>
+            <a:off x="3604382" y="3328359"/>
+            <a:ext cx="1276966" cy="346760"/>
           </a:xfrm>
           <a:prstGeom prst="rect">
             <a:avLst/>
@@ -3562,7 +3562,7 @@
         </p:nvSpPr>
         <p:spPr>
           <a:xfrm>
-            <a:off x="3201752" y="3437911"/>
+            <a:off x="3103558" y="3409307"/>
             <a:ext cx="236048" cy="173380"/>
           </a:xfrm>
           <a:prstGeom prst="flowChartDecision">
@@ -3613,11 +3613,13 @@
         </p:nvCxnSpPr>
         <p:spPr>
           <a:xfrm>
-            <a:off x="3437800" y="3524601"/>
-            <a:ext cx="159169" cy="1923"/>
+            <a:off x="3339606" y="3495997"/>
+            <a:ext cx="264776" cy="5742"/>
           </a:xfrm>
           <a:prstGeom prst="bentConnector3">
-            <a:avLst/>
+            <a:avLst>
+              <a:gd name="adj1" fmla="val -19549"/>
+            </a:avLst>
           </a:prstGeom>
           <a:ln w="19050">
             <a:solidFill>
@@ -3651,7 +3653,7 @@
         </p:nvSpPr>
         <p:spPr>
           <a:xfrm>
-            <a:off x="5282183" y="3347776"/>
+            <a:off x="5321800" y="3344085"/>
             <a:ext cx="708186" cy="346760"/>
           </a:xfrm>
           <a:prstGeom prst="rect">
@@ -3757,10 +3759,12 @@
         <p:spPr>
           <a:xfrm>
             <a:off x="5123014" y="3517465"/>
-            <a:ext cx="159169" cy="3691"/>
+            <a:ext cx="198786" cy="12700"/>
           </a:xfrm>
           <a:prstGeom prst="bentConnector3">
-            <a:avLst/>
+            <a:avLst>
+              <a:gd name="adj1" fmla="val -4305"/>
+            </a:avLst>
           </a:prstGeom>
           <a:ln w="19050">
             <a:solidFill>
@@ -3850,7 +3854,7 @@
         </p:nvSpPr>
         <p:spPr>
           <a:xfrm>
-            <a:off x="6010453" y="3437911"/>
+            <a:off x="6050766" y="3437602"/>
             <a:ext cx="236048" cy="173380"/>
           </a:xfrm>
           <a:prstGeom prst="flowChartDecision">
@@ -3989,18 +3993,19 @@
         <p:nvCxnSpPr>
           <p:cNvPr id="81" name="Elbow Connector 80"/>
           <p:cNvCxnSpPr>
-            <a:stCxn id="78" idx="3"/>
-            <a:endCxn id="80" idx="1"/>
+            <a:cxnSpLocks/>
           </p:cNvCxnSpPr>
           <p:nvPr/>
         </p:nvCxnSpPr>
         <p:spPr>
           <a:xfrm flipV="1">
-            <a:off x="6246501" y="3519818"/>
-            <a:ext cx="434402" cy="4783"/>
+            <a:off x="6286814" y="3512991"/>
+            <a:ext cx="394089" cy="4474"/>
           </a:xfrm>
           <a:prstGeom prst="bentConnector3">
-            <a:avLst/>
+            <a:avLst>
+              <a:gd name="adj1" fmla="val -5590"/>
+            </a:avLst>
           </a:prstGeom>
           <a:ln w="19050">
             <a:solidFill>
@@ -4093,11 +4098,13 @@
         </p:nvCxnSpPr>
         <p:spPr>
           <a:xfrm>
-            <a:off x="6246501" y="3524601"/>
-            <a:ext cx="434402" cy="318195"/>
+            <a:off x="6286814" y="3524292"/>
+            <a:ext cx="394089" cy="318504"/>
           </a:xfrm>
           <a:prstGeom prst="bentConnector3">
-            <a:avLst/>
+            <a:avLst>
+              <a:gd name="adj1" fmla="val 46375"/>
+            </a:avLst>
           </a:prstGeom>
           <a:ln w="19050">
             <a:solidFill>
@@ -4191,11 +4198,13 @@
         </p:nvCxnSpPr>
         <p:spPr>
           <a:xfrm>
-            <a:off x="6246501" y="3524601"/>
-            <a:ext cx="434402" cy="641172"/>
+            <a:off x="6286814" y="3524292"/>
+            <a:ext cx="394089" cy="641481"/>
           </a:xfrm>
           <a:prstGeom prst="bentConnector3">
-            <a:avLst/>
+            <a:avLst>
+              <a:gd name="adj1" fmla="val 46375"/>
+            </a:avLst>
           </a:prstGeom>
           <a:ln w="19050">
             <a:solidFill>
@@ -4229,7 +4238,7 @@
         </p:nvSpPr>
         <p:spPr>
           <a:xfrm>
-            <a:off x="3293478" y="3548574"/>
+            <a:off x="3343506" y="3504861"/>
             <a:ext cx="189257" cy="178683"/>
           </a:xfrm>
           <a:prstGeom prst="rect">
@@ -4268,7 +4277,7 @@
         </p:nvSpPr>
         <p:spPr>
           <a:xfrm>
-            <a:off x="5103762" y="3587627"/>
+            <a:off x="5080134" y="3568772"/>
             <a:ext cx="189257" cy="178683"/>
           </a:xfrm>
           <a:prstGeom prst="rect">
@@ -4372,18 +4381,20 @@
           </p:cNvPr>
           <p:cNvCxnSpPr>
             <a:cxnSpLocks/>
-            <a:stCxn id="54" idx="0"/>
+            <a:stCxn id="51" idx="3"/>
             <a:endCxn id="52" idx="1"/>
           </p:cNvCxnSpPr>
           <p:nvPr/>
         </p:nvCxnSpPr>
         <p:spPr>
-          <a:xfrm rot="5400000" flipH="1" flipV="1">
-            <a:off x="3149097" y="3107038"/>
-            <a:ext cx="680546" cy="202527"/>
-          </a:xfrm>
-          <a:prstGeom prst="bentConnector2">
-            <a:avLst/>
+          <a:xfrm flipV="1">
+            <a:off x="3339606" y="2868028"/>
+            <a:ext cx="251028" cy="627969"/>
+          </a:xfrm>
+          <a:prstGeom prst="bentConnector3">
+            <a:avLst>
+              <a:gd name="adj1" fmla="val -592"/>
+            </a:avLst>
           </a:prstGeom>
           <a:ln w="19050">
             <a:solidFill>
@@ -4423,7 +4434,7 @@
         </p:nvSpPr>
         <p:spPr>
           <a:xfrm>
-            <a:off x="5682850" y="2920431"/>
+            <a:off x="5660643" y="2896095"/>
             <a:ext cx="189257" cy="178683"/>
           </a:xfrm>
           <a:prstGeom prst="rect">
@@ -4631,7 +4642,7 @@
         </p:nvSpPr>
         <p:spPr>
           <a:xfrm>
-            <a:off x="5046183" y="2605765"/>
+            <a:off x="5046183" y="2577402"/>
             <a:ext cx="189257" cy="178683"/>
           </a:xfrm>
           <a:prstGeom prst="rect">
@@ -4676,7 +4687,7 @@
         </p:nvSpPr>
         <p:spPr>
           <a:xfrm>
-            <a:off x="3335606" y="2662682"/>
+            <a:off x="3341043" y="2695106"/>
             <a:ext cx="189257" cy="178683"/>
           </a:xfrm>
           <a:prstGeom prst="rect">
@@ -4828,12 +4839,12 @@
         </p:nvCxnSpPr>
         <p:spPr>
           <a:xfrm>
-            <a:off x="6246501" y="3524601"/>
-            <a:ext cx="434402" cy="980708"/>
+            <a:off x="6286814" y="3524292"/>
+            <a:ext cx="394089" cy="981017"/>
           </a:xfrm>
           <a:prstGeom prst="bentConnector3">
             <a:avLst>
-              <a:gd name="adj1" fmla="val 50000"/>
+              <a:gd name="adj1" fmla="val 45166"/>
             </a:avLst>
           </a:prstGeom>
           <a:ln w="19050">
@@ -4936,7 +4947,7 @@
         </p:nvSpPr>
         <p:spPr>
           <a:xfrm>
-            <a:off x="6463702" y="4362417"/>
+            <a:off x="6446747" y="4362417"/>
             <a:ext cx="189257" cy="178683"/>
           </a:xfrm>
           <a:prstGeom prst="rect">

</xml_diff>

<commit_message>
Update Diagrams, UG & DG to match features in V1.2
</commit_message>
<xml_diff>
--- a/docs/diagrams/ModelComponentClassBetterOopDiagram.pptx
+++ b/docs/diagrams/ModelComponentClassBetterOopDiagram.pptx
@@ -208,7 +208,7 @@
           <a:p>
             <a:fld id="{F5CC4B3F-88C1-4FFA-B1B6-F41C21DC6924}" type="datetimeFigureOut">
               <a:rPr lang="en-US" smtClean="0"/>
-              <a:t>3/12/2019</a:t>
+              <a:t>3/19/2019</a:t>
             </a:fld>
             <a:endParaRPr lang="en-US"/>
           </a:p>
@@ -654,7 +654,7 @@
           <a:p>
             <a:fld id="{78C97017-6FC3-485B-9764-EAC9E56C1D49}" type="datetimeFigureOut">
               <a:rPr lang="en-US" smtClean="0"/>
-              <a:t>3/12/2019</a:t>
+              <a:t>3/19/2019</a:t>
             </a:fld>
             <a:endParaRPr lang="en-US"/>
           </a:p>
@@ -822,7 +822,7 @@
           <a:p>
             <a:fld id="{78C97017-6FC3-485B-9764-EAC9E56C1D49}" type="datetimeFigureOut">
               <a:rPr lang="en-US" smtClean="0"/>
-              <a:t>3/12/2019</a:t>
+              <a:t>3/19/2019</a:t>
             </a:fld>
             <a:endParaRPr lang="en-US"/>
           </a:p>
@@ -1000,7 +1000,7 @@
           <a:p>
             <a:fld id="{78C97017-6FC3-485B-9764-EAC9E56C1D49}" type="datetimeFigureOut">
               <a:rPr lang="en-US" smtClean="0"/>
-              <a:t>3/12/2019</a:t>
+              <a:t>3/19/2019</a:t>
             </a:fld>
             <a:endParaRPr lang="en-US"/>
           </a:p>
@@ -1168,7 +1168,7 @@
           <a:p>
             <a:fld id="{78C97017-6FC3-485B-9764-EAC9E56C1D49}" type="datetimeFigureOut">
               <a:rPr lang="en-US" smtClean="0"/>
-              <a:t>3/12/2019</a:t>
+              <a:t>3/19/2019</a:t>
             </a:fld>
             <a:endParaRPr lang="en-US"/>
           </a:p>
@@ -1413,7 +1413,7 @@
           <a:p>
             <a:fld id="{78C97017-6FC3-485B-9764-EAC9E56C1D49}" type="datetimeFigureOut">
               <a:rPr lang="en-US" smtClean="0"/>
-              <a:t>3/12/2019</a:t>
+              <a:t>3/19/2019</a:t>
             </a:fld>
             <a:endParaRPr lang="en-US"/>
           </a:p>
@@ -1698,7 +1698,7 @@
           <a:p>
             <a:fld id="{78C97017-6FC3-485B-9764-EAC9E56C1D49}" type="datetimeFigureOut">
               <a:rPr lang="en-US" smtClean="0"/>
-              <a:t>3/12/2019</a:t>
+              <a:t>3/19/2019</a:t>
             </a:fld>
             <a:endParaRPr lang="en-US"/>
           </a:p>
@@ -2117,7 +2117,7 @@
           <a:p>
             <a:fld id="{78C97017-6FC3-485B-9764-EAC9E56C1D49}" type="datetimeFigureOut">
               <a:rPr lang="en-US" smtClean="0"/>
-              <a:t>3/12/2019</a:t>
+              <a:t>3/19/2019</a:t>
             </a:fld>
             <a:endParaRPr lang="en-US"/>
           </a:p>
@@ -2234,7 +2234,7 @@
           <a:p>
             <a:fld id="{78C97017-6FC3-485B-9764-EAC9E56C1D49}" type="datetimeFigureOut">
               <a:rPr lang="en-US" smtClean="0"/>
-              <a:t>3/12/2019</a:t>
+              <a:t>3/19/2019</a:t>
             </a:fld>
             <a:endParaRPr lang="en-US"/>
           </a:p>
@@ -2329,7 +2329,7 @@
           <a:p>
             <a:fld id="{78C97017-6FC3-485B-9764-EAC9E56C1D49}" type="datetimeFigureOut">
               <a:rPr lang="en-US" smtClean="0"/>
-              <a:t>3/12/2019</a:t>
+              <a:t>3/19/2019</a:t>
             </a:fld>
             <a:endParaRPr lang="en-US"/>
           </a:p>
@@ -2604,7 +2604,7 @@
           <a:p>
             <a:fld id="{78C97017-6FC3-485B-9764-EAC9E56C1D49}" type="datetimeFigureOut">
               <a:rPr lang="en-US" smtClean="0"/>
-              <a:t>3/12/2019</a:t>
+              <a:t>3/19/2019</a:t>
             </a:fld>
             <a:endParaRPr lang="en-US"/>
           </a:p>
@@ -2856,7 +2856,7 @@
           <a:p>
             <a:fld id="{78C97017-6FC3-485B-9764-EAC9E56C1D49}" type="datetimeFigureOut">
               <a:rPr lang="en-US" smtClean="0"/>
-              <a:t>3/12/2019</a:t>
+              <a:t>3/19/2019</a:t>
             </a:fld>
             <a:endParaRPr lang="en-US"/>
           </a:p>
@@ -3067,7 +3067,7 @@
           <a:p>
             <a:fld id="{78C97017-6FC3-485B-9764-EAC9E56C1D49}" type="datetimeFigureOut">
               <a:rPr lang="en-US" smtClean="0"/>
-              <a:t>3/12/2019</a:t>
+              <a:t>3/19/2019</a:t>
             </a:fld>
             <a:endParaRPr lang="en-US"/>
           </a:p>
@@ -3793,8 +3793,8 @@
         </p:nvSpPr>
         <p:spPr>
           <a:xfrm>
-            <a:off x="6680902" y="3053948"/>
-            <a:ext cx="862461" cy="285783"/>
+            <a:off x="6674680" y="2718294"/>
+            <a:ext cx="958619" cy="285783"/>
           </a:xfrm>
           <a:prstGeom prst="rect">
             <a:avLst/>
@@ -3893,16 +3893,20 @@
           <p:cNvPr id="79" name="Elbow Connector 78"/>
           <p:cNvCxnSpPr>
             <a:cxnSpLocks/>
+            <a:stCxn id="78" idx="3"/>
+            <a:endCxn id="76" idx="1"/>
           </p:cNvCxnSpPr>
           <p:nvPr/>
         </p:nvCxnSpPr>
         <p:spPr>
           <a:xfrm flipV="1">
-            <a:off x="6246501" y="3196531"/>
-            <a:ext cx="434402" cy="327761"/>
+            <a:off x="6246501" y="2861186"/>
+            <a:ext cx="428179" cy="663415"/>
           </a:xfrm>
           <a:prstGeom prst="bentConnector3">
-            <a:avLst/>
+            <a:avLst>
+              <a:gd name="adj1" fmla="val 50000"/>
+            </a:avLst>
           </a:prstGeom>
           <a:ln w="19050">
             <a:solidFill>
@@ -3936,8 +3940,8 @@
         </p:nvSpPr>
         <p:spPr>
           <a:xfrm>
-            <a:off x="6680902" y="3376926"/>
-            <a:ext cx="862461" cy="285783"/>
+            <a:off x="6680901" y="3376926"/>
+            <a:ext cx="961217" cy="285783"/>
           </a:xfrm>
           <a:prstGeom prst="rect">
             <a:avLst/>
@@ -3997,7 +4001,7 @@
         <p:spPr>
           <a:xfrm flipV="1">
             <a:off x="6246501" y="3519818"/>
-            <a:ext cx="434401" cy="4783"/>
+            <a:ext cx="434400" cy="4783"/>
           </a:xfrm>
           <a:prstGeom prst="bentConnector3">
             <a:avLst/>
@@ -4035,7 +4039,7 @@
         <p:spPr>
           <a:xfrm>
             <a:off x="6680902" y="3699904"/>
-            <a:ext cx="862461" cy="285783"/>
+            <a:ext cx="961217" cy="285783"/>
           </a:xfrm>
           <a:prstGeom prst="rect">
             <a:avLst/>
@@ -4133,7 +4137,7 @@
         <p:spPr>
           <a:xfrm>
             <a:off x="6680902" y="4022881"/>
-            <a:ext cx="862461" cy="285783"/>
+            <a:ext cx="961217" cy="285783"/>
           </a:xfrm>
           <a:prstGeom prst="rect">
             <a:avLst/>
@@ -4782,6 +4786,117 @@
           <a:prstGeom prst="bentConnector3">
             <a:avLst>
               <a:gd name="adj1" fmla="val 50000"/>
+            </a:avLst>
+          </a:prstGeom>
+          <a:ln w="19050">
+            <a:solidFill>
+              <a:srgbClr val="7030A0"/>
+            </a:solidFill>
+            <a:headEnd type="none" w="med" len="med"/>
+            <a:tailEnd type="arrow" w="med" len="med"/>
+          </a:ln>
+          <a:effectLst/>
+        </p:spPr>
+        <p:style>
+          <a:lnRef idx="1">
+            <a:schemeClr val="accent2"/>
+          </a:lnRef>
+          <a:fillRef idx="2">
+            <a:schemeClr val="accent2"/>
+          </a:fillRef>
+          <a:effectRef idx="1">
+            <a:schemeClr val="accent2"/>
+          </a:effectRef>
+          <a:fontRef idx="minor">
+            <a:schemeClr val="dk1"/>
+          </a:fontRef>
+        </p:style>
+      </p:cxnSp>
+      <p:sp>
+        <p:nvSpPr>
+          <p:cNvPr id="31" name="Rectangle 8">
+            <a:extLst>
+              <a:ext uri="{FF2B5EF4-FFF2-40B4-BE49-F238E27FC236}">
+                <a16:creationId xmlns:a16="http://schemas.microsoft.com/office/drawing/2014/main" id="{3B11A712-457B-47FC-B36A-97212938E1F2}"/>
+              </a:ext>
+            </a:extLst>
+          </p:cNvPr>
+          <p:cNvSpPr/>
+          <p:nvPr/>
+        </p:nvSpPr>
+        <p:spPr>
+          <a:xfrm>
+            <a:off x="6674680" y="3047242"/>
+            <a:ext cx="967439" cy="285783"/>
+          </a:xfrm>
+          <a:prstGeom prst="rect">
+            <a:avLst/>
+          </a:prstGeom>
+          <a:ln w="19050">
+            <a:solidFill>
+              <a:srgbClr val="7030A0"/>
+            </a:solidFill>
+          </a:ln>
+          <a:effectLst/>
+        </p:spPr>
+        <p:style>
+          <a:lnRef idx="1">
+            <a:schemeClr val="accent4"/>
+          </a:lnRef>
+          <a:fillRef idx="2">
+            <a:schemeClr val="accent4"/>
+          </a:fillRef>
+          <a:effectRef idx="1">
+            <a:schemeClr val="accent4"/>
+          </a:effectRef>
+          <a:fontRef idx="minor">
+            <a:schemeClr val="dk1"/>
+          </a:fontRef>
+        </p:style>
+        <p:txBody>
+          <a:bodyPr rtlCol="0" anchor="ctr"/>
+          <a:lstStyle/>
+          <a:p>
+            <a:pPr algn="ctr"/>
+            <a:r>
+              <a:rPr lang="en-US" sz="1050" dirty="0">
+                <a:solidFill>
+                  <a:srgbClr val="7030A0"/>
+                </a:solidFill>
+              </a:rPr>
+              <a:t>Country Code</a:t>
+            </a:r>
+            <a:endParaRPr lang="en-SG" sz="1050" dirty="0">
+              <a:solidFill>
+                <a:srgbClr val="7030A0"/>
+              </a:solidFill>
+            </a:endParaRPr>
+          </a:p>
+        </p:txBody>
+      </p:sp>
+      <p:cxnSp>
+        <p:nvCxnSpPr>
+          <p:cNvPr id="36" name="Elbow Connector 83">
+            <a:extLst>
+              <a:ext uri="{FF2B5EF4-FFF2-40B4-BE49-F238E27FC236}">
+                <a16:creationId xmlns:a16="http://schemas.microsoft.com/office/drawing/2014/main" id="{965EBEBD-81B0-412B-9BD0-92AA7FDA6E77}"/>
+              </a:ext>
+            </a:extLst>
+          </p:cNvPr>
+          <p:cNvCxnSpPr>
+            <a:cxnSpLocks/>
+            <a:stCxn id="78" idx="3"/>
+          </p:cNvCxnSpPr>
+          <p:nvPr/>
+        </p:nvCxnSpPr>
+        <p:spPr>
+          <a:xfrm flipV="1">
+            <a:off x="6246501" y="3176343"/>
+            <a:ext cx="413285" cy="348258"/>
+          </a:xfrm>
+          <a:prstGeom prst="bentConnector3">
+            <a:avLst>
+              <a:gd name="adj1" fmla="val 51475"/>
             </a:avLst>
           </a:prstGeom>
           <a:ln w="19050">

</xml_diff>

<commit_message>
Upgraded ModelComponentDiagram based on current state of project.
</commit_message>
<xml_diff>
--- a/docs/diagrams/ModelComponentClassBetterOopDiagram.pptx
+++ b/docs/diagrams/ModelComponentClassBetterOopDiagram.pptx
@@ -8,7 +8,7 @@
     <p:notesMasterId r:id="rId3"/>
   </p:notesMasterIdLst>
   <p:sldIdLst>
-    <p:sldId id="263" r:id="rId2"/>
+    <p:sldId id="264" r:id="rId2"/>
   </p:sldIdLst>
   <p:sldSz cx="9144000" cy="6858000" type="screen4x3"/>
   <p:notesSz cx="6858000" cy="9144000"/>
@@ -126,6 +126,32 @@
 </p:presentation>
 </file>
 
+<file path=ppt/commentAuthors.xml><?xml version="1.0" encoding="utf-8"?>
+<p:cmAuthorLst xmlns:a="http://schemas.openxmlformats.org/drawingml/2006/main" xmlns:r="http://schemas.openxmlformats.org/officeDocument/2006/relationships" xmlns:p="http://schemas.openxmlformats.org/presentationml/2006/main">
+  <p:cmAuthor id="1" name="Tejas Bhuwania" initials="TB" lastIdx="1" clrIdx="0">
+    <p:extLst>
+      <p:ext uri="{19B8F6BF-5375-455C-9EA6-DF929625EA0E}">
+        <p15:presenceInfo xmlns:p15="http://schemas.microsoft.com/office/powerpoint/2012/main" userId="S::e0235291@u.nus.edu::4e165ddc-5cb8-4f7f-b783-03e4fb69feb4" providerId="AD"/>
+      </p:ext>
+    </p:extLst>
+  </p:cmAuthor>
+</p:cmAuthorLst>
+</file>
+
+<file path=ppt/comments/comment1.xml><?xml version="1.0" encoding="utf-8"?>
+<p:cmLst xmlns:a="http://schemas.openxmlformats.org/drawingml/2006/main" xmlns:r="http://schemas.openxmlformats.org/officeDocument/2006/relationships" xmlns:p="http://schemas.openxmlformats.org/presentationml/2006/main">
+  <p:cm authorId="1" dt="2019-03-20T17:38:20.665" idx="1">
+    <p:pos x="10" y="10"/>
+    <p:text/>
+    <p:extLst>
+      <p:ext uri="{C676402C-5697-4E1C-873F-D02D1690AC5C}">
+        <p15:threadingInfo xmlns:p15="http://schemas.microsoft.com/office/powerpoint/2012/main" timeZoneBias="-480"/>
+      </p:ext>
+    </p:extLst>
+  </p:cm>
+</p:cmLst>
+</file>
+
 <file path=ppt/notesMasters/notesMaster1.xml><?xml version="1.0" encoding="utf-8"?>
 <p:notesMaster xmlns:a="http://schemas.openxmlformats.org/drawingml/2006/main" xmlns:r="http://schemas.openxmlformats.org/officeDocument/2006/relationships" xmlns:p="http://schemas.openxmlformats.org/presentationml/2006/main">
   <p:cSld>
@@ -208,7 +234,7 @@
           <a:p>
             <a:fld id="{F5CC4B3F-88C1-4FFA-B1B6-F41C21DC6924}" type="datetimeFigureOut">
               <a:rPr lang="en-US" smtClean="0"/>
-              <a:t>3/5/19</a:t>
+              <a:t>3/20/19</a:t>
             </a:fld>
             <a:endParaRPr lang="en-US"/>
           </a:p>
@@ -654,7 +680,7 @@
           <a:p>
             <a:fld id="{78C97017-6FC3-485B-9764-EAC9E56C1D49}" type="datetimeFigureOut">
               <a:rPr lang="en-US" smtClean="0"/>
-              <a:t>3/5/19</a:t>
+              <a:t>3/20/19</a:t>
             </a:fld>
             <a:endParaRPr lang="en-US"/>
           </a:p>
@@ -822,7 +848,7 @@
           <a:p>
             <a:fld id="{78C97017-6FC3-485B-9764-EAC9E56C1D49}" type="datetimeFigureOut">
               <a:rPr lang="en-US" smtClean="0"/>
-              <a:t>3/5/19</a:t>
+              <a:t>3/20/19</a:t>
             </a:fld>
             <a:endParaRPr lang="en-US"/>
           </a:p>
@@ -1000,7 +1026,7 @@
           <a:p>
             <a:fld id="{78C97017-6FC3-485B-9764-EAC9E56C1D49}" type="datetimeFigureOut">
               <a:rPr lang="en-US" smtClean="0"/>
-              <a:t>3/5/19</a:t>
+              <a:t>3/20/19</a:t>
             </a:fld>
             <a:endParaRPr lang="en-US"/>
           </a:p>
@@ -1168,7 +1194,7 @@
           <a:p>
             <a:fld id="{78C97017-6FC3-485B-9764-EAC9E56C1D49}" type="datetimeFigureOut">
               <a:rPr lang="en-US" smtClean="0"/>
-              <a:t>3/5/19</a:t>
+              <a:t>3/20/19</a:t>
             </a:fld>
             <a:endParaRPr lang="en-US"/>
           </a:p>
@@ -1413,7 +1439,7 @@
           <a:p>
             <a:fld id="{78C97017-6FC3-485B-9764-EAC9E56C1D49}" type="datetimeFigureOut">
               <a:rPr lang="en-US" smtClean="0"/>
-              <a:t>3/5/19</a:t>
+              <a:t>3/20/19</a:t>
             </a:fld>
             <a:endParaRPr lang="en-US"/>
           </a:p>
@@ -1698,7 +1724,7 @@
           <a:p>
             <a:fld id="{78C97017-6FC3-485B-9764-EAC9E56C1D49}" type="datetimeFigureOut">
               <a:rPr lang="en-US" smtClean="0"/>
-              <a:t>3/5/19</a:t>
+              <a:t>3/20/19</a:t>
             </a:fld>
             <a:endParaRPr lang="en-US"/>
           </a:p>
@@ -2117,7 +2143,7 @@
           <a:p>
             <a:fld id="{78C97017-6FC3-485B-9764-EAC9E56C1D49}" type="datetimeFigureOut">
               <a:rPr lang="en-US" smtClean="0"/>
-              <a:t>3/5/19</a:t>
+              <a:t>3/20/19</a:t>
             </a:fld>
             <a:endParaRPr lang="en-US"/>
           </a:p>
@@ -2234,7 +2260,7 @@
           <a:p>
             <a:fld id="{78C97017-6FC3-485B-9764-EAC9E56C1D49}" type="datetimeFigureOut">
               <a:rPr lang="en-US" smtClean="0"/>
-              <a:t>3/5/19</a:t>
+              <a:t>3/20/19</a:t>
             </a:fld>
             <a:endParaRPr lang="en-US"/>
           </a:p>
@@ -2329,7 +2355,7 @@
           <a:p>
             <a:fld id="{78C97017-6FC3-485B-9764-EAC9E56C1D49}" type="datetimeFigureOut">
               <a:rPr lang="en-US" smtClean="0"/>
-              <a:t>3/5/19</a:t>
+              <a:t>3/20/19</a:t>
             </a:fld>
             <a:endParaRPr lang="en-US"/>
           </a:p>
@@ -2604,7 +2630,7 @@
           <a:p>
             <a:fld id="{78C97017-6FC3-485B-9764-EAC9E56C1D49}" type="datetimeFigureOut">
               <a:rPr lang="en-US" smtClean="0"/>
-              <a:t>3/5/19</a:t>
+              <a:t>3/20/19</a:t>
             </a:fld>
             <a:endParaRPr lang="en-US"/>
           </a:p>
@@ -2856,7 +2882,7 @@
           <a:p>
             <a:fld id="{78C97017-6FC3-485B-9764-EAC9E56C1D49}" type="datetimeFigureOut">
               <a:rPr lang="en-US" smtClean="0"/>
-              <a:t>3/5/19</a:t>
+              <a:t>3/20/19</a:t>
             </a:fld>
             <a:endParaRPr lang="en-US"/>
           </a:p>
@@ -3067,7 +3093,7 @@
           <a:p>
             <a:fld id="{78C97017-6FC3-485B-9764-EAC9E56C1D49}" type="datetimeFigureOut">
               <a:rPr lang="en-US" smtClean="0"/>
-              <a:t>3/5/19</a:t>
+              <a:t>3/20/19</a:t>
             </a:fld>
             <a:endParaRPr lang="en-US"/>
           </a:p>
@@ -3444,37 +3470,62 @@
       </p:grpSpPr>
       <p:sp>
         <p:nvSpPr>
-          <p:cNvPr id="46" name="Rectangle 8"/>
+          <p:cNvPr id="2" name="Rectangle 1">
+            <a:extLst>
+              <a:ext uri="{FF2B5EF4-FFF2-40B4-BE49-F238E27FC236}">
+                <a16:creationId xmlns:a16="http://schemas.microsoft.com/office/drawing/2014/main" id="{34E8DB85-F882-7E49-8336-7F4BD6501465}"/>
+              </a:ext>
+            </a:extLst>
+          </p:cNvPr>
           <p:cNvSpPr/>
           <p:nvPr/>
         </p:nvSpPr>
         <p:spPr>
           <a:xfrm>
-            <a:off x="1754912" y="3324621"/>
-            <a:ext cx="1447688" cy="346760"/>
+            <a:off x="990600" y="3200400"/>
+            <a:ext cx="2362200" cy="304800"/>
           </a:xfrm>
           <a:prstGeom prst="rect">
             <a:avLst/>
           </a:prstGeom>
-          <a:ln w="19050">
-            <a:solidFill>
-              <a:srgbClr val="7030A0"/>
-            </a:solidFill>
-          </a:ln>
-          <a:effectLst/>
+          <a:gradFill>
+            <a:gsLst>
+              <a:gs pos="0">
+                <a:schemeClr val="accent4">
+                  <a:tint val="50000"/>
+                  <a:satMod val="300000"/>
+                </a:schemeClr>
+              </a:gs>
+              <a:gs pos="35000">
+                <a:schemeClr val="accent4">
+                  <a:tint val="37000"/>
+                  <a:satMod val="300000"/>
+                </a:schemeClr>
+              </a:gs>
+              <a:gs pos="100000">
+                <a:schemeClr val="accent4">
+                  <a:tint val="15000"/>
+                  <a:satMod val="350000"/>
+                </a:schemeClr>
+              </a:gs>
+            </a:gsLst>
+            <a:lin ang="16200000" scaled="1"/>
+          </a:gradFill>
         </p:spPr>
         <p:style>
-          <a:lnRef idx="1">
-            <a:schemeClr val="accent4"/>
+          <a:lnRef idx="2">
+            <a:schemeClr val="accent4">
+              <a:shade val="50000"/>
+            </a:schemeClr>
           </a:lnRef>
-          <a:fillRef idx="2">
+          <a:fillRef idx="1">
             <a:schemeClr val="accent4"/>
           </a:fillRef>
-          <a:effectRef idx="1">
+          <a:effectRef idx="0">
             <a:schemeClr val="accent4"/>
           </a:effectRef>
           <a:fontRef idx="minor">
-            <a:schemeClr val="dk1"/>
+            <a:schemeClr val="lt1"/>
           </a:fontRef>
         </p:style>
         <p:txBody>
@@ -3483,113 +3534,534 @@
           <a:p>
             <a:pPr algn="ctr"/>
             <a:r>
-              <a:rPr lang="en-US" sz="1050" dirty="0" err="1">
+              <a:rPr lang="en-US" sz="1050" dirty="0">
                 <a:solidFill>
                   <a:srgbClr val="7030A0"/>
                 </a:solidFill>
               </a:rPr>
-              <a:t>VersionedAddressBook</a:t>
-            </a:r>
-            <a:endParaRPr lang="en-SG" sz="1050" dirty="0">
-              <a:solidFill>
-                <a:srgbClr val="7030A0"/>
-              </a:solidFill>
-            </a:endParaRPr>
-          </a:p>
-        </p:txBody>
-      </p:sp>
-      <p:sp>
-        <p:nvSpPr>
-          <p:cNvPr id="49" name="Rectangle 8"/>
+              <a:t>VersionedHotelManagementSystem</a:t>
+            </a:r>
+          </a:p>
+        </p:txBody>
+      </p:sp>
+      <p:sp>
+        <p:nvSpPr>
+          <p:cNvPr id="3" name="Decision 2">
+            <a:extLst>
+              <a:ext uri="{FF2B5EF4-FFF2-40B4-BE49-F238E27FC236}">
+                <a16:creationId xmlns:a16="http://schemas.microsoft.com/office/drawing/2014/main" id="{C96073A5-189A-6448-B60E-ED6626BE717A}"/>
+              </a:ext>
+            </a:extLst>
+          </p:cNvPr>
           <p:cNvSpPr/>
           <p:nvPr/>
         </p:nvSpPr>
         <p:spPr>
           <a:xfrm>
-            <a:off x="3730715" y="3353144"/>
-            <a:ext cx="1156969" cy="346760"/>
+            <a:off x="3352800" y="3238500"/>
+            <a:ext cx="457200" cy="228600"/>
+          </a:xfrm>
+          <a:prstGeom prst="flowChartDecision">
+            <a:avLst/>
+          </a:prstGeom>
+        </p:spPr>
+        <p:style>
+          <a:lnRef idx="2">
+            <a:schemeClr val="accent4">
+              <a:shade val="50000"/>
+            </a:schemeClr>
+          </a:lnRef>
+          <a:fillRef idx="1">
+            <a:schemeClr val="accent4"/>
+          </a:fillRef>
+          <a:effectRef idx="0">
+            <a:schemeClr val="accent4"/>
+          </a:effectRef>
+          <a:fontRef idx="minor">
+            <a:schemeClr val="lt1"/>
+          </a:fontRef>
+        </p:style>
+        <p:txBody>
+          <a:bodyPr rtlCol="0" anchor="ctr"/>
+          <a:lstStyle/>
+          <a:p>
+            <a:pPr algn="ctr"/>
+            <a:endParaRPr lang="en-US"/>
+          </a:p>
+        </p:txBody>
+      </p:sp>
+      <p:cxnSp>
+        <p:nvCxnSpPr>
+          <p:cNvPr id="8" name="Straight Connector 7">
+            <a:extLst>
+              <a:ext uri="{FF2B5EF4-FFF2-40B4-BE49-F238E27FC236}">
+                <a16:creationId xmlns:a16="http://schemas.microsoft.com/office/drawing/2014/main" id="{B5D404AF-6D8B-1948-B9F5-608720F661DC}"/>
+              </a:ext>
+            </a:extLst>
+          </p:cNvPr>
+          <p:cNvCxnSpPr>
+            <a:stCxn id="3" idx="0"/>
+          </p:cNvCxnSpPr>
+          <p:nvPr/>
+        </p:nvCxnSpPr>
+        <p:spPr>
+          <a:xfrm flipV="1">
+            <a:off x="3581400" y="2667000"/>
+            <a:ext cx="0" cy="571500"/>
+          </a:xfrm>
+          <a:prstGeom prst="line">
+            <a:avLst/>
+          </a:prstGeom>
+          <a:ln w="25400" cmpd="sng">
+            <a:prstDash val="solid"/>
+          </a:ln>
+        </p:spPr>
+        <p:style>
+          <a:lnRef idx="1">
+            <a:schemeClr val="accent4"/>
+          </a:lnRef>
+          <a:fillRef idx="0">
+            <a:schemeClr val="accent4"/>
+          </a:fillRef>
+          <a:effectRef idx="0">
+            <a:schemeClr val="accent4"/>
+          </a:effectRef>
+          <a:fontRef idx="minor">
+            <a:schemeClr val="tx1"/>
+          </a:fontRef>
+        </p:style>
+      </p:cxnSp>
+      <p:cxnSp>
+        <p:nvCxnSpPr>
+          <p:cNvPr id="10" name="Straight Arrow Connector 9">
+            <a:extLst>
+              <a:ext uri="{FF2B5EF4-FFF2-40B4-BE49-F238E27FC236}">
+                <a16:creationId xmlns:a16="http://schemas.microsoft.com/office/drawing/2014/main" id="{1F788868-5B98-DC4D-8875-C9A484EF63FD}"/>
+              </a:ext>
+            </a:extLst>
+          </p:cNvPr>
+          <p:cNvCxnSpPr/>
+          <p:nvPr/>
+        </p:nvCxnSpPr>
+        <p:spPr>
+          <a:xfrm>
+            <a:off x="3581400" y="2667000"/>
+            <a:ext cx="457200" cy="0"/>
+          </a:xfrm>
+          <a:prstGeom prst="straightConnector1">
+            <a:avLst/>
+          </a:prstGeom>
+          <a:ln w="25400">
+            <a:tailEnd type="triangle"/>
+          </a:ln>
+        </p:spPr>
+        <p:style>
+          <a:lnRef idx="1">
+            <a:schemeClr val="accent4"/>
+          </a:lnRef>
+          <a:fillRef idx="0">
+            <a:schemeClr val="accent4"/>
+          </a:fillRef>
+          <a:effectRef idx="0">
+            <a:schemeClr val="accent4"/>
+          </a:effectRef>
+          <a:fontRef idx="minor">
+            <a:schemeClr val="tx1"/>
+          </a:fontRef>
+        </p:style>
+      </p:cxnSp>
+      <p:sp>
+        <p:nvSpPr>
+          <p:cNvPr id="11" name="Rectangle 10">
+            <a:extLst>
+              <a:ext uri="{FF2B5EF4-FFF2-40B4-BE49-F238E27FC236}">
+                <a16:creationId xmlns:a16="http://schemas.microsoft.com/office/drawing/2014/main" id="{AD937D0B-ADBD-D647-B403-BA6139213594}"/>
+              </a:ext>
+            </a:extLst>
+          </p:cNvPr>
+          <p:cNvSpPr/>
+          <p:nvPr/>
+        </p:nvSpPr>
+        <p:spPr>
+          <a:xfrm>
+            <a:off x="4038600" y="2514600"/>
+            <a:ext cx="1447800" cy="304800"/>
           </a:xfrm>
           <a:prstGeom prst="rect">
             <a:avLst/>
           </a:prstGeom>
-          <a:ln w="19050">
-            <a:solidFill>
-              <a:srgbClr val="7030A0"/>
-            </a:solidFill>
+          <a:gradFill>
+            <a:gsLst>
+              <a:gs pos="0">
+                <a:schemeClr val="accent4">
+                  <a:tint val="50000"/>
+                  <a:satMod val="300000"/>
+                </a:schemeClr>
+              </a:gs>
+              <a:gs pos="35000">
+                <a:schemeClr val="accent4">
+                  <a:tint val="37000"/>
+                  <a:satMod val="300000"/>
+                </a:schemeClr>
+              </a:gs>
+              <a:gs pos="100000">
+                <a:schemeClr val="accent4">
+                  <a:tint val="15000"/>
+                  <a:satMod val="350000"/>
+                </a:schemeClr>
+              </a:gs>
+            </a:gsLst>
+            <a:lin ang="16200000" scaled="1"/>
+          </a:gradFill>
+        </p:spPr>
+        <p:style>
+          <a:lnRef idx="2">
+            <a:schemeClr val="accent4">
+              <a:shade val="50000"/>
+            </a:schemeClr>
+          </a:lnRef>
+          <a:fillRef idx="1">
+            <a:schemeClr val="accent4"/>
+          </a:fillRef>
+          <a:effectRef idx="0">
+            <a:schemeClr val="accent4"/>
+          </a:effectRef>
+          <a:fontRef idx="minor">
+            <a:schemeClr val="lt1"/>
+          </a:fontRef>
+        </p:style>
+        <p:txBody>
+          <a:bodyPr rtlCol="0" anchor="ctr"/>
+          <a:lstStyle/>
+          <a:p>
+            <a:pPr algn="ctr"/>
+            <a:r>
+              <a:rPr lang="en-US" sz="1050" dirty="0">
+                <a:solidFill>
+                  <a:srgbClr val="7030A0"/>
+                </a:solidFill>
+              </a:rPr>
+              <a:t>UniqueTagList</a:t>
+            </a:r>
+          </a:p>
+        </p:txBody>
+      </p:sp>
+      <p:sp>
+        <p:nvSpPr>
+          <p:cNvPr id="12" name="Decision 11">
+            <a:extLst>
+              <a:ext uri="{FF2B5EF4-FFF2-40B4-BE49-F238E27FC236}">
+                <a16:creationId xmlns:a16="http://schemas.microsoft.com/office/drawing/2014/main" id="{B1E0B4CE-D40F-B043-ADDA-5F043E96DE86}"/>
+              </a:ext>
+            </a:extLst>
+          </p:cNvPr>
+          <p:cNvSpPr/>
+          <p:nvPr/>
+        </p:nvSpPr>
+        <p:spPr>
+          <a:xfrm>
+            <a:off x="5486400" y="2557929"/>
+            <a:ext cx="457200" cy="228600"/>
+          </a:xfrm>
+          <a:prstGeom prst="flowChartDecision">
+            <a:avLst/>
+          </a:prstGeom>
+        </p:spPr>
+        <p:style>
+          <a:lnRef idx="2">
+            <a:schemeClr val="accent4">
+              <a:shade val="50000"/>
+            </a:schemeClr>
+          </a:lnRef>
+          <a:fillRef idx="1">
+            <a:schemeClr val="accent4"/>
+          </a:fillRef>
+          <a:effectRef idx="0">
+            <a:schemeClr val="accent4"/>
+          </a:effectRef>
+          <a:fontRef idx="minor">
+            <a:schemeClr val="lt1"/>
+          </a:fontRef>
+        </p:style>
+        <p:txBody>
+          <a:bodyPr rtlCol="0" anchor="ctr"/>
+          <a:lstStyle/>
+          <a:p>
+            <a:pPr algn="ctr"/>
+            <a:endParaRPr lang="en-US"/>
+          </a:p>
+        </p:txBody>
+      </p:sp>
+      <p:cxnSp>
+        <p:nvCxnSpPr>
+          <p:cNvPr id="13" name="Straight Arrow Connector 12">
+            <a:extLst>
+              <a:ext uri="{FF2B5EF4-FFF2-40B4-BE49-F238E27FC236}">
+                <a16:creationId xmlns:a16="http://schemas.microsoft.com/office/drawing/2014/main" id="{1D6EE77A-B843-F642-B7BF-E77B7B3D43C3}"/>
+              </a:ext>
+            </a:extLst>
+          </p:cNvPr>
+          <p:cNvCxnSpPr>
+            <a:cxnSpLocks/>
+          </p:cNvCxnSpPr>
+          <p:nvPr/>
+        </p:nvCxnSpPr>
+        <p:spPr>
+          <a:xfrm>
+            <a:off x="5943600" y="2671482"/>
+            <a:ext cx="381000" cy="0"/>
+          </a:xfrm>
+          <a:prstGeom prst="straightConnector1">
+            <a:avLst/>
+          </a:prstGeom>
+          <a:ln w="25400">
+            <a:tailEnd type="triangle"/>
           </a:ln>
-          <a:effectLst/>
         </p:spPr>
         <p:style>
           <a:lnRef idx="1">
             <a:schemeClr val="accent4"/>
           </a:lnRef>
-          <a:fillRef idx="2">
+          <a:fillRef idx="0">
             <a:schemeClr val="accent4"/>
           </a:fillRef>
-          <a:effectRef idx="1">
+          <a:effectRef idx="0">
             <a:schemeClr val="accent4"/>
           </a:effectRef>
           <a:fontRef idx="minor">
-            <a:schemeClr val="dk1"/>
+            <a:schemeClr val="tx1"/>
           </a:fontRef>
         </p:style>
+      </p:cxnSp>
+      <p:sp>
+        <p:nvSpPr>
+          <p:cNvPr id="15" name="Rectangle 14">
+            <a:extLst>
+              <a:ext uri="{FF2B5EF4-FFF2-40B4-BE49-F238E27FC236}">
+                <a16:creationId xmlns:a16="http://schemas.microsoft.com/office/drawing/2014/main" id="{7E783336-CF1B-E94A-BFF5-A2D38338379A}"/>
+              </a:ext>
+            </a:extLst>
+          </p:cNvPr>
+          <p:cNvSpPr/>
+          <p:nvPr/>
+        </p:nvSpPr>
+        <p:spPr>
+          <a:xfrm>
+            <a:off x="6324600" y="2514600"/>
+            <a:ext cx="840678" cy="304800"/>
+          </a:xfrm>
+          <a:prstGeom prst="rect">
+            <a:avLst/>
+          </a:prstGeom>
+          <a:gradFill>
+            <a:gsLst>
+              <a:gs pos="0">
+                <a:schemeClr val="accent4">
+                  <a:tint val="50000"/>
+                  <a:satMod val="300000"/>
+                </a:schemeClr>
+              </a:gs>
+              <a:gs pos="35000">
+                <a:schemeClr val="accent4">
+                  <a:tint val="37000"/>
+                  <a:satMod val="300000"/>
+                </a:schemeClr>
+              </a:gs>
+              <a:gs pos="100000">
+                <a:schemeClr val="accent4">
+                  <a:tint val="15000"/>
+                  <a:satMod val="350000"/>
+                </a:schemeClr>
+              </a:gs>
+            </a:gsLst>
+            <a:lin ang="16200000" scaled="1"/>
+          </a:gradFill>
+        </p:spPr>
+        <p:style>
+          <a:lnRef idx="2">
+            <a:schemeClr val="accent4">
+              <a:shade val="50000"/>
+            </a:schemeClr>
+          </a:lnRef>
+          <a:fillRef idx="1">
+            <a:schemeClr val="accent4"/>
+          </a:fillRef>
+          <a:effectRef idx="0">
+            <a:schemeClr val="accent4"/>
+          </a:effectRef>
+          <a:fontRef idx="minor">
+            <a:schemeClr val="lt1"/>
+          </a:fontRef>
+        </p:style>
         <p:txBody>
           <a:bodyPr rtlCol="0" anchor="ctr"/>
           <a:lstStyle/>
           <a:p>
             <a:pPr algn="ctr"/>
             <a:r>
-              <a:rPr lang="en-US" sz="1050" dirty="0" err="1">
+              <a:rPr lang="en-US" sz="1050" dirty="0">
+                <a:solidFill>
+                  <a:srgbClr val="7030A0"/>
+                </a:solidFill>
+              </a:rPr>
+              <a:t>Tag</a:t>
+            </a:r>
+          </a:p>
+        </p:txBody>
+      </p:sp>
+      <p:cxnSp>
+        <p:nvCxnSpPr>
+          <p:cNvPr id="16" name="Straight Arrow Connector 15">
+            <a:extLst>
+              <a:ext uri="{FF2B5EF4-FFF2-40B4-BE49-F238E27FC236}">
+                <a16:creationId xmlns:a16="http://schemas.microsoft.com/office/drawing/2014/main" id="{2DB73B94-4A7F-FE40-8628-1DBA07AD2861}"/>
+              </a:ext>
+            </a:extLst>
+          </p:cNvPr>
+          <p:cNvCxnSpPr>
+            <a:cxnSpLocks/>
+          </p:cNvCxnSpPr>
+          <p:nvPr/>
+        </p:nvCxnSpPr>
+        <p:spPr>
+          <a:xfrm>
+            <a:off x="3810000" y="3352800"/>
+            <a:ext cx="381000" cy="0"/>
+          </a:xfrm>
+          <a:prstGeom prst="straightConnector1">
+            <a:avLst/>
+          </a:prstGeom>
+          <a:ln w="25400">
+            <a:tailEnd type="triangle"/>
+          </a:ln>
+        </p:spPr>
+        <p:style>
+          <a:lnRef idx="1">
+            <a:schemeClr val="accent4"/>
+          </a:lnRef>
+          <a:fillRef idx="0">
+            <a:schemeClr val="accent4"/>
+          </a:fillRef>
+          <a:effectRef idx="0">
+            <a:schemeClr val="accent4"/>
+          </a:effectRef>
+          <a:fontRef idx="minor">
+            <a:schemeClr val="tx1"/>
+          </a:fontRef>
+        </p:style>
+      </p:cxnSp>
+      <p:sp>
+        <p:nvSpPr>
+          <p:cNvPr id="17" name="Rectangle 16">
+            <a:extLst>
+              <a:ext uri="{FF2B5EF4-FFF2-40B4-BE49-F238E27FC236}">
+                <a16:creationId xmlns:a16="http://schemas.microsoft.com/office/drawing/2014/main" id="{591F6527-CA52-AD4A-BD3D-FE72F7C639B9}"/>
+              </a:ext>
+            </a:extLst>
+          </p:cNvPr>
+          <p:cNvSpPr/>
+          <p:nvPr/>
+        </p:nvSpPr>
+        <p:spPr>
+          <a:xfrm>
+            <a:off x="4194735" y="3200400"/>
+            <a:ext cx="1447800" cy="304800"/>
+          </a:xfrm>
+          <a:prstGeom prst="rect">
+            <a:avLst/>
+          </a:prstGeom>
+          <a:gradFill>
+            <a:gsLst>
+              <a:gs pos="0">
+                <a:schemeClr val="accent4">
+                  <a:tint val="50000"/>
+                  <a:satMod val="300000"/>
+                </a:schemeClr>
+              </a:gs>
+              <a:gs pos="35000">
+                <a:schemeClr val="accent4">
+                  <a:tint val="37000"/>
+                  <a:satMod val="300000"/>
+                </a:schemeClr>
+              </a:gs>
+              <a:gs pos="100000">
+                <a:schemeClr val="accent4">
+                  <a:tint val="15000"/>
+                  <a:satMod val="350000"/>
+                </a:schemeClr>
+              </a:gs>
+            </a:gsLst>
+            <a:lin ang="16200000" scaled="1"/>
+          </a:gradFill>
+        </p:spPr>
+        <p:style>
+          <a:lnRef idx="2">
+            <a:schemeClr val="accent4">
+              <a:shade val="50000"/>
+            </a:schemeClr>
+          </a:lnRef>
+          <a:fillRef idx="1">
+            <a:schemeClr val="accent4"/>
+          </a:fillRef>
+          <a:effectRef idx="0">
+            <a:schemeClr val="accent4"/>
+          </a:effectRef>
+          <a:fontRef idx="minor">
+            <a:schemeClr val="lt1"/>
+          </a:fontRef>
+        </p:style>
+        <p:txBody>
+          <a:bodyPr rtlCol="0" anchor="ctr"/>
+          <a:lstStyle/>
+          <a:p>
+            <a:pPr algn="ctr"/>
+            <a:r>
+              <a:rPr lang="en-US" sz="1050" dirty="0">
                 <a:solidFill>
                   <a:srgbClr val="7030A0"/>
                 </a:solidFill>
               </a:rPr>
               <a:t>UniquePersonList</a:t>
             </a:r>
-            <a:endParaRPr lang="en-SG" sz="1050" dirty="0">
-              <a:solidFill>
-                <a:srgbClr val="7030A0"/>
-              </a:solidFill>
-            </a:endParaRPr>
-          </a:p>
-        </p:txBody>
-      </p:sp>
-      <p:sp>
-        <p:nvSpPr>
-          <p:cNvPr id="51" name="Flowchart: Decision 96"/>
+          </a:p>
+        </p:txBody>
+      </p:sp>
+      <p:sp>
+        <p:nvSpPr>
+          <p:cNvPr id="18" name="Decision 17">
+            <a:extLst>
+              <a:ext uri="{FF2B5EF4-FFF2-40B4-BE49-F238E27FC236}">
+                <a16:creationId xmlns:a16="http://schemas.microsoft.com/office/drawing/2014/main" id="{A6A8FCA3-06AE-8F4E-9542-6588F6FF7CAD}"/>
+              </a:ext>
+            </a:extLst>
+          </p:cNvPr>
           <p:cNvSpPr/>
           <p:nvPr/>
         </p:nvSpPr>
         <p:spPr>
           <a:xfrm>
-            <a:off x="3201752" y="3437911"/>
-            <a:ext cx="236048" cy="173380"/>
+            <a:off x="5641041" y="3238500"/>
+            <a:ext cx="457200" cy="228600"/>
           </a:xfrm>
           <a:prstGeom prst="flowChartDecision">
             <a:avLst/>
           </a:prstGeom>
-          <a:solidFill>
-            <a:srgbClr val="7030A0"/>
-          </a:solidFill>
-          <a:ln w="19050">
-            <a:solidFill>
-              <a:srgbClr val="7030A0"/>
-            </a:solidFill>
-          </a:ln>
-          <a:effectLst/>
+          <a:noFill/>
         </p:spPr>
         <p:style>
-          <a:lnRef idx="1">
-            <a:schemeClr val="accent6"/>
+          <a:lnRef idx="2">
+            <a:schemeClr val="accent4">
+              <a:shade val="50000"/>
+            </a:schemeClr>
           </a:lnRef>
-          <a:fillRef idx="2">
-            <a:schemeClr val="accent6"/>
+          <a:fillRef idx="1">
+            <a:schemeClr val="accent4"/>
           </a:fillRef>
-          <a:effectRef idx="1">
-            <a:schemeClr val="accent6"/>
+          <a:effectRef idx="0">
+            <a:schemeClr val="accent4"/>
           </a:effectRef>
           <a:fontRef idx="minor">
-            <a:schemeClr val="dk1"/>
+            <a:schemeClr val="lt1"/>
           </a:fontRef>
         </p:style>
         <p:txBody>
@@ -3597,84 +4069,109 @@
           <a:lstStyle/>
           <a:p>
             <a:pPr algn="ctr"/>
-            <a:endParaRPr lang="en-US" sz="1050"/>
+            <a:endParaRPr lang="en-US"/>
           </a:p>
         </p:txBody>
       </p:sp>
       <p:cxnSp>
         <p:nvCxnSpPr>
-          <p:cNvPr id="30" name="Elbow Connector 29"/>
+          <p:cNvPr id="19" name="Straight Arrow Connector 18">
+            <a:extLst>
+              <a:ext uri="{FF2B5EF4-FFF2-40B4-BE49-F238E27FC236}">
+                <a16:creationId xmlns:a16="http://schemas.microsoft.com/office/drawing/2014/main" id="{977BF4D3-5AC5-894E-8019-4CA1A5EFE2BD}"/>
+              </a:ext>
+            </a:extLst>
+          </p:cNvPr>
           <p:cNvCxnSpPr>
-            <a:stCxn id="51" idx="3"/>
-            <a:endCxn id="49" idx="1"/>
+            <a:cxnSpLocks/>
           </p:cNvCxnSpPr>
           <p:nvPr/>
         </p:nvCxnSpPr>
         <p:spPr>
           <a:xfrm>
-            <a:off x="3437800" y="3524601"/>
-            <a:ext cx="292915" cy="1923"/>
-          </a:xfrm>
-          <a:prstGeom prst="bentConnector3">
+            <a:off x="6098241" y="3352800"/>
+            <a:ext cx="381000" cy="0"/>
+          </a:xfrm>
+          <a:prstGeom prst="straightConnector1">
             <a:avLst/>
           </a:prstGeom>
-          <a:ln w="19050">
-            <a:solidFill>
-              <a:srgbClr val="7030A0"/>
-            </a:solidFill>
-            <a:headEnd type="none" w="med" len="med"/>
-            <a:tailEnd type="arrow" w="med" len="med"/>
+          <a:ln w="25400">
+            <a:tailEnd type="triangle"/>
           </a:ln>
-          <a:effectLst/>
         </p:spPr>
         <p:style>
           <a:lnRef idx="1">
-            <a:schemeClr val="accent2"/>
+            <a:schemeClr val="accent4"/>
           </a:lnRef>
-          <a:fillRef idx="2">
-            <a:schemeClr val="accent2"/>
+          <a:fillRef idx="0">
+            <a:schemeClr val="accent4"/>
           </a:fillRef>
-          <a:effectRef idx="1">
-            <a:schemeClr val="accent2"/>
+          <a:effectRef idx="0">
+            <a:schemeClr val="accent4"/>
           </a:effectRef>
           <a:fontRef idx="minor">
-            <a:schemeClr val="dk1"/>
+            <a:schemeClr val="tx1"/>
           </a:fontRef>
         </p:style>
       </p:cxnSp>
       <p:sp>
         <p:nvSpPr>
-          <p:cNvPr id="62" name="Rectangle 8"/>
+          <p:cNvPr id="21" name="Rectangle 20">
+            <a:extLst>
+              <a:ext uri="{FF2B5EF4-FFF2-40B4-BE49-F238E27FC236}">
+                <a16:creationId xmlns:a16="http://schemas.microsoft.com/office/drawing/2014/main" id="{126AF36D-E4F2-6341-9931-8CC141802E5E}"/>
+              </a:ext>
+            </a:extLst>
+          </p:cNvPr>
           <p:cNvSpPr/>
           <p:nvPr/>
         </p:nvSpPr>
         <p:spPr>
           <a:xfrm>
-            <a:off x="5282183" y="3347776"/>
-            <a:ext cx="711705" cy="346760"/>
+            <a:off x="6479240" y="3200400"/>
+            <a:ext cx="759759" cy="304800"/>
           </a:xfrm>
           <a:prstGeom prst="rect">
             <a:avLst/>
           </a:prstGeom>
-          <a:ln w="19050">
-            <a:solidFill>
-              <a:srgbClr val="7030A0"/>
-            </a:solidFill>
-          </a:ln>
-          <a:effectLst/>
+          <a:gradFill>
+            <a:gsLst>
+              <a:gs pos="0">
+                <a:schemeClr val="accent4">
+                  <a:tint val="50000"/>
+                  <a:satMod val="300000"/>
+                </a:schemeClr>
+              </a:gs>
+              <a:gs pos="35000">
+                <a:schemeClr val="accent4">
+                  <a:tint val="37000"/>
+                  <a:satMod val="300000"/>
+                </a:schemeClr>
+              </a:gs>
+              <a:gs pos="100000">
+                <a:schemeClr val="accent4">
+                  <a:tint val="15000"/>
+                  <a:satMod val="350000"/>
+                </a:schemeClr>
+              </a:gs>
+            </a:gsLst>
+            <a:lin ang="16200000" scaled="1"/>
+          </a:gradFill>
         </p:spPr>
         <p:style>
-          <a:lnRef idx="1">
-            <a:schemeClr val="accent4"/>
+          <a:lnRef idx="2">
+            <a:schemeClr val="accent4">
+              <a:shade val="50000"/>
+            </a:schemeClr>
           </a:lnRef>
-          <a:fillRef idx="2">
+          <a:fillRef idx="1">
             <a:schemeClr val="accent4"/>
           </a:fillRef>
-          <a:effectRef idx="1">
+          <a:effectRef idx="0">
             <a:schemeClr val="accent4"/>
           </a:effectRef>
           <a:fontRef idx="minor">
-            <a:schemeClr val="dk1"/>
+            <a:schemeClr val="lt1"/>
           </a:fontRef>
         </p:style>
         <p:txBody>
@@ -3690,48 +4187,44 @@
               </a:rPr>
               <a:t>Customer</a:t>
             </a:r>
-            <a:endParaRPr lang="en-SG" sz="1050" dirty="0">
-              <a:solidFill>
-                <a:srgbClr val="7030A0"/>
-              </a:solidFill>
-            </a:endParaRPr>
-          </a:p>
-        </p:txBody>
-      </p:sp>
-      <p:sp>
-        <p:nvSpPr>
-          <p:cNvPr id="63" name="Flowchart: Decision 96"/>
+          </a:p>
+        </p:txBody>
+      </p:sp>
+      <p:sp>
+        <p:nvSpPr>
+          <p:cNvPr id="22" name="Decision 21">
+            <a:extLst>
+              <a:ext uri="{FF2B5EF4-FFF2-40B4-BE49-F238E27FC236}">
+                <a16:creationId xmlns:a16="http://schemas.microsoft.com/office/drawing/2014/main" id="{20287D14-8F62-C447-B034-A1C5BE74195C}"/>
+              </a:ext>
+            </a:extLst>
+          </p:cNvPr>
           <p:cNvSpPr/>
           <p:nvPr/>
         </p:nvSpPr>
         <p:spPr>
           <a:xfrm>
-            <a:off x="4886966" y="3430775"/>
-            <a:ext cx="236048" cy="173380"/>
+            <a:off x="7238999" y="3238500"/>
+            <a:ext cx="457200" cy="228600"/>
           </a:xfrm>
           <a:prstGeom prst="flowChartDecision">
             <a:avLst/>
           </a:prstGeom>
-          <a:noFill/>
-          <a:ln w="19050">
-            <a:solidFill>
-              <a:srgbClr val="7030A0"/>
-            </a:solidFill>
-          </a:ln>
-          <a:effectLst/>
         </p:spPr>
         <p:style>
-          <a:lnRef idx="1">
-            <a:schemeClr val="accent6"/>
+          <a:lnRef idx="2">
+            <a:schemeClr val="accent4">
+              <a:shade val="50000"/>
+            </a:schemeClr>
           </a:lnRef>
-          <a:fillRef idx="2">
-            <a:schemeClr val="accent6"/>
+          <a:fillRef idx="1">
+            <a:schemeClr val="accent4"/>
           </a:fillRef>
-          <a:effectRef idx="1">
-            <a:schemeClr val="accent6"/>
+          <a:effectRef idx="0">
+            <a:schemeClr val="accent4"/>
           </a:effectRef>
           <a:fontRef idx="minor">
-            <a:schemeClr val="dk1"/>
+            <a:schemeClr val="lt1"/>
           </a:fontRef>
         </p:style>
         <p:txBody>
@@ -3739,85 +4232,423 @@
           <a:lstStyle/>
           <a:p>
             <a:pPr algn="ctr"/>
-            <a:endParaRPr lang="en-US" sz="1050"/>
+            <a:endParaRPr lang="en-US"/>
           </a:p>
         </p:txBody>
       </p:sp>
       <p:cxnSp>
         <p:nvCxnSpPr>
-          <p:cNvPr id="64" name="Elbow Connector 63"/>
+          <p:cNvPr id="23" name="Straight Arrow Connector 22">
+            <a:extLst>
+              <a:ext uri="{FF2B5EF4-FFF2-40B4-BE49-F238E27FC236}">
+                <a16:creationId xmlns:a16="http://schemas.microsoft.com/office/drawing/2014/main" id="{1E10F61F-DE82-AA44-8740-ACEF5DAF0393}"/>
+              </a:ext>
+            </a:extLst>
+          </p:cNvPr>
           <p:cNvCxnSpPr>
             <a:cxnSpLocks/>
-            <a:stCxn id="63" idx="3"/>
-            <a:endCxn id="62" idx="1"/>
           </p:cNvCxnSpPr>
           <p:nvPr/>
         </p:nvCxnSpPr>
         <p:spPr>
           <a:xfrm>
-            <a:off x="5123014" y="3517465"/>
-            <a:ext cx="159169" cy="3691"/>
-          </a:xfrm>
-          <a:prstGeom prst="bentConnector3">
+            <a:off x="7696199" y="3352800"/>
+            <a:ext cx="228601" cy="0"/>
+          </a:xfrm>
+          <a:prstGeom prst="straightConnector1">
             <a:avLst/>
           </a:prstGeom>
-          <a:ln w="19050">
-            <a:solidFill>
-              <a:srgbClr val="7030A0"/>
-            </a:solidFill>
-            <a:headEnd type="none" w="med" len="med"/>
-            <a:tailEnd type="arrow" w="med" len="med"/>
+          <a:ln w="25400">
+            <a:tailEnd type="triangle"/>
           </a:ln>
-          <a:effectLst/>
         </p:spPr>
         <p:style>
           <a:lnRef idx="1">
-            <a:schemeClr val="accent2"/>
+            <a:schemeClr val="accent4"/>
           </a:lnRef>
-          <a:fillRef idx="2">
-            <a:schemeClr val="accent2"/>
+          <a:fillRef idx="0">
+            <a:schemeClr val="accent4"/>
           </a:fillRef>
-          <a:effectRef idx="1">
-            <a:schemeClr val="accent2"/>
+          <a:effectRef idx="0">
+            <a:schemeClr val="accent4"/>
           </a:effectRef>
           <a:fontRef idx="minor">
-            <a:schemeClr val="dk1"/>
+            <a:schemeClr val="tx1"/>
           </a:fontRef>
         </p:style>
       </p:cxnSp>
       <p:sp>
         <p:nvSpPr>
-          <p:cNvPr id="76" name="Rectangle 8"/>
+          <p:cNvPr id="25" name="Rectangle 24">
+            <a:extLst>
+              <a:ext uri="{FF2B5EF4-FFF2-40B4-BE49-F238E27FC236}">
+                <a16:creationId xmlns:a16="http://schemas.microsoft.com/office/drawing/2014/main" id="{738AF85A-F1E5-094B-98C6-9F38CE6FB282}"/>
+              </a:ext>
+            </a:extLst>
+          </p:cNvPr>
           <p:cNvSpPr/>
           <p:nvPr/>
         </p:nvSpPr>
         <p:spPr>
           <a:xfrm>
-            <a:off x="6680903" y="3053948"/>
-            <a:ext cx="708186" cy="285783"/>
+            <a:off x="7924800" y="3200400"/>
+            <a:ext cx="1066800" cy="304800"/>
           </a:xfrm>
           <a:prstGeom prst="rect">
             <a:avLst/>
           </a:prstGeom>
-          <a:ln w="19050">
-            <a:solidFill>
-              <a:srgbClr val="7030A0"/>
-            </a:solidFill>
-          </a:ln>
-          <a:effectLst/>
+          <a:gradFill>
+            <a:gsLst>
+              <a:gs pos="0">
+                <a:schemeClr val="accent4">
+                  <a:tint val="50000"/>
+                  <a:satMod val="300000"/>
+                </a:schemeClr>
+              </a:gs>
+              <a:gs pos="35000">
+                <a:schemeClr val="accent4">
+                  <a:tint val="37000"/>
+                  <a:satMod val="300000"/>
+                </a:schemeClr>
+              </a:gs>
+              <a:gs pos="100000">
+                <a:schemeClr val="accent4">
+                  <a:tint val="15000"/>
+                  <a:satMod val="350000"/>
+                </a:schemeClr>
+              </a:gs>
+            </a:gsLst>
+            <a:lin ang="16200000" scaled="1"/>
+          </a:gradFill>
+        </p:spPr>
+        <p:style>
+          <a:lnRef idx="2">
+            <a:schemeClr val="accent4">
+              <a:shade val="50000"/>
+            </a:schemeClr>
+          </a:lnRef>
+          <a:fillRef idx="1">
+            <a:schemeClr val="accent4"/>
+          </a:fillRef>
+          <a:effectRef idx="0">
+            <a:schemeClr val="accent4"/>
+          </a:effectRef>
+          <a:fontRef idx="minor">
+            <a:schemeClr val="lt1"/>
+          </a:fontRef>
+        </p:style>
+        <p:txBody>
+          <a:bodyPr rtlCol="0" anchor="ctr"/>
+          <a:lstStyle/>
+          <a:p>
+            <a:pPr algn="ctr"/>
+            <a:r>
+              <a:rPr lang="en-US" sz="1050" dirty="0">
+                <a:solidFill>
+                  <a:srgbClr val="7030A0"/>
+                </a:solidFill>
+              </a:rPr>
+              <a:t>DateOfBirth</a:t>
+            </a:r>
+          </a:p>
+        </p:txBody>
+      </p:sp>
+      <p:cxnSp>
+        <p:nvCxnSpPr>
+          <p:cNvPr id="27" name="Straight Connector 26">
+            <a:extLst>
+              <a:ext uri="{FF2B5EF4-FFF2-40B4-BE49-F238E27FC236}">
+                <a16:creationId xmlns:a16="http://schemas.microsoft.com/office/drawing/2014/main" id="{98C8316B-9D04-AA4B-A59C-6709C5FF4B83}"/>
+              </a:ext>
+            </a:extLst>
+          </p:cNvPr>
+          <p:cNvCxnSpPr>
+            <a:cxnSpLocks/>
+          </p:cNvCxnSpPr>
+          <p:nvPr/>
+        </p:nvCxnSpPr>
+        <p:spPr>
+          <a:xfrm>
+            <a:off x="7772400" y="2557929"/>
+            <a:ext cx="0" cy="2014071"/>
+          </a:xfrm>
+          <a:prstGeom prst="line">
+            <a:avLst/>
+          </a:prstGeom>
+          <a:ln w="25400"/>
         </p:spPr>
         <p:style>
           <a:lnRef idx="1">
             <a:schemeClr val="accent4"/>
           </a:lnRef>
-          <a:fillRef idx="2">
+          <a:fillRef idx="0">
             <a:schemeClr val="accent4"/>
           </a:fillRef>
-          <a:effectRef idx="1">
+          <a:effectRef idx="0">
             <a:schemeClr val="accent4"/>
           </a:effectRef>
           <a:fontRef idx="minor">
-            <a:schemeClr val="dk1"/>
+            <a:schemeClr val="tx1"/>
+          </a:fontRef>
+        </p:style>
+      </p:cxnSp>
+      <p:cxnSp>
+        <p:nvCxnSpPr>
+          <p:cNvPr id="30" name="Straight Arrow Connector 29">
+            <a:extLst>
+              <a:ext uri="{FF2B5EF4-FFF2-40B4-BE49-F238E27FC236}">
+                <a16:creationId xmlns:a16="http://schemas.microsoft.com/office/drawing/2014/main" id="{B44379C4-4ED4-F64D-9A7D-B82BA171D13B}"/>
+              </a:ext>
+            </a:extLst>
+          </p:cNvPr>
+          <p:cNvCxnSpPr>
+            <a:cxnSpLocks/>
+          </p:cNvCxnSpPr>
+          <p:nvPr/>
+        </p:nvCxnSpPr>
+        <p:spPr>
+          <a:xfrm>
+            <a:off x="7772400" y="2971800"/>
+            <a:ext cx="152400" cy="0"/>
+          </a:xfrm>
+          <a:prstGeom prst="straightConnector1">
+            <a:avLst/>
+          </a:prstGeom>
+          <a:ln w="25400">
+            <a:tailEnd type="triangle"/>
+          </a:ln>
+        </p:spPr>
+        <p:style>
+          <a:lnRef idx="1">
+            <a:schemeClr val="accent4"/>
+          </a:lnRef>
+          <a:fillRef idx="0">
+            <a:schemeClr val="accent4"/>
+          </a:fillRef>
+          <a:effectRef idx="0">
+            <a:schemeClr val="accent4"/>
+          </a:effectRef>
+          <a:fontRef idx="minor">
+            <a:schemeClr val="tx1"/>
+          </a:fontRef>
+        </p:style>
+      </p:cxnSp>
+      <p:sp>
+        <p:nvSpPr>
+          <p:cNvPr id="32" name="Rectangle 31">
+            <a:extLst>
+              <a:ext uri="{FF2B5EF4-FFF2-40B4-BE49-F238E27FC236}">
+                <a16:creationId xmlns:a16="http://schemas.microsoft.com/office/drawing/2014/main" id="{0E2D5AFD-6E56-6546-AC86-3F787E942872}"/>
+              </a:ext>
+            </a:extLst>
+          </p:cNvPr>
+          <p:cNvSpPr/>
+          <p:nvPr/>
+        </p:nvSpPr>
+        <p:spPr>
+          <a:xfrm>
+            <a:off x="7924800" y="2808941"/>
+            <a:ext cx="1066800" cy="304800"/>
+          </a:xfrm>
+          <a:prstGeom prst="rect">
+            <a:avLst/>
+          </a:prstGeom>
+          <a:gradFill>
+            <a:gsLst>
+              <a:gs pos="0">
+                <a:schemeClr val="accent4">
+                  <a:tint val="50000"/>
+                  <a:satMod val="300000"/>
+                </a:schemeClr>
+              </a:gs>
+              <a:gs pos="35000">
+                <a:schemeClr val="accent4">
+                  <a:tint val="37000"/>
+                  <a:satMod val="300000"/>
+                </a:schemeClr>
+              </a:gs>
+              <a:gs pos="100000">
+                <a:schemeClr val="accent4">
+                  <a:tint val="15000"/>
+                  <a:satMod val="350000"/>
+                </a:schemeClr>
+              </a:gs>
+            </a:gsLst>
+            <a:lin ang="16200000" scaled="1"/>
+          </a:gradFill>
+        </p:spPr>
+        <p:style>
+          <a:lnRef idx="2">
+            <a:schemeClr val="accent4">
+              <a:shade val="50000"/>
+            </a:schemeClr>
+          </a:lnRef>
+          <a:fillRef idx="1">
+            <a:schemeClr val="accent4"/>
+          </a:fillRef>
+          <a:effectRef idx="0">
+            <a:schemeClr val="accent4"/>
+          </a:effectRef>
+          <a:fontRef idx="minor">
+            <a:schemeClr val="lt1"/>
+          </a:fontRef>
+        </p:style>
+        <p:txBody>
+          <a:bodyPr rtlCol="0" anchor="ctr"/>
+          <a:lstStyle/>
+          <a:p>
+            <a:pPr algn="ctr"/>
+            <a:r>
+              <a:rPr lang="en-US" sz="1050" dirty="0">
+                <a:solidFill>
+                  <a:srgbClr val="7030A0"/>
+                </a:solidFill>
+              </a:rPr>
+              <a:t>Phone</a:t>
+            </a:r>
+          </a:p>
+        </p:txBody>
+      </p:sp>
+      <p:cxnSp>
+        <p:nvCxnSpPr>
+          <p:cNvPr id="33" name="Straight Arrow Connector 32">
+            <a:extLst>
+              <a:ext uri="{FF2B5EF4-FFF2-40B4-BE49-F238E27FC236}">
+                <a16:creationId xmlns:a16="http://schemas.microsoft.com/office/drawing/2014/main" id="{09F86057-CF6F-C44D-813C-664DFE792DFB}"/>
+              </a:ext>
+            </a:extLst>
+          </p:cNvPr>
+          <p:cNvCxnSpPr>
+            <a:cxnSpLocks/>
+          </p:cNvCxnSpPr>
+          <p:nvPr/>
+        </p:nvCxnSpPr>
+        <p:spPr>
+          <a:xfrm>
+            <a:off x="7772400" y="2557929"/>
+            <a:ext cx="152400" cy="0"/>
+          </a:xfrm>
+          <a:prstGeom prst="straightConnector1">
+            <a:avLst/>
+          </a:prstGeom>
+          <a:ln w="25400">
+            <a:tailEnd type="triangle"/>
+          </a:ln>
+        </p:spPr>
+        <p:style>
+          <a:lnRef idx="1">
+            <a:schemeClr val="accent4"/>
+          </a:lnRef>
+          <a:fillRef idx="0">
+            <a:schemeClr val="accent4"/>
+          </a:fillRef>
+          <a:effectRef idx="0">
+            <a:schemeClr val="accent4"/>
+          </a:effectRef>
+          <a:fontRef idx="minor">
+            <a:schemeClr val="tx1"/>
+          </a:fontRef>
+        </p:style>
+      </p:cxnSp>
+      <p:cxnSp>
+        <p:nvCxnSpPr>
+          <p:cNvPr id="34" name="Straight Arrow Connector 33">
+            <a:extLst>
+              <a:ext uri="{FF2B5EF4-FFF2-40B4-BE49-F238E27FC236}">
+                <a16:creationId xmlns:a16="http://schemas.microsoft.com/office/drawing/2014/main" id="{84911ABB-A753-3B4F-B376-5D1C932716B4}"/>
+              </a:ext>
+            </a:extLst>
+          </p:cNvPr>
+          <p:cNvCxnSpPr>
+            <a:cxnSpLocks/>
+          </p:cNvCxnSpPr>
+          <p:nvPr/>
+        </p:nvCxnSpPr>
+        <p:spPr>
+          <a:xfrm>
+            <a:off x="7772399" y="3810000"/>
+            <a:ext cx="152400" cy="0"/>
+          </a:xfrm>
+          <a:prstGeom prst="straightConnector1">
+            <a:avLst/>
+          </a:prstGeom>
+          <a:ln w="25400">
+            <a:tailEnd type="triangle"/>
+          </a:ln>
+        </p:spPr>
+        <p:style>
+          <a:lnRef idx="1">
+            <a:schemeClr val="accent4"/>
+          </a:lnRef>
+          <a:fillRef idx="0">
+            <a:schemeClr val="accent4"/>
+          </a:fillRef>
+          <a:effectRef idx="0">
+            <a:schemeClr val="accent4"/>
+          </a:effectRef>
+          <a:fontRef idx="minor">
+            <a:schemeClr val="tx1"/>
+          </a:fontRef>
+        </p:style>
+      </p:cxnSp>
+      <p:sp>
+        <p:nvSpPr>
+          <p:cNvPr id="36" name="Rectangle 35">
+            <a:extLst>
+              <a:ext uri="{FF2B5EF4-FFF2-40B4-BE49-F238E27FC236}">
+                <a16:creationId xmlns:a16="http://schemas.microsoft.com/office/drawing/2014/main" id="{A8F78322-5B31-1C4D-8D08-9658C75997B1}"/>
+              </a:ext>
+            </a:extLst>
+          </p:cNvPr>
+          <p:cNvSpPr/>
+          <p:nvPr/>
+        </p:nvSpPr>
+        <p:spPr>
+          <a:xfrm>
+            <a:off x="7924800" y="2405529"/>
+            <a:ext cx="1066800" cy="304800"/>
+          </a:xfrm>
+          <a:prstGeom prst="rect">
+            <a:avLst/>
+          </a:prstGeom>
+          <a:gradFill>
+            <a:gsLst>
+              <a:gs pos="0">
+                <a:schemeClr val="accent4">
+                  <a:tint val="50000"/>
+                  <a:satMod val="300000"/>
+                </a:schemeClr>
+              </a:gs>
+              <a:gs pos="35000">
+                <a:schemeClr val="accent4">
+                  <a:tint val="37000"/>
+                  <a:satMod val="300000"/>
+                </a:schemeClr>
+              </a:gs>
+              <a:gs pos="100000">
+                <a:schemeClr val="accent4">
+                  <a:tint val="15000"/>
+                  <a:satMod val="350000"/>
+                </a:schemeClr>
+              </a:gs>
+            </a:gsLst>
+            <a:lin ang="16200000" scaled="1"/>
+          </a:gradFill>
+        </p:spPr>
+        <p:style>
+          <a:lnRef idx="2">
+            <a:schemeClr val="accent4">
+              <a:shade val="50000"/>
+            </a:schemeClr>
+          </a:lnRef>
+          <a:fillRef idx="1">
+            <a:schemeClr val="accent4"/>
+          </a:fillRef>
+          <a:effectRef idx="0">
+            <a:schemeClr val="accent4"/>
+          </a:effectRef>
+          <a:fontRef idx="minor">
+            <a:schemeClr val="lt1"/>
           </a:fontRef>
         </p:style>
         <p:txBody>
@@ -3833,231 +4664,67 @@
               </a:rPr>
               <a:t>Name</a:t>
             </a:r>
-            <a:endParaRPr lang="en-SG" sz="1050" dirty="0">
-              <a:solidFill>
-                <a:srgbClr val="7030A0"/>
-              </a:solidFill>
-            </a:endParaRPr>
-          </a:p>
-        </p:txBody>
-      </p:sp>
-      <p:sp>
-        <p:nvSpPr>
-          <p:cNvPr id="78" name="Flowchart: Decision 96"/>
+          </a:p>
+        </p:txBody>
+      </p:sp>
+      <p:sp>
+        <p:nvSpPr>
+          <p:cNvPr id="37" name="Rectangle 36">
+            <a:extLst>
+              <a:ext uri="{FF2B5EF4-FFF2-40B4-BE49-F238E27FC236}">
+                <a16:creationId xmlns:a16="http://schemas.microsoft.com/office/drawing/2014/main" id="{46550DA8-DBD4-6941-8EC4-8228C1335892}"/>
+              </a:ext>
+            </a:extLst>
+          </p:cNvPr>
           <p:cNvSpPr/>
           <p:nvPr/>
         </p:nvSpPr>
         <p:spPr>
           <a:xfrm>
-            <a:off x="6010453" y="3437911"/>
-            <a:ext cx="236048" cy="173380"/>
-          </a:xfrm>
-          <a:prstGeom prst="flowChartDecision">
-            <a:avLst/>
-          </a:prstGeom>
-          <a:solidFill>
-            <a:srgbClr val="7030A0"/>
-          </a:solidFill>
-          <a:ln w="19050">
-            <a:solidFill>
-              <a:srgbClr val="7030A0"/>
-            </a:solidFill>
-          </a:ln>
-          <a:effectLst/>
-        </p:spPr>
-        <p:style>
-          <a:lnRef idx="1">
-            <a:schemeClr val="accent6"/>
-          </a:lnRef>
-          <a:fillRef idx="2">
-            <a:schemeClr val="accent6"/>
-          </a:fillRef>
-          <a:effectRef idx="1">
-            <a:schemeClr val="accent6"/>
-          </a:effectRef>
-          <a:fontRef idx="minor">
-            <a:schemeClr val="dk1"/>
-          </a:fontRef>
-        </p:style>
-        <p:txBody>
-          <a:bodyPr rtlCol="0" anchor="ctr"/>
-          <a:lstStyle/>
-          <a:p>
-            <a:pPr algn="ctr"/>
-            <a:endParaRPr lang="en-US" sz="1050"/>
-          </a:p>
-        </p:txBody>
-      </p:sp>
-      <p:cxnSp>
-        <p:nvCxnSpPr>
-          <p:cNvPr id="79" name="Elbow Connector 78"/>
-          <p:cNvCxnSpPr>
-            <a:cxnSpLocks/>
-          </p:cNvCxnSpPr>
-          <p:nvPr/>
-        </p:nvCxnSpPr>
-        <p:spPr>
-          <a:xfrm flipV="1">
-            <a:off x="6246501" y="3196531"/>
-            <a:ext cx="434402" cy="327761"/>
-          </a:xfrm>
-          <a:prstGeom prst="bentConnector3">
-            <a:avLst/>
-          </a:prstGeom>
-          <a:ln w="19050">
-            <a:solidFill>
-              <a:srgbClr val="7030A0"/>
-            </a:solidFill>
-            <a:headEnd type="none" w="med" len="med"/>
-            <a:tailEnd type="arrow" w="med" len="med"/>
-          </a:ln>
-          <a:effectLst/>
-        </p:spPr>
-        <p:style>
-          <a:lnRef idx="1">
-            <a:schemeClr val="accent2"/>
-          </a:lnRef>
-          <a:fillRef idx="2">
-            <a:schemeClr val="accent2"/>
-          </a:fillRef>
-          <a:effectRef idx="1">
-            <a:schemeClr val="accent2"/>
-          </a:effectRef>
-          <a:fontRef idx="minor">
-            <a:schemeClr val="dk1"/>
-          </a:fontRef>
-        </p:style>
-      </p:cxnSp>
-      <p:sp>
-        <p:nvSpPr>
-          <p:cNvPr id="80" name="Rectangle 8"/>
-          <p:cNvSpPr/>
-          <p:nvPr/>
-        </p:nvSpPr>
-        <p:spPr>
-          <a:xfrm>
-            <a:off x="6680903" y="3376926"/>
-            <a:ext cx="708186" cy="285783"/>
+            <a:off x="7924800" y="3617259"/>
+            <a:ext cx="1066800" cy="304800"/>
           </a:xfrm>
           <a:prstGeom prst="rect">
             <a:avLst/>
           </a:prstGeom>
-          <a:ln w="19050">
-            <a:solidFill>
-              <a:srgbClr val="7030A0"/>
-            </a:solidFill>
-          </a:ln>
-          <a:effectLst/>
+          <a:gradFill>
+            <a:gsLst>
+              <a:gs pos="0">
+                <a:schemeClr val="accent4">
+                  <a:tint val="50000"/>
+                  <a:satMod val="300000"/>
+                </a:schemeClr>
+              </a:gs>
+              <a:gs pos="35000">
+                <a:schemeClr val="accent4">
+                  <a:tint val="37000"/>
+                  <a:satMod val="300000"/>
+                </a:schemeClr>
+              </a:gs>
+              <a:gs pos="100000">
+                <a:schemeClr val="accent4">
+                  <a:tint val="15000"/>
+                  <a:satMod val="350000"/>
+                </a:schemeClr>
+              </a:gs>
+            </a:gsLst>
+            <a:lin ang="16200000" scaled="1"/>
+          </a:gradFill>
         </p:spPr>
         <p:style>
-          <a:lnRef idx="1">
-            <a:schemeClr val="accent4"/>
+          <a:lnRef idx="2">
+            <a:schemeClr val="accent4">
+              <a:shade val="50000"/>
+            </a:schemeClr>
           </a:lnRef>
-          <a:fillRef idx="2">
+          <a:fillRef idx="1">
             <a:schemeClr val="accent4"/>
           </a:fillRef>
-          <a:effectRef idx="1">
+          <a:effectRef idx="0">
             <a:schemeClr val="accent4"/>
           </a:effectRef>
           <a:fontRef idx="minor">
-            <a:schemeClr val="dk1"/>
-          </a:fontRef>
-        </p:style>
-        <p:txBody>
-          <a:bodyPr rtlCol="0" anchor="ctr"/>
-          <a:lstStyle/>
-          <a:p>
-            <a:pPr algn="ctr"/>
-            <a:r>
-              <a:rPr lang="en-US" sz="1050" dirty="0">
-                <a:solidFill>
-                  <a:srgbClr val="7030A0"/>
-                </a:solidFill>
-              </a:rPr>
-              <a:t>Phone</a:t>
-            </a:r>
-            <a:endParaRPr lang="en-SG" sz="1050" dirty="0">
-              <a:solidFill>
-                <a:srgbClr val="7030A0"/>
-              </a:solidFill>
-            </a:endParaRPr>
-          </a:p>
-        </p:txBody>
-      </p:sp>
-      <p:cxnSp>
-        <p:nvCxnSpPr>
-          <p:cNvPr id="81" name="Elbow Connector 80"/>
-          <p:cNvCxnSpPr>
-            <a:stCxn id="78" idx="3"/>
-            <a:endCxn id="80" idx="1"/>
-          </p:cNvCxnSpPr>
-          <p:nvPr/>
-        </p:nvCxnSpPr>
-        <p:spPr>
-          <a:xfrm flipV="1">
-            <a:off x="6246501" y="3519818"/>
-            <a:ext cx="434402" cy="4783"/>
-          </a:xfrm>
-          <a:prstGeom prst="bentConnector3">
-            <a:avLst/>
-          </a:prstGeom>
-          <a:ln w="19050">
-            <a:solidFill>
-              <a:srgbClr val="7030A0"/>
-            </a:solidFill>
-            <a:headEnd type="none" w="med" len="med"/>
-            <a:tailEnd type="arrow" w="med" len="med"/>
-          </a:ln>
-          <a:effectLst/>
-        </p:spPr>
-        <p:style>
-          <a:lnRef idx="1">
-            <a:schemeClr val="accent2"/>
-          </a:lnRef>
-          <a:fillRef idx="2">
-            <a:schemeClr val="accent2"/>
-          </a:fillRef>
-          <a:effectRef idx="1">
-            <a:schemeClr val="accent2"/>
-          </a:effectRef>
-          <a:fontRef idx="minor">
-            <a:schemeClr val="dk1"/>
-          </a:fontRef>
-        </p:style>
-      </p:cxnSp>
-      <p:sp>
-        <p:nvSpPr>
-          <p:cNvPr id="83" name="Rectangle 8"/>
-          <p:cNvSpPr/>
-          <p:nvPr/>
-        </p:nvSpPr>
-        <p:spPr>
-          <a:xfrm>
-            <a:off x="6680903" y="3699904"/>
-            <a:ext cx="708186" cy="285783"/>
-          </a:xfrm>
-          <a:prstGeom prst="rect">
-            <a:avLst/>
-          </a:prstGeom>
-          <a:ln w="19050">
-            <a:solidFill>
-              <a:srgbClr val="7030A0"/>
-            </a:solidFill>
-          </a:ln>
-          <a:effectLst/>
-        </p:spPr>
-        <p:style>
-          <a:lnRef idx="1">
-            <a:schemeClr val="accent4"/>
-          </a:lnRef>
-          <a:fillRef idx="2">
-            <a:schemeClr val="accent4"/>
-          </a:fillRef>
-          <a:effectRef idx="1">
-            <a:schemeClr val="accent4"/>
-          </a:effectRef>
-          <a:fontRef idx="minor">
-            <a:schemeClr val="dk1"/>
+            <a:schemeClr val="lt1"/>
           </a:fontRef>
         </p:style>
         <p:txBody>
@@ -4073,88 +4740,225 @@
               </a:rPr>
               <a:t>Email</a:t>
             </a:r>
-            <a:endParaRPr lang="en-SG" sz="1050" dirty="0">
-              <a:solidFill>
-                <a:srgbClr val="7030A0"/>
-              </a:solidFill>
-            </a:endParaRPr>
+          </a:p>
+        </p:txBody>
+      </p:sp>
+      <p:sp>
+        <p:nvSpPr>
+          <p:cNvPr id="38" name="Rectangle 37">
+            <a:extLst>
+              <a:ext uri="{FF2B5EF4-FFF2-40B4-BE49-F238E27FC236}">
+                <a16:creationId xmlns:a16="http://schemas.microsoft.com/office/drawing/2014/main" id="{3DCF4537-6F8C-3242-BCCC-8D35A311EC03}"/>
+              </a:ext>
+            </a:extLst>
+          </p:cNvPr>
+          <p:cNvSpPr/>
+          <p:nvPr/>
+        </p:nvSpPr>
+        <p:spPr>
+          <a:xfrm>
+            <a:off x="7924799" y="4017683"/>
+            <a:ext cx="1066801" cy="304800"/>
+          </a:xfrm>
+          <a:prstGeom prst="rect">
+            <a:avLst/>
+          </a:prstGeom>
+          <a:gradFill>
+            <a:gsLst>
+              <a:gs pos="0">
+                <a:schemeClr val="accent4">
+                  <a:tint val="50000"/>
+                  <a:satMod val="300000"/>
+                </a:schemeClr>
+              </a:gs>
+              <a:gs pos="35000">
+                <a:schemeClr val="accent4">
+                  <a:tint val="37000"/>
+                  <a:satMod val="300000"/>
+                </a:schemeClr>
+              </a:gs>
+              <a:gs pos="100000">
+                <a:schemeClr val="accent4">
+                  <a:tint val="15000"/>
+                  <a:satMod val="350000"/>
+                </a:schemeClr>
+              </a:gs>
+            </a:gsLst>
+            <a:lin ang="16200000" scaled="1"/>
+          </a:gradFill>
+        </p:spPr>
+        <p:style>
+          <a:lnRef idx="2">
+            <a:schemeClr val="accent4">
+              <a:shade val="50000"/>
+            </a:schemeClr>
+          </a:lnRef>
+          <a:fillRef idx="1">
+            <a:schemeClr val="accent4"/>
+          </a:fillRef>
+          <a:effectRef idx="0">
+            <a:schemeClr val="accent4"/>
+          </a:effectRef>
+          <a:fontRef idx="minor">
+            <a:schemeClr val="lt1"/>
+          </a:fontRef>
+        </p:style>
+        <p:txBody>
+          <a:bodyPr rtlCol="0" anchor="ctr"/>
+          <a:lstStyle/>
+          <a:p>
+            <a:pPr algn="ctr"/>
+            <a:r>
+              <a:rPr lang="en-US" sz="1050" dirty="0">
+                <a:solidFill>
+                  <a:srgbClr val="7030A0"/>
+                </a:solidFill>
+              </a:rPr>
+              <a:t>IdentificationNo</a:t>
+            </a:r>
           </a:p>
         </p:txBody>
       </p:sp>
       <p:cxnSp>
         <p:nvCxnSpPr>
-          <p:cNvPr id="84" name="Elbow Connector 83"/>
+          <p:cNvPr id="40" name="Straight Arrow Connector 39">
+            <a:extLst>
+              <a:ext uri="{FF2B5EF4-FFF2-40B4-BE49-F238E27FC236}">
+                <a16:creationId xmlns:a16="http://schemas.microsoft.com/office/drawing/2014/main" id="{CDFDF90A-08C2-CB49-85A6-A83E3A60915E}"/>
+              </a:ext>
+            </a:extLst>
+          </p:cNvPr>
           <p:cNvCxnSpPr>
-            <a:stCxn id="78" idx="3"/>
-            <a:endCxn id="83" idx="1"/>
+            <a:cxnSpLocks/>
           </p:cNvCxnSpPr>
           <p:nvPr/>
         </p:nvCxnSpPr>
         <p:spPr>
           <a:xfrm>
-            <a:off x="6246501" y="3524601"/>
-            <a:ext cx="434402" cy="318195"/>
-          </a:xfrm>
-          <a:prstGeom prst="bentConnector3">
+            <a:off x="7772399" y="4191000"/>
+            <a:ext cx="152400" cy="0"/>
+          </a:xfrm>
+          <a:prstGeom prst="straightConnector1">
             <a:avLst/>
           </a:prstGeom>
-          <a:ln w="19050">
-            <a:solidFill>
-              <a:srgbClr val="7030A0"/>
-            </a:solidFill>
-            <a:headEnd type="none" w="med" len="med"/>
-            <a:tailEnd type="arrow" w="med" len="med"/>
+          <a:ln w="25400">
+            <a:tailEnd type="triangle"/>
           </a:ln>
-          <a:effectLst/>
         </p:spPr>
         <p:style>
           <a:lnRef idx="1">
-            <a:schemeClr val="accent2"/>
+            <a:schemeClr val="accent4"/>
           </a:lnRef>
-          <a:fillRef idx="2">
-            <a:schemeClr val="accent2"/>
+          <a:fillRef idx="0">
+            <a:schemeClr val="accent4"/>
           </a:fillRef>
-          <a:effectRef idx="1">
-            <a:schemeClr val="accent2"/>
+          <a:effectRef idx="0">
+            <a:schemeClr val="accent4"/>
           </a:effectRef>
           <a:fontRef idx="minor">
-            <a:schemeClr val="dk1"/>
+            <a:schemeClr val="tx1"/>
           </a:fontRef>
         </p:style>
       </p:cxnSp>
-      <p:sp>
-        <p:nvSpPr>
-          <p:cNvPr id="85" name="Rectangle 8"/>
+      <p:cxnSp>
+        <p:nvCxnSpPr>
+          <p:cNvPr id="41" name="Straight Arrow Connector 40">
+            <a:extLst>
+              <a:ext uri="{FF2B5EF4-FFF2-40B4-BE49-F238E27FC236}">
+                <a16:creationId xmlns:a16="http://schemas.microsoft.com/office/drawing/2014/main" id="{439CB6F7-CA78-1C4B-B7CB-2F3FFDD4E39B}"/>
+              </a:ext>
+            </a:extLst>
+          </p:cNvPr>
+          <p:cNvCxnSpPr>
+            <a:cxnSpLocks/>
+          </p:cNvCxnSpPr>
+          <p:nvPr/>
+        </p:nvCxnSpPr>
+        <p:spPr>
+          <a:xfrm>
+            <a:off x="7772399" y="4572000"/>
+            <a:ext cx="152400" cy="0"/>
+          </a:xfrm>
+          <a:prstGeom prst="straightConnector1">
+            <a:avLst/>
+          </a:prstGeom>
+          <a:ln w="25400">
+            <a:tailEnd type="triangle"/>
+          </a:ln>
+        </p:spPr>
+        <p:style>
+          <a:lnRef idx="1">
+            <a:schemeClr val="accent4"/>
+          </a:lnRef>
+          <a:fillRef idx="0">
+            <a:schemeClr val="accent4"/>
+          </a:fillRef>
+          <a:effectRef idx="0">
+            <a:schemeClr val="accent4"/>
+          </a:effectRef>
+          <a:fontRef idx="minor">
+            <a:schemeClr val="tx1"/>
+          </a:fontRef>
+        </p:style>
+      </p:cxnSp>
+      <p:sp>
+        <p:nvSpPr>
+          <p:cNvPr id="43" name="Rectangle 42">
+            <a:extLst>
+              <a:ext uri="{FF2B5EF4-FFF2-40B4-BE49-F238E27FC236}">
+                <a16:creationId xmlns:a16="http://schemas.microsoft.com/office/drawing/2014/main" id="{F32AF866-9B31-7147-9791-A54AD69A3433}"/>
+              </a:ext>
+            </a:extLst>
+          </p:cNvPr>
           <p:cNvSpPr/>
           <p:nvPr/>
         </p:nvSpPr>
         <p:spPr>
           <a:xfrm>
-            <a:off x="6680903" y="4022881"/>
-            <a:ext cx="708186" cy="285783"/>
+            <a:off x="7924799" y="4418107"/>
+            <a:ext cx="1066800" cy="304800"/>
           </a:xfrm>
           <a:prstGeom prst="rect">
             <a:avLst/>
           </a:prstGeom>
-          <a:ln w="19050">
-            <a:solidFill>
-              <a:srgbClr val="7030A0"/>
-            </a:solidFill>
-          </a:ln>
-          <a:effectLst/>
+          <a:gradFill>
+            <a:gsLst>
+              <a:gs pos="0">
+                <a:schemeClr val="accent4">
+                  <a:tint val="50000"/>
+                  <a:satMod val="300000"/>
+                </a:schemeClr>
+              </a:gs>
+              <a:gs pos="35000">
+                <a:schemeClr val="accent4">
+                  <a:tint val="37000"/>
+                  <a:satMod val="300000"/>
+                </a:schemeClr>
+              </a:gs>
+              <a:gs pos="100000">
+                <a:schemeClr val="accent4">
+                  <a:tint val="15000"/>
+                  <a:satMod val="350000"/>
+                </a:schemeClr>
+              </a:gs>
+            </a:gsLst>
+            <a:lin ang="16200000" scaled="1"/>
+          </a:gradFill>
         </p:spPr>
         <p:style>
-          <a:lnRef idx="1">
-            <a:schemeClr val="accent4"/>
+          <a:lnRef idx="2">
+            <a:schemeClr val="accent4">
+              <a:shade val="50000"/>
+            </a:schemeClr>
           </a:lnRef>
-          <a:fillRef idx="2">
+          <a:fillRef idx="1">
             <a:schemeClr val="accent4"/>
           </a:fillRef>
-          <a:effectRef idx="1">
+          <a:effectRef idx="0">
             <a:schemeClr val="accent4"/>
           </a:effectRef>
           <a:fontRef idx="minor">
-            <a:schemeClr val="dk1"/>
+            <a:schemeClr val="lt1"/>
           </a:fontRef>
         </p:style>
         <p:txBody>
@@ -4170,66 +4974,25 @@
               </a:rPr>
               <a:t>Address</a:t>
             </a:r>
-            <a:endParaRPr lang="en-SG" sz="1050" dirty="0">
-              <a:solidFill>
-                <a:srgbClr val="7030A0"/>
-              </a:solidFill>
-            </a:endParaRPr>
-          </a:p>
-        </p:txBody>
-      </p:sp>
-      <p:cxnSp>
-        <p:nvCxnSpPr>
-          <p:cNvPr id="86" name="Elbow Connector 85"/>
-          <p:cNvCxnSpPr>
-            <a:cxnSpLocks/>
-            <a:stCxn id="78" idx="3"/>
-            <a:endCxn id="85" idx="1"/>
-          </p:cNvCxnSpPr>
-          <p:nvPr/>
-        </p:nvCxnSpPr>
-        <p:spPr>
-          <a:xfrm>
-            <a:off x="6246501" y="3524601"/>
-            <a:ext cx="434402" cy="641172"/>
-          </a:xfrm>
-          <a:prstGeom prst="bentConnector3">
-            <a:avLst/>
-          </a:prstGeom>
-          <a:ln w="19050">
-            <a:solidFill>
-              <a:srgbClr val="7030A0"/>
-            </a:solidFill>
-            <a:headEnd type="none" w="med" len="med"/>
-            <a:tailEnd type="arrow" w="med" len="med"/>
-          </a:ln>
-          <a:effectLst/>
-        </p:spPr>
-        <p:style>
-          <a:lnRef idx="1">
-            <a:schemeClr val="accent2"/>
-          </a:lnRef>
-          <a:fillRef idx="2">
-            <a:schemeClr val="accent2"/>
-          </a:fillRef>
-          <a:effectRef idx="1">
-            <a:schemeClr val="accent2"/>
-          </a:effectRef>
-          <a:fontRef idx="minor">
-            <a:schemeClr val="dk1"/>
-          </a:fontRef>
-        </p:style>
-      </p:cxnSp>
-      <p:sp>
-        <p:nvSpPr>
-          <p:cNvPr id="54" name="TextBox 53"/>
+          </a:p>
+        </p:txBody>
+      </p:sp>
+      <p:sp>
+        <p:nvSpPr>
+          <p:cNvPr id="5" name="TextBox 4">
+            <a:extLst>
+              <a:ext uri="{FF2B5EF4-FFF2-40B4-BE49-F238E27FC236}">
+                <a16:creationId xmlns:a16="http://schemas.microsoft.com/office/drawing/2014/main" id="{6A9751FA-1C29-0F4F-A706-AE872BDE8C5F}"/>
+              </a:ext>
+            </a:extLst>
+          </p:cNvPr>
           <p:cNvSpPr txBox="1"/>
           <p:nvPr/>
         </p:nvSpPr>
         <p:spPr>
-          <a:xfrm>
-            <a:off x="3293478" y="3548574"/>
-            <a:ext cx="189257" cy="178683"/>
+          <a:xfrm flipH="1">
+            <a:off x="3467100" y="2405529"/>
+            <a:ext cx="228600" cy="338554"/>
           </a:xfrm>
           <a:prstGeom prst="rect">
             <a:avLst/>
@@ -4237,38 +5000,38 @@
           <a:noFill/>
         </p:spPr>
         <p:txBody>
-          <a:bodyPr wrap="square" lIns="0" tIns="0" rIns="0" bIns="0" rtlCol="0">
-            <a:noAutofit/>
+          <a:bodyPr wrap="square" rtlCol="0">
+            <a:spAutoFit/>
           </a:bodyPr>
           <a:lstStyle/>
           <a:p>
-            <a:pPr algn="ctr"/>
-            <a:r>
-              <a:rPr lang="en-US" sz="1100" dirty="0">
+            <a:r>
+              <a:rPr lang="en-US" sz="1600" dirty="0">
                 <a:solidFill>
                   <a:srgbClr val="7030A0"/>
                 </a:solidFill>
               </a:rPr>
               <a:t>1</a:t>
             </a:r>
-            <a:endParaRPr lang="en-SG" sz="1100" dirty="0">
-              <a:solidFill>
-                <a:srgbClr val="7030A0"/>
-              </a:solidFill>
-            </a:endParaRPr>
-          </a:p>
-        </p:txBody>
-      </p:sp>
-      <p:sp>
-        <p:nvSpPr>
-          <p:cNvPr id="61" name="TextBox 60"/>
+          </a:p>
+        </p:txBody>
+      </p:sp>
+      <p:sp>
+        <p:nvSpPr>
+          <p:cNvPr id="31" name="TextBox 30">
+            <a:extLst>
+              <a:ext uri="{FF2B5EF4-FFF2-40B4-BE49-F238E27FC236}">
+                <a16:creationId xmlns:a16="http://schemas.microsoft.com/office/drawing/2014/main" id="{DB0ABA92-5E58-944D-944A-28C9D324FD30}"/>
+              </a:ext>
+            </a:extLst>
+          </p:cNvPr>
           <p:cNvSpPr txBox="1"/>
           <p:nvPr/>
         </p:nvSpPr>
         <p:spPr>
-          <a:xfrm>
-            <a:off x="5103762" y="3587627"/>
-            <a:ext cx="189257" cy="178683"/>
+          <a:xfrm flipH="1">
+            <a:off x="3581400" y="3352800"/>
+            <a:ext cx="228600" cy="338554"/>
           </a:xfrm>
           <a:prstGeom prst="rect">
             <a:avLst/>
@@ -4276,34 +5039,67 @@
           <a:noFill/>
         </p:spPr>
         <p:txBody>
-          <a:bodyPr wrap="square" lIns="0" tIns="0" rIns="0" bIns="0" rtlCol="0">
-            <a:noAutofit/>
+          <a:bodyPr wrap="square" rtlCol="0">
+            <a:spAutoFit/>
           </a:bodyPr>
           <a:lstStyle/>
           <a:p>
-            <a:pPr algn="ctr"/>
-            <a:r>
-              <a:rPr lang="en-US" sz="1100" dirty="0">
+            <a:r>
+              <a:rPr lang="en-US" sz="1600" dirty="0">
+                <a:solidFill>
+                  <a:srgbClr val="7030A0"/>
+                </a:solidFill>
+              </a:rPr>
+              <a:t>1</a:t>
+            </a:r>
+          </a:p>
+        </p:txBody>
+      </p:sp>
+      <p:sp>
+        <p:nvSpPr>
+          <p:cNvPr id="35" name="TextBox 34">
+            <a:extLst>
+              <a:ext uri="{FF2B5EF4-FFF2-40B4-BE49-F238E27FC236}">
+                <a16:creationId xmlns:a16="http://schemas.microsoft.com/office/drawing/2014/main" id="{543CDA6B-17F3-524B-B616-C69D45753544}"/>
+              </a:ext>
+            </a:extLst>
+          </p:cNvPr>
+          <p:cNvSpPr txBox="1"/>
+          <p:nvPr/>
+        </p:nvSpPr>
+        <p:spPr>
+          <a:xfrm flipH="1">
+            <a:off x="6095999" y="2638501"/>
+            <a:ext cx="228600" cy="338554"/>
+          </a:xfrm>
+          <a:prstGeom prst="rect">
+            <a:avLst/>
+          </a:prstGeom>
+          <a:noFill/>
+        </p:spPr>
+        <p:txBody>
+          <a:bodyPr wrap="square" rtlCol="0">
+            <a:spAutoFit/>
+          </a:bodyPr>
+          <a:lstStyle/>
+          <a:p>
+            <a:r>
+              <a:rPr lang="en-US" sz="1600" dirty="0">
                 <a:solidFill>
                   <a:srgbClr val="7030A0"/>
                 </a:solidFill>
               </a:rPr>
               <a:t>*</a:t>
             </a:r>
-            <a:endParaRPr lang="en-SG" sz="1100" dirty="0">
-              <a:solidFill>
-                <a:srgbClr val="7030A0"/>
-              </a:solidFill>
-            </a:endParaRPr>
-          </a:p>
-        </p:txBody>
-      </p:sp>
-      <p:sp>
-        <p:nvSpPr>
-          <p:cNvPr id="52" name="Rectangle 8">
+          </a:p>
+        </p:txBody>
+      </p:sp>
+      <p:sp>
+        <p:nvSpPr>
+          <p:cNvPr id="6" name="Rectangle 5">
             <a:extLst>
               <a:ext uri="{FF2B5EF4-FFF2-40B4-BE49-F238E27FC236}">
-                <a16:creationId xmlns:a16="http://schemas.microsoft.com/office/drawing/2014/main" id="{ABDCDBD2-131A-4B66-A2F2-43BBEE82C773}"/>
+                <a16:creationId xmlns:a16="http://schemas.microsoft.com/office/drawing/2014/main" id="{7B74962B-8FEA-A44B-8B7F-542CD4E284ED}"/>
               </a:ext>
             </a:extLst>
           </p:cNvPr>
@@ -4312,504 +5108,162 @@
         </p:nvSpPr>
         <p:spPr>
           <a:xfrm>
-            <a:off x="3724378" y="2696571"/>
-            <a:ext cx="1156969" cy="285783"/>
+            <a:off x="6698728" y="2744408"/>
+            <a:ext cx="216423" cy="369332"/>
           </a:xfrm>
           <a:prstGeom prst="rect">
             <a:avLst/>
           </a:prstGeom>
-          <a:ln w="19050">
-            <a:solidFill>
-              <a:srgbClr val="7030A0"/>
-            </a:solidFill>
-          </a:ln>
-          <a:effectLst/>
-        </p:spPr>
-        <p:style>
-          <a:lnRef idx="1">
-            <a:schemeClr val="accent4"/>
-          </a:lnRef>
-          <a:fillRef idx="2">
-            <a:schemeClr val="accent4"/>
-          </a:fillRef>
-          <a:effectRef idx="1">
-            <a:schemeClr val="accent4"/>
-          </a:effectRef>
-          <a:fontRef idx="minor">
-            <a:schemeClr val="dk1"/>
-          </a:fontRef>
-        </p:style>
-        <p:txBody>
-          <a:bodyPr rtlCol="0" anchor="ctr"/>
-          <a:lstStyle/>
-          <a:p>
-            <a:pPr algn="ctr"/>
-            <a:r>
-              <a:rPr lang="en-US" sz="1050" dirty="0" err="1">
+        </p:spPr>
+        <p:txBody>
+          <a:bodyPr wrap="square">
+            <a:spAutoFit/>
+          </a:bodyPr>
+          <a:lstStyle/>
+          <a:p>
+            <a:r>
+              <a:rPr lang="en-US" dirty="0">
                 <a:solidFill>
                   <a:srgbClr val="7030A0"/>
                 </a:solidFill>
               </a:rPr>
-              <a:t>UniqueTagList</a:t>
-            </a:r>
-            <a:endParaRPr lang="en-SG" sz="1050" dirty="0">
-              <a:solidFill>
-                <a:srgbClr val="7030A0"/>
-              </a:solidFill>
-            </a:endParaRPr>
+              <a:t>*</a:t>
+            </a:r>
+            <a:endParaRPr lang="en-US" dirty="0"/>
+          </a:p>
+        </p:txBody>
+      </p:sp>
+      <p:sp>
+        <p:nvSpPr>
+          <p:cNvPr id="39" name="Decision 38">
+            <a:extLst>
+              <a:ext uri="{FF2B5EF4-FFF2-40B4-BE49-F238E27FC236}">
+                <a16:creationId xmlns:a16="http://schemas.microsoft.com/office/drawing/2014/main" id="{0F4F0A09-4EAC-D749-ABE3-68F56F397C7D}"/>
+              </a:ext>
+            </a:extLst>
+          </p:cNvPr>
+          <p:cNvSpPr/>
+          <p:nvPr/>
+        </p:nvSpPr>
+        <p:spPr>
+          <a:xfrm rot="16200000" flipV="1">
+            <a:off x="6652605" y="3037855"/>
+            <a:ext cx="184666" cy="151771"/>
+          </a:xfrm>
+          <a:prstGeom prst="flowChartDecision">
+            <a:avLst/>
+          </a:prstGeom>
+          <a:noFill/>
+        </p:spPr>
+        <p:style>
+          <a:lnRef idx="2">
+            <a:schemeClr val="accent4">
+              <a:shade val="50000"/>
+            </a:schemeClr>
+          </a:lnRef>
+          <a:fillRef idx="1">
+            <a:schemeClr val="accent4"/>
+          </a:fillRef>
+          <a:effectRef idx="0">
+            <a:schemeClr val="accent4"/>
+          </a:effectRef>
+          <a:fontRef idx="minor">
+            <a:schemeClr val="lt1"/>
+          </a:fontRef>
+        </p:style>
+        <p:txBody>
+          <a:bodyPr rtlCol="0" anchor="ctr"/>
+          <a:lstStyle/>
+          <a:p>
+            <a:pPr algn="ctr"/>
+            <a:endParaRPr lang="en-US"/>
           </a:p>
         </p:txBody>
       </p:sp>
       <p:cxnSp>
         <p:nvCxnSpPr>
-          <p:cNvPr id="53" name="Elbow Connector 78">
+          <p:cNvPr id="9" name="Straight Arrow Connector 8">
             <a:extLst>
               <a:ext uri="{FF2B5EF4-FFF2-40B4-BE49-F238E27FC236}">
-                <a16:creationId xmlns:a16="http://schemas.microsoft.com/office/drawing/2014/main" id="{B97967F8-618A-448B-81FD-CDFD4AF0EC64}"/>
+                <a16:creationId xmlns:a16="http://schemas.microsoft.com/office/drawing/2014/main" id="{FBBD3118-964F-A348-A4DD-C9C474E3A0E5}"/>
               </a:ext>
             </a:extLst>
           </p:cNvPr>
           <p:cNvCxnSpPr>
             <a:cxnSpLocks/>
-            <a:stCxn id="54" idx="0"/>
-            <a:endCxn id="52" idx="1"/>
           </p:cNvCxnSpPr>
           <p:nvPr/>
         </p:nvCxnSpPr>
         <p:spPr>
-          <a:xfrm rot="5400000" flipH="1" flipV="1">
-            <a:off x="3201687" y="3025884"/>
-            <a:ext cx="709111" cy="336271"/>
-          </a:xfrm>
-          <a:prstGeom prst="bentConnector2">
+          <a:xfrm flipV="1">
+            <a:off x="6744938" y="2826862"/>
+            <a:ext cx="1" cy="202008"/>
+          </a:xfrm>
+          <a:prstGeom prst="straightConnector1">
             <a:avLst/>
           </a:prstGeom>
-          <a:ln w="19050">
-            <a:solidFill>
-              <a:srgbClr val="7030A0"/>
-            </a:solidFill>
-            <a:headEnd type="none" w="med" len="med"/>
-            <a:tailEnd type="arrow" w="med" len="med"/>
+          <a:ln w="25400">
+            <a:tailEnd type="triangle"/>
           </a:ln>
-          <a:effectLst/>
         </p:spPr>
         <p:style>
           <a:lnRef idx="1">
-            <a:schemeClr val="accent2"/>
+            <a:schemeClr val="accent4"/>
           </a:lnRef>
-          <a:fillRef idx="2">
-            <a:schemeClr val="accent2"/>
+          <a:fillRef idx="0">
+            <a:schemeClr val="accent4"/>
           </a:fillRef>
-          <a:effectRef idx="1">
-            <a:schemeClr val="accent2"/>
+          <a:effectRef idx="0">
+            <a:schemeClr val="accent4"/>
           </a:effectRef>
           <a:fontRef idx="minor">
-            <a:schemeClr val="dk1"/>
+            <a:schemeClr val="tx1"/>
           </a:fontRef>
         </p:style>
       </p:cxnSp>
       <p:sp>
         <p:nvSpPr>
-          <p:cNvPr id="50" name="TextBox 49">
+          <p:cNvPr id="42" name="Rectangle 41">
             <a:extLst>
               <a:ext uri="{FF2B5EF4-FFF2-40B4-BE49-F238E27FC236}">
-                <a16:creationId xmlns:a16="http://schemas.microsoft.com/office/drawing/2014/main" id="{B3FA9D57-880F-49C4-AD0B-A64E30D6F403}"/>
+                <a16:creationId xmlns:a16="http://schemas.microsoft.com/office/drawing/2014/main" id="{1AE56F63-65EA-2B44-88E0-256CBEE62189}"/>
               </a:ext>
             </a:extLst>
           </p:cNvPr>
-          <p:cNvSpPr txBox="1"/>
+          <p:cNvSpPr/>
           <p:nvPr/>
         </p:nvSpPr>
         <p:spPr>
           <a:xfrm>
-            <a:off x="5682850" y="2920431"/>
-            <a:ext cx="189257" cy="178683"/>
+            <a:off x="6249657" y="3312429"/>
+            <a:ext cx="300082" cy="369332"/>
           </a:xfrm>
           <a:prstGeom prst="rect">
             <a:avLst/>
           </a:prstGeom>
-          <a:noFill/>
-        </p:spPr>
-        <p:txBody>
-          <a:bodyPr wrap="square" lIns="0" tIns="0" rIns="0" bIns="0" rtlCol="0">
-            <a:noAutofit/>
+        </p:spPr>
+        <p:txBody>
+          <a:bodyPr wrap="none">
+            <a:spAutoFit/>
           </a:bodyPr>
           <a:lstStyle/>
           <a:p>
-            <a:pPr algn="ctr"/>
-            <a:r>
-              <a:rPr lang="en-US" sz="1100" dirty="0">
+            <a:r>
+              <a:rPr lang="en-US" dirty="0">
                 <a:solidFill>
                   <a:srgbClr val="7030A0"/>
                 </a:solidFill>
               </a:rPr>
               <a:t>*</a:t>
             </a:r>
-            <a:endParaRPr lang="en-SG" sz="1100" dirty="0">
-              <a:solidFill>
-                <a:srgbClr val="7030A0"/>
-              </a:solidFill>
-            </a:endParaRPr>
-          </a:p>
-        </p:txBody>
-      </p:sp>
-      <p:sp>
-        <p:nvSpPr>
-          <p:cNvPr id="55" name="Flowchart: Decision 96">
-            <a:extLst>
-              <a:ext uri="{FF2B5EF4-FFF2-40B4-BE49-F238E27FC236}">
-                <a16:creationId xmlns:a16="http://schemas.microsoft.com/office/drawing/2014/main" id="{B9F96195-942D-4692-91B7-CF34229E7461}"/>
-              </a:ext>
-            </a:extLst>
-          </p:cNvPr>
-          <p:cNvSpPr/>
-          <p:nvPr/>
-        </p:nvSpPr>
-        <p:spPr>
-          <a:xfrm rot="16200000">
-            <a:off x="5521988" y="3154431"/>
-            <a:ext cx="236048" cy="173380"/>
-          </a:xfrm>
-          <a:prstGeom prst="flowChartDecision">
-            <a:avLst/>
-          </a:prstGeom>
-          <a:noFill/>
-          <a:ln w="19050">
-            <a:solidFill>
-              <a:srgbClr val="7030A0"/>
-            </a:solidFill>
-          </a:ln>
-          <a:effectLst/>
-        </p:spPr>
-        <p:style>
-          <a:lnRef idx="1">
-            <a:schemeClr val="accent6"/>
-          </a:lnRef>
-          <a:fillRef idx="2">
-            <a:schemeClr val="accent6"/>
-          </a:fillRef>
-          <a:effectRef idx="1">
-            <a:schemeClr val="accent6"/>
-          </a:effectRef>
-          <a:fontRef idx="minor">
-            <a:schemeClr val="dk1"/>
-          </a:fontRef>
-        </p:style>
-        <p:txBody>
-          <a:bodyPr rtlCol="0" anchor="ctr"/>
-          <a:lstStyle/>
-          <a:p>
-            <a:pPr algn="ctr"/>
-            <a:endParaRPr lang="en-US" sz="1050"/>
-          </a:p>
-        </p:txBody>
-      </p:sp>
-      <p:cxnSp>
-        <p:nvCxnSpPr>
-          <p:cNvPr id="59" name="Elbow Connector 63">
-            <a:extLst>
-              <a:ext uri="{FF2B5EF4-FFF2-40B4-BE49-F238E27FC236}">
-                <a16:creationId xmlns:a16="http://schemas.microsoft.com/office/drawing/2014/main" id="{E2D6A56C-A223-4236-A1F0-7EFEBA2FC940}"/>
-              </a:ext>
-            </a:extLst>
-          </p:cNvPr>
-          <p:cNvCxnSpPr>
-            <a:cxnSpLocks/>
-            <a:endCxn id="67" idx="1"/>
-          </p:cNvCxnSpPr>
-          <p:nvPr/>
-        </p:nvCxnSpPr>
-        <p:spPr>
-          <a:xfrm flipV="1">
-            <a:off x="4852786" y="2722716"/>
-            <a:ext cx="432916" cy="111294"/>
-          </a:xfrm>
-          <a:prstGeom prst="bentConnector3">
-            <a:avLst/>
-          </a:prstGeom>
-          <a:ln w="19050">
-            <a:solidFill>
-              <a:srgbClr val="7030A0"/>
-            </a:solidFill>
-            <a:headEnd type="none" w="med" len="med"/>
-            <a:tailEnd type="arrow" w="med" len="med"/>
-          </a:ln>
-          <a:effectLst/>
-        </p:spPr>
-        <p:style>
-          <a:lnRef idx="1">
-            <a:schemeClr val="accent2"/>
-          </a:lnRef>
-          <a:fillRef idx="2">
-            <a:schemeClr val="accent2"/>
-          </a:fillRef>
-          <a:effectRef idx="1">
-            <a:schemeClr val="accent2"/>
-          </a:effectRef>
-          <a:fontRef idx="minor">
-            <a:schemeClr val="dk1"/>
-          </a:fontRef>
-        </p:style>
-      </p:cxnSp>
-      <p:sp>
-        <p:nvSpPr>
-          <p:cNvPr id="67" name="Rectangle 8">
-            <a:extLst>
-              <a:ext uri="{FF2B5EF4-FFF2-40B4-BE49-F238E27FC236}">
-                <a16:creationId xmlns:a16="http://schemas.microsoft.com/office/drawing/2014/main" id="{36D68104-33BB-4C8F-B764-F3F0B25E592B}"/>
-              </a:ext>
-            </a:extLst>
-          </p:cNvPr>
-          <p:cNvSpPr/>
-          <p:nvPr/>
-        </p:nvSpPr>
-        <p:spPr>
-          <a:xfrm>
-            <a:off x="5285702" y="2549336"/>
-            <a:ext cx="708186" cy="346760"/>
-          </a:xfrm>
-          <a:prstGeom prst="rect">
-            <a:avLst/>
-          </a:prstGeom>
-          <a:ln w="19050">
-            <a:solidFill>
-              <a:srgbClr val="7030A0"/>
-            </a:solidFill>
-          </a:ln>
-          <a:effectLst/>
-        </p:spPr>
-        <p:style>
-          <a:lnRef idx="1">
-            <a:schemeClr val="accent4"/>
-          </a:lnRef>
-          <a:fillRef idx="2">
-            <a:schemeClr val="accent4"/>
-          </a:fillRef>
-          <a:effectRef idx="1">
-            <a:schemeClr val="accent4"/>
-          </a:effectRef>
-          <a:fontRef idx="minor">
-            <a:schemeClr val="dk1"/>
-          </a:fontRef>
-        </p:style>
-        <p:txBody>
-          <a:bodyPr rtlCol="0" anchor="ctr"/>
-          <a:lstStyle/>
-          <a:p>
-            <a:pPr algn="ctr"/>
-            <a:r>
-              <a:rPr lang="en-US" sz="1050" dirty="0">
-                <a:solidFill>
-                  <a:srgbClr val="7030A0"/>
-                </a:solidFill>
-              </a:rPr>
-              <a:t>Tag</a:t>
-            </a:r>
-            <a:endParaRPr lang="en-SG" sz="1050" dirty="0">
-              <a:solidFill>
-                <a:srgbClr val="7030A0"/>
-              </a:solidFill>
-            </a:endParaRPr>
-          </a:p>
-        </p:txBody>
-      </p:sp>
-      <p:sp>
-        <p:nvSpPr>
-          <p:cNvPr id="68" name="TextBox 67">
-            <a:extLst>
-              <a:ext uri="{FF2B5EF4-FFF2-40B4-BE49-F238E27FC236}">
-                <a16:creationId xmlns:a16="http://schemas.microsoft.com/office/drawing/2014/main" id="{18A2ABF0-4DA8-43EE-BACE-A737C4E4CFEC}"/>
-              </a:ext>
-            </a:extLst>
-          </p:cNvPr>
-          <p:cNvSpPr txBox="1"/>
-          <p:nvPr/>
-        </p:nvSpPr>
-        <p:spPr>
-          <a:xfrm>
-            <a:off x="5103762" y="2767724"/>
-            <a:ext cx="189257" cy="178683"/>
-          </a:xfrm>
-          <a:prstGeom prst="rect">
-            <a:avLst/>
-          </a:prstGeom>
-          <a:noFill/>
-        </p:spPr>
-        <p:txBody>
-          <a:bodyPr wrap="square" lIns="0" tIns="0" rIns="0" bIns="0" rtlCol="0">
-            <a:noAutofit/>
-          </a:bodyPr>
-          <a:lstStyle/>
-          <a:p>
-            <a:pPr algn="ctr"/>
-            <a:r>
-              <a:rPr lang="en-US" sz="1100" dirty="0">
-                <a:solidFill>
-                  <a:srgbClr val="7030A0"/>
-                </a:solidFill>
-              </a:rPr>
-              <a:t>*</a:t>
-            </a:r>
-            <a:endParaRPr lang="en-SG" sz="1100" dirty="0">
-              <a:solidFill>
-                <a:srgbClr val="7030A0"/>
-              </a:solidFill>
-            </a:endParaRPr>
-          </a:p>
-        </p:txBody>
-      </p:sp>
-      <p:sp>
-        <p:nvSpPr>
-          <p:cNvPr id="69" name="TextBox 68">
-            <a:extLst>
-              <a:ext uri="{FF2B5EF4-FFF2-40B4-BE49-F238E27FC236}">
-                <a16:creationId xmlns:a16="http://schemas.microsoft.com/office/drawing/2014/main" id="{8CF9406A-39C7-4163-8880-BB65541FC08E}"/>
-              </a:ext>
-            </a:extLst>
-          </p:cNvPr>
-          <p:cNvSpPr txBox="1"/>
-          <p:nvPr/>
-        </p:nvSpPr>
-        <p:spPr>
-          <a:xfrm>
-            <a:off x="3335606" y="2662682"/>
-            <a:ext cx="189257" cy="178683"/>
-          </a:xfrm>
-          <a:prstGeom prst="rect">
-            <a:avLst/>
-          </a:prstGeom>
-          <a:noFill/>
-        </p:spPr>
-        <p:txBody>
-          <a:bodyPr wrap="square" lIns="0" tIns="0" rIns="0" bIns="0" rtlCol="0">
-            <a:noAutofit/>
-          </a:bodyPr>
-          <a:lstStyle/>
-          <a:p>
-            <a:pPr algn="ctr"/>
-            <a:r>
-              <a:rPr lang="en-US" sz="1100" dirty="0">
-                <a:solidFill>
-                  <a:srgbClr val="7030A0"/>
-                </a:solidFill>
-              </a:rPr>
-              <a:t>1</a:t>
-            </a:r>
-            <a:endParaRPr lang="en-SG" sz="1100" dirty="0">
-              <a:solidFill>
-                <a:srgbClr val="7030A0"/>
-              </a:solidFill>
-            </a:endParaRPr>
-          </a:p>
-        </p:txBody>
-      </p:sp>
-      <p:sp>
-        <p:nvSpPr>
-          <p:cNvPr id="71" name="Flowchart: Decision 96">
-            <a:extLst>
-              <a:ext uri="{FF2B5EF4-FFF2-40B4-BE49-F238E27FC236}">
-                <a16:creationId xmlns:a16="http://schemas.microsoft.com/office/drawing/2014/main" id="{233007D4-EEA2-4CA6-ACFE-1517B654224E}"/>
-              </a:ext>
-            </a:extLst>
-          </p:cNvPr>
-          <p:cNvSpPr/>
-          <p:nvPr/>
-        </p:nvSpPr>
-        <p:spPr>
-          <a:xfrm>
-            <a:off x="4879835" y="2751791"/>
-            <a:ext cx="236048" cy="173380"/>
-          </a:xfrm>
-          <a:prstGeom prst="flowChartDecision">
-            <a:avLst/>
-          </a:prstGeom>
-          <a:solidFill>
-            <a:srgbClr val="7030A0"/>
-          </a:solidFill>
-          <a:ln w="19050">
-            <a:solidFill>
-              <a:srgbClr val="7030A0"/>
-            </a:solidFill>
-          </a:ln>
-          <a:effectLst/>
-        </p:spPr>
-        <p:style>
-          <a:lnRef idx="1">
-            <a:schemeClr val="accent6"/>
-          </a:lnRef>
-          <a:fillRef idx="2">
-            <a:schemeClr val="accent6"/>
-          </a:fillRef>
-          <a:effectRef idx="1">
-            <a:schemeClr val="accent6"/>
-          </a:effectRef>
-          <a:fontRef idx="minor">
-            <a:schemeClr val="dk1"/>
-          </a:fontRef>
-        </p:style>
-        <p:txBody>
-          <a:bodyPr rtlCol="0" anchor="ctr"/>
-          <a:lstStyle/>
-          <a:p>
-            <a:pPr algn="ctr"/>
-            <a:endParaRPr lang="en-US" sz="1050"/>
-          </a:p>
-        </p:txBody>
-      </p:sp>
-      <p:cxnSp>
-        <p:nvCxnSpPr>
-          <p:cNvPr id="72" name="Elbow Connector 78">
-            <a:extLst>
-              <a:ext uri="{FF2B5EF4-FFF2-40B4-BE49-F238E27FC236}">
-                <a16:creationId xmlns:a16="http://schemas.microsoft.com/office/drawing/2014/main" id="{D5DFB8C5-B0B0-46C1-967B-4449112ABD6F}"/>
-              </a:ext>
-            </a:extLst>
-          </p:cNvPr>
-          <p:cNvCxnSpPr>
-            <a:cxnSpLocks/>
-            <a:stCxn id="55" idx="3"/>
-            <a:endCxn id="67" idx="2"/>
-          </p:cNvCxnSpPr>
-          <p:nvPr/>
-        </p:nvCxnSpPr>
-        <p:spPr>
-          <a:xfrm rot="16200000" flipV="1">
-            <a:off x="5526404" y="3009488"/>
-            <a:ext cx="227001" cy="217"/>
-          </a:xfrm>
-          <a:prstGeom prst="bentConnector3">
-            <a:avLst>
-              <a:gd name="adj1" fmla="val 50000"/>
-            </a:avLst>
-          </a:prstGeom>
-          <a:ln w="19050">
-            <a:solidFill>
-              <a:srgbClr val="7030A0"/>
-            </a:solidFill>
-            <a:headEnd type="none" w="med" len="med"/>
-            <a:tailEnd type="arrow" w="med" len="med"/>
-          </a:ln>
-          <a:effectLst/>
-        </p:spPr>
-        <p:style>
-          <a:lnRef idx="1">
-            <a:schemeClr val="accent2"/>
-          </a:lnRef>
-          <a:fillRef idx="2">
-            <a:schemeClr val="accent2"/>
-          </a:fillRef>
-          <a:effectRef idx="1">
-            <a:schemeClr val="accent2"/>
-          </a:effectRef>
-          <a:fontRef idx="minor">
-            <a:schemeClr val="dk1"/>
-          </a:fontRef>
-        </p:style>
-      </p:cxnSp>
+            <a:endParaRPr lang="en-US" dirty="0"/>
+          </a:p>
+        </p:txBody>
+      </p:sp>
     </p:spTree>
     <p:extLst>
       <p:ext uri="{BB962C8B-B14F-4D97-AF65-F5344CB8AC3E}">
-        <p14:creationId xmlns:p14="http://schemas.microsoft.com/office/powerpoint/2010/main" val="2396968029"/>
+        <p14:creationId xmlns:p14="http://schemas.microsoft.com/office/powerpoint/2010/main" val="765942172"/>
       </p:ext>
     </p:extLst>
   </p:cSld>

</xml_diff>

<commit_message>
DG: updated logic, model, and storage sections
</commit_message>
<xml_diff>
--- a/docs/diagrams/ModelComponentClassBetterOopDiagram.pptx
+++ b/docs/diagrams/ModelComponentClassBetterOopDiagram.pptx
@@ -208,7 +208,7 @@
           <a:p>
             <a:fld id="{F5CC4B3F-88C1-4FFA-B1B6-F41C21DC6924}" type="datetimeFigureOut">
               <a:rPr lang="en-US" smtClean="0"/>
-              <a:t>12/5/2018</a:t>
+              <a:t>4/1/2019</a:t>
             </a:fld>
             <a:endParaRPr lang="en-US"/>
           </a:p>
@@ -654,7 +654,7 @@
           <a:p>
             <a:fld id="{78C97017-6FC3-485B-9764-EAC9E56C1D49}" type="datetimeFigureOut">
               <a:rPr lang="en-US" smtClean="0"/>
-              <a:t>12/5/2018</a:t>
+              <a:t>4/1/2019</a:t>
             </a:fld>
             <a:endParaRPr lang="en-US"/>
           </a:p>
@@ -822,7 +822,7 @@
           <a:p>
             <a:fld id="{78C97017-6FC3-485B-9764-EAC9E56C1D49}" type="datetimeFigureOut">
               <a:rPr lang="en-US" smtClean="0"/>
-              <a:t>12/5/2018</a:t>
+              <a:t>4/1/2019</a:t>
             </a:fld>
             <a:endParaRPr lang="en-US"/>
           </a:p>
@@ -1000,7 +1000,7 @@
           <a:p>
             <a:fld id="{78C97017-6FC3-485B-9764-EAC9E56C1D49}" type="datetimeFigureOut">
               <a:rPr lang="en-US" smtClean="0"/>
-              <a:t>12/5/2018</a:t>
+              <a:t>4/1/2019</a:t>
             </a:fld>
             <a:endParaRPr lang="en-US"/>
           </a:p>
@@ -1168,7 +1168,7 @@
           <a:p>
             <a:fld id="{78C97017-6FC3-485B-9764-EAC9E56C1D49}" type="datetimeFigureOut">
               <a:rPr lang="en-US" smtClean="0"/>
-              <a:t>12/5/2018</a:t>
+              <a:t>4/1/2019</a:t>
             </a:fld>
             <a:endParaRPr lang="en-US"/>
           </a:p>
@@ -1413,7 +1413,7 @@
           <a:p>
             <a:fld id="{78C97017-6FC3-485B-9764-EAC9E56C1D49}" type="datetimeFigureOut">
               <a:rPr lang="en-US" smtClean="0"/>
-              <a:t>12/5/2018</a:t>
+              <a:t>4/1/2019</a:t>
             </a:fld>
             <a:endParaRPr lang="en-US"/>
           </a:p>
@@ -1698,7 +1698,7 @@
           <a:p>
             <a:fld id="{78C97017-6FC3-485B-9764-EAC9E56C1D49}" type="datetimeFigureOut">
               <a:rPr lang="en-US" smtClean="0"/>
-              <a:t>12/5/2018</a:t>
+              <a:t>4/1/2019</a:t>
             </a:fld>
             <a:endParaRPr lang="en-US"/>
           </a:p>
@@ -2117,7 +2117,7 @@
           <a:p>
             <a:fld id="{78C97017-6FC3-485B-9764-EAC9E56C1D49}" type="datetimeFigureOut">
               <a:rPr lang="en-US" smtClean="0"/>
-              <a:t>12/5/2018</a:t>
+              <a:t>4/1/2019</a:t>
             </a:fld>
             <a:endParaRPr lang="en-US"/>
           </a:p>
@@ -2234,7 +2234,7 @@
           <a:p>
             <a:fld id="{78C97017-6FC3-485B-9764-EAC9E56C1D49}" type="datetimeFigureOut">
               <a:rPr lang="en-US" smtClean="0"/>
-              <a:t>12/5/2018</a:t>
+              <a:t>4/1/2019</a:t>
             </a:fld>
             <a:endParaRPr lang="en-US"/>
           </a:p>
@@ -2329,7 +2329,7 @@
           <a:p>
             <a:fld id="{78C97017-6FC3-485B-9764-EAC9E56C1D49}" type="datetimeFigureOut">
               <a:rPr lang="en-US" smtClean="0"/>
-              <a:t>12/5/2018</a:t>
+              <a:t>4/1/2019</a:t>
             </a:fld>
             <a:endParaRPr lang="en-US"/>
           </a:p>
@@ -2604,7 +2604,7 @@
           <a:p>
             <a:fld id="{78C97017-6FC3-485B-9764-EAC9E56C1D49}" type="datetimeFigureOut">
               <a:rPr lang="en-US" smtClean="0"/>
-              <a:t>12/5/2018</a:t>
+              <a:t>4/1/2019</a:t>
             </a:fld>
             <a:endParaRPr lang="en-US"/>
           </a:p>
@@ -2856,7 +2856,7 @@
           <a:p>
             <a:fld id="{78C97017-6FC3-485B-9764-EAC9E56C1D49}" type="datetimeFigureOut">
               <a:rPr lang="en-US" smtClean="0"/>
-              <a:t>12/5/2018</a:t>
+              <a:t>4/1/2019</a:t>
             </a:fld>
             <a:endParaRPr lang="en-US"/>
           </a:p>
@@ -3067,7 +3067,7 @@
           <a:p>
             <a:fld id="{78C97017-6FC3-485B-9764-EAC9E56C1D49}" type="datetimeFigureOut">
               <a:rPr lang="en-US" smtClean="0"/>
-              <a:t>12/5/2018</a:t>
+              <a:t>4/1/2019</a:t>
             </a:fld>
             <a:endParaRPr lang="en-US"/>
           </a:p>
@@ -3450,8 +3450,8 @@
         </p:nvSpPr>
         <p:spPr>
           <a:xfrm>
-            <a:off x="1754912" y="3324621"/>
-            <a:ext cx="1447688" cy="346760"/>
+            <a:off x="1588789" y="3324621"/>
+            <a:ext cx="1613811" cy="346760"/>
           </a:xfrm>
           <a:prstGeom prst="rect">
             <a:avLst/>
@@ -3488,7 +3488,7 @@
                   <a:srgbClr val="7030A0"/>
                 </a:solidFill>
               </a:rPr>
-              <a:t>VersionedAddressBook</a:t>
+              <a:t>VersionedFinanceTracker</a:t>
             </a:r>
             <a:endParaRPr lang="en-SG" sz="1050" dirty="0">
               <a:solidFill>
@@ -3544,7 +3544,7 @@
                   <a:srgbClr val="7030A0"/>
                 </a:solidFill>
               </a:rPr>
-              <a:t>UniquePersonList</a:t>
+              <a:t>UniqueRecordList</a:t>
             </a:r>
             <a:endParaRPr lang="en-SG" sz="1050" dirty="0">
               <a:solidFill>
@@ -3688,7 +3688,7 @@
                   <a:srgbClr val="7030A0"/>
                 </a:solidFill>
               </a:rPr>
-              <a:t>Person</a:t>
+              <a:t>Record</a:t>
             </a:r>
             <a:endParaRPr lang="en-SG" sz="1050" dirty="0">
               <a:solidFill>
@@ -3793,8 +3793,8 @@
         </p:nvSpPr>
         <p:spPr>
           <a:xfrm>
-            <a:off x="6680903" y="3053948"/>
-            <a:ext cx="708186" cy="285783"/>
+            <a:off x="6680902" y="3053948"/>
+            <a:ext cx="874309" cy="285783"/>
           </a:xfrm>
           <a:prstGeom prst="rect">
             <a:avLst/>
@@ -3936,8 +3936,8 @@
         </p:nvSpPr>
         <p:spPr>
           <a:xfrm>
-            <a:off x="6680903" y="3376926"/>
-            <a:ext cx="708186" cy="285783"/>
+            <a:off x="6680902" y="3376926"/>
+            <a:ext cx="862895" cy="285783"/>
           </a:xfrm>
           <a:prstGeom prst="rect">
             <a:avLst/>
@@ -3974,7 +3974,7 @@
                   <a:srgbClr val="7030A0"/>
                 </a:solidFill>
               </a:rPr>
-              <a:t>Phone</a:t>
+              <a:t>Amount</a:t>
             </a:r>
             <a:endParaRPr lang="en-SG" sz="1050" dirty="0">
               <a:solidFill>
@@ -3988,6 +3988,7 @@
         <p:nvCxnSpPr>
           <p:cNvPr id="81" name="Elbow Connector 80"/>
           <p:cNvCxnSpPr>
+            <a:cxnSpLocks/>
             <a:stCxn id="78" idx="3"/>
             <a:endCxn id="80" idx="1"/>
           </p:cNvCxnSpPr>
@@ -3996,7 +3997,7 @@
         <p:spPr>
           <a:xfrm flipV="1">
             <a:off x="6246501" y="3519818"/>
-            <a:ext cx="434402" cy="4783"/>
+            <a:ext cx="434401" cy="4783"/>
           </a:xfrm>
           <a:prstGeom prst="bentConnector3">
             <a:avLst/>
@@ -4034,7 +4035,7 @@
         <p:spPr>
           <a:xfrm>
             <a:off x="6680903" y="3699904"/>
-            <a:ext cx="708186" cy="285783"/>
+            <a:ext cx="862896" cy="285783"/>
           </a:xfrm>
           <a:prstGeom prst="rect">
             <a:avLst/>
@@ -4071,7 +4072,7 @@
                   <a:srgbClr val="7030A0"/>
                 </a:solidFill>
               </a:rPr>
-              <a:t>Email</a:t>
+              <a:t>Date</a:t>
             </a:r>
             <a:endParaRPr lang="en-SG" sz="1050" dirty="0">
               <a:solidFill>
@@ -4085,6 +4086,7 @@
         <p:nvCxnSpPr>
           <p:cNvPr id="84" name="Elbow Connector 83"/>
           <p:cNvCxnSpPr>
+            <a:cxnSpLocks/>
             <a:stCxn id="78" idx="3"/>
             <a:endCxn id="83" idx="1"/>
           </p:cNvCxnSpPr>
@@ -4130,8 +4132,8 @@
         </p:nvSpPr>
         <p:spPr>
           <a:xfrm>
-            <a:off x="6680903" y="4022881"/>
-            <a:ext cx="708186" cy="285783"/>
+            <a:off x="6680902" y="4022881"/>
+            <a:ext cx="862897" cy="285783"/>
           </a:xfrm>
           <a:prstGeom prst="rect">
             <a:avLst/>
@@ -4168,7 +4170,7 @@
                   <a:srgbClr val="7030A0"/>
                 </a:solidFill>
               </a:rPr>
-              <a:t>Address</a:t>
+              <a:t>Description</a:t>
             </a:r>
             <a:endParaRPr lang="en-SG" sz="1050" dirty="0">
               <a:solidFill>
@@ -4191,7 +4193,7 @@
         <p:spPr>
           <a:xfrm>
             <a:off x="6246501" y="3524601"/>
-            <a:ext cx="434402" cy="641172"/>
+            <a:ext cx="434401" cy="641172"/>
           </a:xfrm>
           <a:prstGeom prst="bentConnector3">
             <a:avLst/>
@@ -4345,14 +4347,14 @@
           <a:p>
             <a:pPr algn="ctr"/>
             <a:r>
-              <a:rPr lang="en-US" sz="1050" dirty="0" err="1">
+              <a:rPr lang="en-US" sz="900" dirty="0" err="1">
                 <a:solidFill>
                   <a:srgbClr val="7030A0"/>
                 </a:solidFill>
               </a:rPr>
-              <a:t>UniqueTagList</a:t>
-            </a:r>
-            <a:endParaRPr lang="en-SG" sz="1050" dirty="0">
+              <a:t>UniqueCategoryList</a:t>
+            </a:r>
+            <a:endParaRPr lang="en-SG" sz="900" dirty="0">
               <a:solidFill>
                 <a:srgbClr val="7030A0"/>
               </a:solidFill>
@@ -4603,7 +4605,7 @@
                   <a:srgbClr val="7030A0"/>
                 </a:solidFill>
               </a:rPr>
-              <a:t>Tag</a:t>
+              <a:t>Category</a:t>
             </a:r>
             <a:endParaRPr lang="en-SG" sz="1050" dirty="0">
               <a:solidFill>

</xml_diff>

<commit_message>
updated DG for rec
</commit_message>
<xml_diff>
--- a/docs/diagrams/ModelComponentClassBetterOopDiagram.pptx
+++ b/docs/diagrams/ModelComponentClassBetterOopDiagram.pptx
@@ -208,8 +208,7 @@
           <a:p>
             <a:fld id="{F5CC4B3F-88C1-4FFA-B1B6-F41C21DC6924}" type="datetimeFigureOut">
               <a:rPr lang="en-US" smtClean="0"/>
-              <a:pPr/>
-              <a:t>4/2/2019</a:t>
+              <a:t>12/5/2018</a:t>
             </a:fld>
             <a:endParaRPr lang="en-US"/>
           </a:p>
@@ -367,7 +366,6 @@
           <a:p>
             <a:fld id="{5A7AB025-77E3-4BD1-A2FD-B3183DBA47A3}" type="slidenum">
               <a:rPr lang="en-US" smtClean="0"/>
-              <a:pPr/>
               <a:t>‹#›</a:t>
             </a:fld>
             <a:endParaRPr lang="en-US"/>
@@ -656,8 +654,7 @@
           <a:p>
             <a:fld id="{78C97017-6FC3-485B-9764-EAC9E56C1D49}" type="datetimeFigureOut">
               <a:rPr lang="en-US" smtClean="0"/>
-              <a:pPr/>
-              <a:t>4/2/2019</a:t>
+              <a:t>12/5/2018</a:t>
             </a:fld>
             <a:endParaRPr lang="en-US"/>
           </a:p>
@@ -699,7 +696,6 @@
           <a:p>
             <a:fld id="{FB34683C-161B-4520-BF45-B179E228CF2A}" type="slidenum">
               <a:rPr lang="en-US" smtClean="0"/>
-              <a:pPr/>
               <a:t>‹#›</a:t>
             </a:fld>
             <a:endParaRPr lang="en-US"/>
@@ -826,8 +822,7 @@
           <a:p>
             <a:fld id="{78C97017-6FC3-485B-9764-EAC9E56C1D49}" type="datetimeFigureOut">
               <a:rPr lang="en-US" smtClean="0"/>
-              <a:pPr/>
-              <a:t>4/2/2019</a:t>
+              <a:t>12/5/2018</a:t>
             </a:fld>
             <a:endParaRPr lang="en-US"/>
           </a:p>
@@ -869,7 +864,6 @@
           <a:p>
             <a:fld id="{FB34683C-161B-4520-BF45-B179E228CF2A}" type="slidenum">
               <a:rPr lang="en-US" smtClean="0"/>
-              <a:pPr/>
               <a:t>‹#›</a:t>
             </a:fld>
             <a:endParaRPr lang="en-US"/>
@@ -1006,8 +1000,7 @@
           <a:p>
             <a:fld id="{78C97017-6FC3-485B-9764-EAC9E56C1D49}" type="datetimeFigureOut">
               <a:rPr lang="en-US" smtClean="0"/>
-              <a:pPr/>
-              <a:t>4/2/2019</a:t>
+              <a:t>12/5/2018</a:t>
             </a:fld>
             <a:endParaRPr lang="en-US"/>
           </a:p>
@@ -1049,7 +1042,6 @@
           <a:p>
             <a:fld id="{FB34683C-161B-4520-BF45-B179E228CF2A}" type="slidenum">
               <a:rPr lang="en-US" smtClean="0"/>
-              <a:pPr/>
               <a:t>‹#›</a:t>
             </a:fld>
             <a:endParaRPr lang="en-US"/>
@@ -1176,8 +1168,7 @@
           <a:p>
             <a:fld id="{78C97017-6FC3-485B-9764-EAC9E56C1D49}" type="datetimeFigureOut">
               <a:rPr lang="en-US" smtClean="0"/>
-              <a:pPr/>
-              <a:t>4/2/2019</a:t>
+              <a:t>12/5/2018</a:t>
             </a:fld>
             <a:endParaRPr lang="en-US"/>
           </a:p>
@@ -1219,7 +1210,6 @@
           <a:p>
             <a:fld id="{FB34683C-161B-4520-BF45-B179E228CF2A}" type="slidenum">
               <a:rPr lang="en-US" smtClean="0"/>
-              <a:pPr/>
               <a:t>‹#›</a:t>
             </a:fld>
             <a:endParaRPr lang="en-US"/>
@@ -1423,8 +1413,7 @@
           <a:p>
             <a:fld id="{78C97017-6FC3-485B-9764-EAC9E56C1D49}" type="datetimeFigureOut">
               <a:rPr lang="en-US" smtClean="0"/>
-              <a:pPr/>
-              <a:t>4/2/2019</a:t>
+              <a:t>12/5/2018</a:t>
             </a:fld>
             <a:endParaRPr lang="en-US"/>
           </a:p>
@@ -1466,7 +1455,6 @@
           <a:p>
             <a:fld id="{FB34683C-161B-4520-BF45-B179E228CF2A}" type="slidenum">
               <a:rPr lang="en-US" smtClean="0"/>
-              <a:pPr/>
               <a:t>‹#›</a:t>
             </a:fld>
             <a:endParaRPr lang="en-US"/>
@@ -1710,8 +1698,7 @@
           <a:p>
             <a:fld id="{78C97017-6FC3-485B-9764-EAC9E56C1D49}" type="datetimeFigureOut">
               <a:rPr lang="en-US" smtClean="0"/>
-              <a:pPr/>
-              <a:t>4/2/2019</a:t>
+              <a:t>12/5/2018</a:t>
             </a:fld>
             <a:endParaRPr lang="en-US"/>
           </a:p>
@@ -1753,7 +1740,6 @@
           <a:p>
             <a:fld id="{FB34683C-161B-4520-BF45-B179E228CF2A}" type="slidenum">
               <a:rPr lang="en-US" smtClean="0"/>
-              <a:pPr/>
               <a:t>‹#›</a:t>
             </a:fld>
             <a:endParaRPr lang="en-US"/>
@@ -2131,8 +2117,7 @@
           <a:p>
             <a:fld id="{78C97017-6FC3-485B-9764-EAC9E56C1D49}" type="datetimeFigureOut">
               <a:rPr lang="en-US" smtClean="0"/>
-              <a:pPr/>
-              <a:t>4/2/2019</a:t>
+              <a:t>12/5/2018</a:t>
             </a:fld>
             <a:endParaRPr lang="en-US"/>
           </a:p>
@@ -2174,7 +2159,6 @@
           <a:p>
             <a:fld id="{FB34683C-161B-4520-BF45-B179E228CF2A}" type="slidenum">
               <a:rPr lang="en-US" smtClean="0"/>
-              <a:pPr/>
               <a:t>‹#›</a:t>
             </a:fld>
             <a:endParaRPr lang="en-US"/>
@@ -2250,8 +2234,7 @@
           <a:p>
             <a:fld id="{78C97017-6FC3-485B-9764-EAC9E56C1D49}" type="datetimeFigureOut">
               <a:rPr lang="en-US" smtClean="0"/>
-              <a:pPr/>
-              <a:t>4/2/2019</a:t>
+              <a:t>12/5/2018</a:t>
             </a:fld>
             <a:endParaRPr lang="en-US"/>
           </a:p>
@@ -2293,7 +2276,6 @@
           <a:p>
             <a:fld id="{FB34683C-161B-4520-BF45-B179E228CF2A}" type="slidenum">
               <a:rPr lang="en-US" smtClean="0"/>
-              <a:pPr/>
               <a:t>‹#›</a:t>
             </a:fld>
             <a:endParaRPr lang="en-US"/>
@@ -2347,8 +2329,7 @@
           <a:p>
             <a:fld id="{78C97017-6FC3-485B-9764-EAC9E56C1D49}" type="datetimeFigureOut">
               <a:rPr lang="en-US" smtClean="0"/>
-              <a:pPr/>
-              <a:t>4/2/2019</a:t>
+              <a:t>12/5/2018</a:t>
             </a:fld>
             <a:endParaRPr lang="en-US"/>
           </a:p>
@@ -2390,7 +2371,6 @@
           <a:p>
             <a:fld id="{FB34683C-161B-4520-BF45-B179E228CF2A}" type="slidenum">
               <a:rPr lang="en-US" smtClean="0"/>
-              <a:pPr/>
               <a:t>‹#›</a:t>
             </a:fld>
             <a:endParaRPr lang="en-US"/>
@@ -2624,8 +2604,7 @@
           <a:p>
             <a:fld id="{78C97017-6FC3-485B-9764-EAC9E56C1D49}" type="datetimeFigureOut">
               <a:rPr lang="en-US" smtClean="0"/>
-              <a:pPr/>
-              <a:t>4/2/2019</a:t>
+              <a:t>12/5/2018</a:t>
             </a:fld>
             <a:endParaRPr lang="en-US"/>
           </a:p>
@@ -2667,7 +2646,6 @@
           <a:p>
             <a:fld id="{FB34683C-161B-4520-BF45-B179E228CF2A}" type="slidenum">
               <a:rPr lang="en-US" smtClean="0"/>
-              <a:pPr/>
               <a:t>‹#›</a:t>
             </a:fld>
             <a:endParaRPr lang="en-US"/>
@@ -2878,8 +2856,7 @@
           <a:p>
             <a:fld id="{78C97017-6FC3-485B-9764-EAC9E56C1D49}" type="datetimeFigureOut">
               <a:rPr lang="en-US" smtClean="0"/>
-              <a:pPr/>
-              <a:t>4/2/2019</a:t>
+              <a:t>12/5/2018</a:t>
             </a:fld>
             <a:endParaRPr lang="en-US"/>
           </a:p>
@@ -2921,7 +2898,6 @@
           <a:p>
             <a:fld id="{FB34683C-161B-4520-BF45-B179E228CF2A}" type="slidenum">
               <a:rPr lang="en-US" smtClean="0"/>
-              <a:pPr/>
               <a:t>‹#›</a:t>
             </a:fld>
             <a:endParaRPr lang="en-US"/>
@@ -3091,8 +3067,7 @@
           <a:p>
             <a:fld id="{78C97017-6FC3-485B-9764-EAC9E56C1D49}" type="datetimeFigureOut">
               <a:rPr lang="en-US" smtClean="0"/>
-              <a:pPr/>
-              <a:t>4/2/2019</a:t>
+              <a:t>12/5/2018</a:t>
             </a:fld>
             <a:endParaRPr lang="en-US"/>
           </a:p>
@@ -3170,7 +3145,6 @@
           <a:p>
             <a:fld id="{FB34683C-161B-4520-BF45-B179E228CF2A}" type="slidenum">
               <a:rPr lang="en-US" smtClean="0"/>
-              <a:pPr/>
               <a:t>‹#›</a:t>
             </a:fld>
             <a:endParaRPr lang="en-US"/>
@@ -3470,34 +3444,186 @@
       </p:grpSpPr>
       <p:sp>
         <p:nvSpPr>
-          <p:cNvPr id="75" name="Rectangle 65">
-            <a:extLst>
-              <a:ext uri="{FF2B5EF4-FFF2-40B4-BE49-F238E27FC236}">
-                <a16:creationId xmlns:a16="http://schemas.microsoft.com/office/drawing/2014/main" id="{86D9C0B2-FA59-4585-B97A-302221C9FED3}"/>
-              </a:ext>
-            </a:extLst>
-          </p:cNvPr>
+          <p:cNvPr id="46" name="Rectangle 8"/>
           <p:cNvSpPr/>
           <p:nvPr/>
         </p:nvSpPr>
         <p:spPr>
           <a:xfrm>
-            <a:off x="2133600" y="419100"/>
-            <a:ext cx="4648200" cy="3048000"/>
-          </a:xfrm>
-          <a:prstGeom prst="roundRect">
-            <a:avLst>
-              <a:gd name="adj" fmla="val 26749"/>
-            </a:avLst>
+            <a:off x="1754912" y="3324621"/>
+            <a:ext cx="1447688" cy="346760"/>
+          </a:xfrm>
+          <a:prstGeom prst="rect">
+            <a:avLst/>
+          </a:prstGeom>
+          <a:ln w="19050">
+            <a:solidFill>
+              <a:srgbClr val="7030A0"/>
+            </a:solidFill>
+          </a:ln>
+          <a:effectLst/>
+        </p:spPr>
+        <p:style>
+          <a:lnRef idx="1">
+            <a:schemeClr val="accent4"/>
+          </a:lnRef>
+          <a:fillRef idx="2">
+            <a:schemeClr val="accent4"/>
+          </a:fillRef>
+          <a:effectRef idx="1">
+            <a:schemeClr val="accent4"/>
+          </a:effectRef>
+          <a:fontRef idx="minor">
+            <a:schemeClr val="dk1"/>
+          </a:fontRef>
+        </p:style>
+        <p:txBody>
+          <a:bodyPr rtlCol="0" anchor="ctr"/>
+          <a:lstStyle/>
+          <a:p>
+            <a:pPr algn="ctr"/>
+            <a:r>
+              <a:rPr lang="en-US" sz="1050" dirty="0" err="1">
+                <a:solidFill>
+                  <a:srgbClr val="7030A0"/>
+                </a:solidFill>
+              </a:rPr>
+              <a:t>VersionedAddressBook</a:t>
+            </a:r>
+            <a:endParaRPr lang="en-SG" sz="1050" dirty="0">
+              <a:solidFill>
+                <a:srgbClr val="7030A0"/>
+              </a:solidFill>
+            </a:endParaRPr>
+          </a:p>
+        </p:txBody>
+      </p:sp>
+      <p:sp>
+        <p:nvSpPr>
+          <p:cNvPr id="49" name="Rectangle 8"/>
+          <p:cNvSpPr/>
+          <p:nvPr/>
+        </p:nvSpPr>
+        <p:spPr>
+          <a:xfrm>
+            <a:off x="3730715" y="3353144"/>
+            <a:ext cx="1156969" cy="346760"/>
+          </a:xfrm>
+          <a:prstGeom prst="rect">
+            <a:avLst/>
+          </a:prstGeom>
+          <a:ln w="19050">
+            <a:solidFill>
+              <a:srgbClr val="7030A0"/>
+            </a:solidFill>
+          </a:ln>
+          <a:effectLst/>
+        </p:spPr>
+        <p:style>
+          <a:lnRef idx="1">
+            <a:schemeClr val="accent4"/>
+          </a:lnRef>
+          <a:fillRef idx="2">
+            <a:schemeClr val="accent4"/>
+          </a:fillRef>
+          <a:effectRef idx="1">
+            <a:schemeClr val="accent4"/>
+          </a:effectRef>
+          <a:fontRef idx="minor">
+            <a:schemeClr val="dk1"/>
+          </a:fontRef>
+        </p:style>
+        <p:txBody>
+          <a:bodyPr rtlCol="0" anchor="ctr"/>
+          <a:lstStyle/>
+          <a:p>
+            <a:pPr algn="ctr"/>
+            <a:r>
+              <a:rPr lang="en-US" sz="1050" dirty="0" err="1">
+                <a:solidFill>
+                  <a:srgbClr val="7030A0"/>
+                </a:solidFill>
+              </a:rPr>
+              <a:t>UniquePersonList</a:t>
+            </a:r>
+            <a:endParaRPr lang="en-SG" sz="1050" dirty="0">
+              <a:solidFill>
+                <a:srgbClr val="7030A0"/>
+              </a:solidFill>
+            </a:endParaRPr>
+          </a:p>
+        </p:txBody>
+      </p:sp>
+      <p:sp>
+        <p:nvSpPr>
+          <p:cNvPr id="51" name="Flowchart: Decision 96"/>
+          <p:cNvSpPr/>
+          <p:nvPr/>
+        </p:nvSpPr>
+        <p:spPr>
+          <a:xfrm>
+            <a:off x="3201752" y="3437911"/>
+            <a:ext cx="236048" cy="173380"/>
+          </a:xfrm>
+          <a:prstGeom prst="flowChartDecision">
+            <a:avLst/>
           </a:prstGeom>
           <a:solidFill>
-            <a:schemeClr val="accent4">
-              <a:lumMod val="20000"/>
-              <a:lumOff val="80000"/>
-            </a:schemeClr>
+            <a:srgbClr val="7030A0"/>
           </a:solidFill>
           <a:ln w="19050">
-            <a:noFill/>
+            <a:solidFill>
+              <a:srgbClr val="7030A0"/>
+            </a:solidFill>
+          </a:ln>
+          <a:effectLst/>
+        </p:spPr>
+        <p:style>
+          <a:lnRef idx="1">
+            <a:schemeClr val="accent6"/>
+          </a:lnRef>
+          <a:fillRef idx="2">
+            <a:schemeClr val="accent6"/>
+          </a:fillRef>
+          <a:effectRef idx="1">
+            <a:schemeClr val="accent6"/>
+          </a:effectRef>
+          <a:fontRef idx="minor">
+            <a:schemeClr val="dk1"/>
+          </a:fontRef>
+        </p:style>
+        <p:txBody>
+          <a:bodyPr rtlCol="0" anchor="ctr"/>
+          <a:lstStyle/>
+          <a:p>
+            <a:pPr algn="ctr"/>
+            <a:endParaRPr lang="en-US" sz="1050"/>
+          </a:p>
+        </p:txBody>
+      </p:sp>
+      <p:cxnSp>
+        <p:nvCxnSpPr>
+          <p:cNvPr id="30" name="Elbow Connector 29"/>
+          <p:cNvCxnSpPr>
+            <a:stCxn id="51" idx="3"/>
+            <a:endCxn id="49" idx="1"/>
+          </p:cNvCxnSpPr>
+          <p:nvPr/>
+        </p:nvCxnSpPr>
+        <p:spPr>
+          <a:xfrm>
+            <a:off x="3437800" y="3524601"/>
+            <a:ext cx="292915" cy="1923"/>
+          </a:xfrm>
+          <a:prstGeom prst="bentConnector3">
+            <a:avLst/>
+          </a:prstGeom>
+          <a:ln w="19050">
+            <a:solidFill>
+              <a:srgbClr val="7030A0"/>
+            </a:solidFill>
+            <a:headEnd type="none" w="med" len="med"/>
+            <a:tailEnd type="arrow" w="med" len="med"/>
           </a:ln>
           <a:effectLst/>
         </p:spPr>
@@ -3515,37 +3641,342 @@
             <a:schemeClr val="dk1"/>
           </a:fontRef>
         </p:style>
-        <p:txBody>
-          <a:bodyPr rtlCol="0" anchor="t"/>
-          <a:lstStyle/>
-          <a:p>
-            <a:r>
-              <a:rPr lang="en-US" sz="1200" b="1" dirty="0" err="1">
+      </p:cxnSp>
+      <p:sp>
+        <p:nvSpPr>
+          <p:cNvPr id="62" name="Rectangle 8"/>
+          <p:cNvSpPr/>
+          <p:nvPr/>
+        </p:nvSpPr>
+        <p:spPr>
+          <a:xfrm>
+            <a:off x="5282183" y="3347776"/>
+            <a:ext cx="708186" cy="346760"/>
+          </a:xfrm>
+          <a:prstGeom prst="rect">
+            <a:avLst/>
+          </a:prstGeom>
+          <a:ln w="19050">
+            <a:solidFill>
+              <a:srgbClr val="7030A0"/>
+            </a:solidFill>
+          </a:ln>
+          <a:effectLst/>
+        </p:spPr>
+        <p:style>
+          <a:lnRef idx="1">
+            <a:schemeClr val="accent4"/>
+          </a:lnRef>
+          <a:fillRef idx="2">
+            <a:schemeClr val="accent4"/>
+          </a:fillRef>
+          <a:effectRef idx="1">
+            <a:schemeClr val="accent4"/>
+          </a:effectRef>
+          <a:fontRef idx="minor">
+            <a:schemeClr val="dk1"/>
+          </a:fontRef>
+        </p:style>
+        <p:txBody>
+          <a:bodyPr rtlCol="0" anchor="ctr"/>
+          <a:lstStyle/>
+          <a:p>
+            <a:pPr algn="ctr"/>
+            <a:r>
+              <a:rPr lang="en-US" sz="1050" dirty="0">
                 <a:solidFill>
                   <a:srgbClr val="7030A0"/>
                 </a:solidFill>
               </a:rPr>
-              <a:t>CourseRequirement</a:t>
-            </a:r>
-            <a:r>
-              <a:rPr lang="en-US" sz="1200" b="1" dirty="0">
+              <a:t>Person</a:t>
+            </a:r>
+            <a:endParaRPr lang="en-SG" sz="1050" dirty="0">
+              <a:solidFill>
+                <a:srgbClr val="7030A0"/>
+              </a:solidFill>
+            </a:endParaRPr>
+          </a:p>
+        </p:txBody>
+      </p:sp>
+      <p:sp>
+        <p:nvSpPr>
+          <p:cNvPr id="63" name="Flowchart: Decision 96"/>
+          <p:cNvSpPr/>
+          <p:nvPr/>
+        </p:nvSpPr>
+        <p:spPr>
+          <a:xfrm>
+            <a:off x="4886966" y="3430775"/>
+            <a:ext cx="236048" cy="173380"/>
+          </a:xfrm>
+          <a:prstGeom prst="flowChartDecision">
+            <a:avLst/>
+          </a:prstGeom>
+          <a:noFill/>
+          <a:ln w="19050">
+            <a:solidFill>
+              <a:srgbClr val="7030A0"/>
+            </a:solidFill>
+          </a:ln>
+          <a:effectLst/>
+        </p:spPr>
+        <p:style>
+          <a:lnRef idx="1">
+            <a:schemeClr val="accent6"/>
+          </a:lnRef>
+          <a:fillRef idx="2">
+            <a:schemeClr val="accent6"/>
+          </a:fillRef>
+          <a:effectRef idx="1">
+            <a:schemeClr val="accent6"/>
+          </a:effectRef>
+          <a:fontRef idx="minor">
+            <a:schemeClr val="dk1"/>
+          </a:fontRef>
+        </p:style>
+        <p:txBody>
+          <a:bodyPr rtlCol="0" anchor="ctr"/>
+          <a:lstStyle/>
+          <a:p>
+            <a:pPr algn="ctr"/>
+            <a:endParaRPr lang="en-US" sz="1050"/>
+          </a:p>
+        </p:txBody>
+      </p:sp>
+      <p:cxnSp>
+        <p:nvCxnSpPr>
+          <p:cNvPr id="64" name="Elbow Connector 63"/>
+          <p:cNvCxnSpPr>
+            <a:cxnSpLocks/>
+            <a:stCxn id="63" idx="3"/>
+            <a:endCxn id="62" idx="1"/>
+          </p:cNvCxnSpPr>
+          <p:nvPr/>
+        </p:nvCxnSpPr>
+        <p:spPr>
+          <a:xfrm>
+            <a:off x="5123014" y="3517465"/>
+            <a:ext cx="159169" cy="3691"/>
+          </a:xfrm>
+          <a:prstGeom prst="bentConnector3">
+            <a:avLst/>
+          </a:prstGeom>
+          <a:ln w="19050">
+            <a:solidFill>
+              <a:srgbClr val="7030A0"/>
+            </a:solidFill>
+            <a:headEnd type="none" w="med" len="med"/>
+            <a:tailEnd type="arrow" w="med" len="med"/>
+          </a:ln>
+          <a:effectLst/>
+        </p:spPr>
+        <p:style>
+          <a:lnRef idx="1">
+            <a:schemeClr val="accent2"/>
+          </a:lnRef>
+          <a:fillRef idx="2">
+            <a:schemeClr val="accent2"/>
+          </a:fillRef>
+          <a:effectRef idx="1">
+            <a:schemeClr val="accent2"/>
+          </a:effectRef>
+          <a:fontRef idx="minor">
+            <a:schemeClr val="dk1"/>
+          </a:fontRef>
+        </p:style>
+      </p:cxnSp>
+      <p:sp>
+        <p:nvSpPr>
+          <p:cNvPr id="76" name="Rectangle 8"/>
+          <p:cNvSpPr/>
+          <p:nvPr/>
+        </p:nvSpPr>
+        <p:spPr>
+          <a:xfrm>
+            <a:off x="6680903" y="3053948"/>
+            <a:ext cx="708186" cy="285783"/>
+          </a:xfrm>
+          <a:prstGeom prst="rect">
+            <a:avLst/>
+          </a:prstGeom>
+          <a:ln w="19050">
+            <a:solidFill>
+              <a:srgbClr val="7030A0"/>
+            </a:solidFill>
+          </a:ln>
+          <a:effectLst/>
+        </p:spPr>
+        <p:style>
+          <a:lnRef idx="1">
+            <a:schemeClr val="accent4"/>
+          </a:lnRef>
+          <a:fillRef idx="2">
+            <a:schemeClr val="accent4"/>
+          </a:fillRef>
+          <a:effectRef idx="1">
+            <a:schemeClr val="accent4"/>
+          </a:effectRef>
+          <a:fontRef idx="minor">
+            <a:schemeClr val="dk1"/>
+          </a:fontRef>
+        </p:style>
+        <p:txBody>
+          <a:bodyPr rtlCol="0" anchor="ctr"/>
+          <a:lstStyle/>
+          <a:p>
+            <a:pPr algn="ctr"/>
+            <a:r>
+              <a:rPr lang="en-US" sz="1050" dirty="0">
                 <a:solidFill>
                   <a:srgbClr val="7030A0"/>
                 </a:solidFill>
               </a:rPr>
-              <a:t> </a:t>
-            </a:r>
-          </a:p>
-          <a:p>
-            <a:r>
-              <a:rPr lang="en-US" sz="1200" b="1" dirty="0">
+              <a:t>Name</a:t>
+            </a:r>
+            <a:endParaRPr lang="en-SG" sz="1050" dirty="0">
+              <a:solidFill>
+                <a:srgbClr val="7030A0"/>
+              </a:solidFill>
+            </a:endParaRPr>
+          </a:p>
+        </p:txBody>
+      </p:sp>
+      <p:sp>
+        <p:nvSpPr>
+          <p:cNvPr id="78" name="Flowchart: Decision 96"/>
+          <p:cNvSpPr/>
+          <p:nvPr/>
+        </p:nvSpPr>
+        <p:spPr>
+          <a:xfrm>
+            <a:off x="6010453" y="3437911"/>
+            <a:ext cx="236048" cy="173380"/>
+          </a:xfrm>
+          <a:prstGeom prst="flowChartDecision">
+            <a:avLst/>
+          </a:prstGeom>
+          <a:solidFill>
+            <a:srgbClr val="7030A0"/>
+          </a:solidFill>
+          <a:ln w="19050">
+            <a:solidFill>
+              <a:srgbClr val="7030A0"/>
+            </a:solidFill>
+          </a:ln>
+          <a:effectLst/>
+        </p:spPr>
+        <p:style>
+          <a:lnRef idx="1">
+            <a:schemeClr val="accent6"/>
+          </a:lnRef>
+          <a:fillRef idx="2">
+            <a:schemeClr val="accent6"/>
+          </a:fillRef>
+          <a:effectRef idx="1">
+            <a:schemeClr val="accent6"/>
+          </a:effectRef>
+          <a:fontRef idx="minor">
+            <a:schemeClr val="dk1"/>
+          </a:fontRef>
+        </p:style>
+        <p:txBody>
+          <a:bodyPr rtlCol="0" anchor="ctr"/>
+          <a:lstStyle/>
+          <a:p>
+            <a:pPr algn="ctr"/>
+            <a:endParaRPr lang="en-US" sz="1050"/>
+          </a:p>
+        </p:txBody>
+      </p:sp>
+      <p:cxnSp>
+        <p:nvCxnSpPr>
+          <p:cNvPr id="79" name="Elbow Connector 78"/>
+          <p:cNvCxnSpPr>
+            <a:cxnSpLocks/>
+          </p:cNvCxnSpPr>
+          <p:nvPr/>
+        </p:nvCxnSpPr>
+        <p:spPr>
+          <a:xfrm flipV="1">
+            <a:off x="6246501" y="3196531"/>
+            <a:ext cx="434402" cy="327761"/>
+          </a:xfrm>
+          <a:prstGeom prst="bentConnector3">
+            <a:avLst/>
+          </a:prstGeom>
+          <a:ln w="19050">
+            <a:solidFill>
+              <a:srgbClr val="7030A0"/>
+            </a:solidFill>
+            <a:headEnd type="none" w="med" len="med"/>
+            <a:tailEnd type="arrow" w="med" len="med"/>
+          </a:ln>
+          <a:effectLst/>
+        </p:spPr>
+        <p:style>
+          <a:lnRef idx="1">
+            <a:schemeClr val="accent2"/>
+          </a:lnRef>
+          <a:fillRef idx="2">
+            <a:schemeClr val="accent2"/>
+          </a:fillRef>
+          <a:effectRef idx="1">
+            <a:schemeClr val="accent2"/>
+          </a:effectRef>
+          <a:fontRef idx="minor">
+            <a:schemeClr val="dk1"/>
+          </a:fontRef>
+        </p:style>
+      </p:cxnSp>
+      <p:sp>
+        <p:nvSpPr>
+          <p:cNvPr id="80" name="Rectangle 8"/>
+          <p:cNvSpPr/>
+          <p:nvPr/>
+        </p:nvSpPr>
+        <p:spPr>
+          <a:xfrm>
+            <a:off x="6680903" y="3376926"/>
+            <a:ext cx="708186" cy="285783"/>
+          </a:xfrm>
+          <a:prstGeom prst="rect">
+            <a:avLst/>
+          </a:prstGeom>
+          <a:ln w="19050">
+            <a:solidFill>
+              <a:srgbClr val="7030A0"/>
+            </a:solidFill>
+          </a:ln>
+          <a:effectLst/>
+        </p:spPr>
+        <p:style>
+          <a:lnRef idx="1">
+            <a:schemeClr val="accent4"/>
+          </a:lnRef>
+          <a:fillRef idx="2">
+            <a:schemeClr val="accent4"/>
+          </a:fillRef>
+          <a:effectRef idx="1">
+            <a:schemeClr val="accent4"/>
+          </a:effectRef>
+          <a:fontRef idx="minor">
+            <a:schemeClr val="dk1"/>
+          </a:fontRef>
+        </p:style>
+        <p:txBody>
+          <a:bodyPr rtlCol="0" anchor="ctr"/>
+          <a:lstStyle/>
+          <a:p>
+            <a:pPr algn="ctr"/>
+            <a:r>
+              <a:rPr lang="en-US" sz="1050" dirty="0">
                 <a:solidFill>
                   <a:srgbClr val="7030A0"/>
                 </a:solidFill>
               </a:rPr>
-              <a:t>(Composite Design Pattern)</a:t>
-            </a:r>
-            <a:endParaRPr lang="en-SG" sz="1200" b="1" dirty="0">
+              <a:t>Phone</a:t>
+            </a:r>
+            <a:endParaRPr lang="en-SG" sz="1050" dirty="0">
               <a:solidFill>
                 <a:srgbClr val="7030A0"/>
               </a:solidFill>
@@ -3553,599 +3984,828 @@
           </a:p>
         </p:txBody>
       </p:sp>
-      <p:grpSp>
-        <p:nvGrpSpPr>
-          <p:cNvPr id="45" name="Group 44">
+      <p:cxnSp>
+        <p:nvCxnSpPr>
+          <p:cNvPr id="81" name="Elbow Connector 80"/>
+          <p:cNvCxnSpPr>
+            <a:stCxn id="78" idx="3"/>
+            <a:endCxn id="80" idx="1"/>
+          </p:cNvCxnSpPr>
+          <p:nvPr/>
+        </p:nvCxnSpPr>
+        <p:spPr>
+          <a:xfrm flipV="1">
+            <a:off x="6246501" y="3519818"/>
+            <a:ext cx="434402" cy="4783"/>
+          </a:xfrm>
+          <a:prstGeom prst="bentConnector3">
+            <a:avLst/>
+          </a:prstGeom>
+          <a:ln w="19050">
+            <a:solidFill>
+              <a:srgbClr val="7030A0"/>
+            </a:solidFill>
+            <a:headEnd type="none" w="med" len="med"/>
+            <a:tailEnd type="arrow" w="med" len="med"/>
+          </a:ln>
+          <a:effectLst/>
+        </p:spPr>
+        <p:style>
+          <a:lnRef idx="1">
+            <a:schemeClr val="accent2"/>
+          </a:lnRef>
+          <a:fillRef idx="2">
+            <a:schemeClr val="accent2"/>
+          </a:fillRef>
+          <a:effectRef idx="1">
+            <a:schemeClr val="accent2"/>
+          </a:effectRef>
+          <a:fontRef idx="minor">
+            <a:schemeClr val="dk1"/>
+          </a:fontRef>
+        </p:style>
+      </p:cxnSp>
+      <p:sp>
+        <p:nvSpPr>
+          <p:cNvPr id="83" name="Rectangle 8"/>
+          <p:cNvSpPr/>
+          <p:nvPr/>
+        </p:nvSpPr>
+        <p:spPr>
+          <a:xfrm>
+            <a:off x="6680903" y="3699904"/>
+            <a:ext cx="708186" cy="285783"/>
+          </a:xfrm>
+          <a:prstGeom prst="rect">
+            <a:avLst/>
+          </a:prstGeom>
+          <a:ln w="19050">
+            <a:solidFill>
+              <a:srgbClr val="7030A0"/>
+            </a:solidFill>
+          </a:ln>
+          <a:effectLst/>
+        </p:spPr>
+        <p:style>
+          <a:lnRef idx="1">
+            <a:schemeClr val="accent4"/>
+          </a:lnRef>
+          <a:fillRef idx="2">
+            <a:schemeClr val="accent4"/>
+          </a:fillRef>
+          <a:effectRef idx="1">
+            <a:schemeClr val="accent4"/>
+          </a:effectRef>
+          <a:fontRef idx="minor">
+            <a:schemeClr val="dk1"/>
+          </a:fontRef>
+        </p:style>
+        <p:txBody>
+          <a:bodyPr rtlCol="0" anchor="ctr"/>
+          <a:lstStyle/>
+          <a:p>
+            <a:pPr algn="ctr"/>
+            <a:r>
+              <a:rPr lang="en-US" sz="1050" dirty="0">
+                <a:solidFill>
+                  <a:srgbClr val="7030A0"/>
+                </a:solidFill>
+              </a:rPr>
+              <a:t>Email</a:t>
+            </a:r>
+            <a:endParaRPr lang="en-SG" sz="1050" dirty="0">
+              <a:solidFill>
+                <a:srgbClr val="7030A0"/>
+              </a:solidFill>
+            </a:endParaRPr>
+          </a:p>
+        </p:txBody>
+      </p:sp>
+      <p:cxnSp>
+        <p:nvCxnSpPr>
+          <p:cNvPr id="84" name="Elbow Connector 83"/>
+          <p:cNvCxnSpPr>
+            <a:stCxn id="78" idx="3"/>
+            <a:endCxn id="83" idx="1"/>
+          </p:cNvCxnSpPr>
+          <p:nvPr/>
+        </p:nvCxnSpPr>
+        <p:spPr>
+          <a:xfrm>
+            <a:off x="6246501" y="3524601"/>
+            <a:ext cx="434402" cy="318195"/>
+          </a:xfrm>
+          <a:prstGeom prst="bentConnector3">
+            <a:avLst/>
+          </a:prstGeom>
+          <a:ln w="19050">
+            <a:solidFill>
+              <a:srgbClr val="7030A0"/>
+            </a:solidFill>
+            <a:headEnd type="none" w="med" len="med"/>
+            <a:tailEnd type="arrow" w="med" len="med"/>
+          </a:ln>
+          <a:effectLst/>
+        </p:spPr>
+        <p:style>
+          <a:lnRef idx="1">
+            <a:schemeClr val="accent2"/>
+          </a:lnRef>
+          <a:fillRef idx="2">
+            <a:schemeClr val="accent2"/>
+          </a:fillRef>
+          <a:effectRef idx="1">
+            <a:schemeClr val="accent2"/>
+          </a:effectRef>
+          <a:fontRef idx="minor">
+            <a:schemeClr val="dk1"/>
+          </a:fontRef>
+        </p:style>
+      </p:cxnSp>
+      <p:sp>
+        <p:nvSpPr>
+          <p:cNvPr id="85" name="Rectangle 8"/>
+          <p:cNvSpPr/>
+          <p:nvPr/>
+        </p:nvSpPr>
+        <p:spPr>
+          <a:xfrm>
+            <a:off x="6680903" y="4022881"/>
+            <a:ext cx="708186" cy="285783"/>
+          </a:xfrm>
+          <a:prstGeom prst="rect">
+            <a:avLst/>
+          </a:prstGeom>
+          <a:ln w="19050">
+            <a:solidFill>
+              <a:srgbClr val="7030A0"/>
+            </a:solidFill>
+          </a:ln>
+          <a:effectLst/>
+        </p:spPr>
+        <p:style>
+          <a:lnRef idx="1">
+            <a:schemeClr val="accent4"/>
+          </a:lnRef>
+          <a:fillRef idx="2">
+            <a:schemeClr val="accent4"/>
+          </a:fillRef>
+          <a:effectRef idx="1">
+            <a:schemeClr val="accent4"/>
+          </a:effectRef>
+          <a:fontRef idx="minor">
+            <a:schemeClr val="dk1"/>
+          </a:fontRef>
+        </p:style>
+        <p:txBody>
+          <a:bodyPr rtlCol="0" anchor="ctr"/>
+          <a:lstStyle/>
+          <a:p>
+            <a:pPr algn="ctr"/>
+            <a:r>
+              <a:rPr lang="en-US" sz="1050" dirty="0">
+                <a:solidFill>
+                  <a:srgbClr val="7030A0"/>
+                </a:solidFill>
+              </a:rPr>
+              <a:t>Address</a:t>
+            </a:r>
+            <a:endParaRPr lang="en-SG" sz="1050" dirty="0">
+              <a:solidFill>
+                <a:srgbClr val="7030A0"/>
+              </a:solidFill>
+            </a:endParaRPr>
+          </a:p>
+        </p:txBody>
+      </p:sp>
+      <p:cxnSp>
+        <p:nvCxnSpPr>
+          <p:cNvPr id="86" name="Elbow Connector 85"/>
+          <p:cNvCxnSpPr>
+            <a:cxnSpLocks/>
+            <a:stCxn id="78" idx="3"/>
+            <a:endCxn id="85" idx="1"/>
+          </p:cNvCxnSpPr>
+          <p:nvPr/>
+        </p:nvCxnSpPr>
+        <p:spPr>
+          <a:xfrm>
+            <a:off x="6246501" y="3524601"/>
+            <a:ext cx="434402" cy="641172"/>
+          </a:xfrm>
+          <a:prstGeom prst="bentConnector3">
+            <a:avLst/>
+          </a:prstGeom>
+          <a:ln w="19050">
+            <a:solidFill>
+              <a:srgbClr val="7030A0"/>
+            </a:solidFill>
+            <a:headEnd type="none" w="med" len="med"/>
+            <a:tailEnd type="arrow" w="med" len="med"/>
+          </a:ln>
+          <a:effectLst/>
+        </p:spPr>
+        <p:style>
+          <a:lnRef idx="1">
+            <a:schemeClr val="accent2"/>
+          </a:lnRef>
+          <a:fillRef idx="2">
+            <a:schemeClr val="accent2"/>
+          </a:fillRef>
+          <a:effectRef idx="1">
+            <a:schemeClr val="accent2"/>
+          </a:effectRef>
+          <a:fontRef idx="minor">
+            <a:schemeClr val="dk1"/>
+          </a:fontRef>
+        </p:style>
+      </p:cxnSp>
+      <p:sp>
+        <p:nvSpPr>
+          <p:cNvPr id="54" name="TextBox 53"/>
+          <p:cNvSpPr txBox="1"/>
+          <p:nvPr/>
+        </p:nvSpPr>
+        <p:spPr>
+          <a:xfrm>
+            <a:off x="3293478" y="3548574"/>
+            <a:ext cx="189257" cy="178683"/>
+          </a:xfrm>
+          <a:prstGeom prst="rect">
+            <a:avLst/>
+          </a:prstGeom>
+          <a:noFill/>
+        </p:spPr>
+        <p:txBody>
+          <a:bodyPr wrap="square" lIns="0" tIns="0" rIns="0" bIns="0" rtlCol="0">
+            <a:noAutofit/>
+          </a:bodyPr>
+          <a:lstStyle/>
+          <a:p>
+            <a:pPr algn="ctr"/>
+            <a:r>
+              <a:rPr lang="en-US" sz="1100" dirty="0">
+                <a:solidFill>
+                  <a:srgbClr val="7030A0"/>
+                </a:solidFill>
+              </a:rPr>
+              <a:t>1</a:t>
+            </a:r>
+            <a:endParaRPr lang="en-SG" sz="1100" dirty="0">
+              <a:solidFill>
+                <a:srgbClr val="7030A0"/>
+              </a:solidFill>
+            </a:endParaRPr>
+          </a:p>
+        </p:txBody>
+      </p:sp>
+      <p:sp>
+        <p:nvSpPr>
+          <p:cNvPr id="61" name="TextBox 60"/>
+          <p:cNvSpPr txBox="1"/>
+          <p:nvPr/>
+        </p:nvSpPr>
+        <p:spPr>
+          <a:xfrm>
+            <a:off x="5103762" y="3587627"/>
+            <a:ext cx="189257" cy="178683"/>
+          </a:xfrm>
+          <a:prstGeom prst="rect">
+            <a:avLst/>
+          </a:prstGeom>
+          <a:noFill/>
+        </p:spPr>
+        <p:txBody>
+          <a:bodyPr wrap="square" lIns="0" tIns="0" rIns="0" bIns="0" rtlCol="0">
+            <a:noAutofit/>
+          </a:bodyPr>
+          <a:lstStyle/>
+          <a:p>
+            <a:pPr algn="ctr"/>
+            <a:r>
+              <a:rPr lang="en-US" sz="1100" dirty="0">
+                <a:solidFill>
+                  <a:srgbClr val="7030A0"/>
+                </a:solidFill>
+              </a:rPr>
+              <a:t>*</a:t>
+            </a:r>
+            <a:endParaRPr lang="en-SG" sz="1100" dirty="0">
+              <a:solidFill>
+                <a:srgbClr val="7030A0"/>
+              </a:solidFill>
+            </a:endParaRPr>
+          </a:p>
+        </p:txBody>
+      </p:sp>
+      <p:sp>
+        <p:nvSpPr>
+          <p:cNvPr id="52" name="Rectangle 8">
             <a:extLst>
               <a:ext uri="{FF2B5EF4-FFF2-40B4-BE49-F238E27FC236}">
-                <a16:creationId xmlns:a16="http://schemas.microsoft.com/office/drawing/2014/main" id="{93E1D43A-BE3A-4D69-994F-ED6A491D9779}"/>
+                <a16:creationId xmlns:a16="http://schemas.microsoft.com/office/drawing/2014/main" id="{ABDCDBD2-131A-4B66-A2F2-43BBEE82C773}"/>
               </a:ext>
             </a:extLst>
           </p:cNvPr>
-          <p:cNvGrpSpPr/>
+          <p:cNvSpPr/>
           <p:nvPr/>
-        </p:nvGrpSpPr>
-        <p:grpSpPr>
+        </p:nvSpPr>
+        <p:spPr>
           <a:xfrm>
-            <a:off x="2502120" y="1104642"/>
-            <a:ext cx="3974880" cy="1562358"/>
-            <a:chOff x="2470260" y="1014425"/>
-            <a:chExt cx="3974880" cy="1562358"/>
-          </a:xfrm>
-        </p:grpSpPr>
-        <p:grpSp>
-          <p:nvGrpSpPr>
-            <p:cNvPr id="41" name="Group 40">
-              <a:extLst>
-                <a:ext uri="{FF2B5EF4-FFF2-40B4-BE49-F238E27FC236}">
-                  <a16:creationId xmlns:a16="http://schemas.microsoft.com/office/drawing/2014/main" id="{7248751E-86C2-40E1-9176-E80FFFE74AB4}"/>
-                </a:ext>
-              </a:extLst>
-            </p:cNvPr>
-            <p:cNvGrpSpPr/>
-            <p:nvPr/>
-          </p:nvGrpSpPr>
-          <p:grpSpPr>
-            <a:xfrm>
-              <a:off x="2470260" y="1101415"/>
-              <a:ext cx="3974880" cy="1475368"/>
-              <a:chOff x="2362200" y="1081192"/>
-              <a:chExt cx="3974880" cy="1475368"/>
-            </a:xfrm>
-          </p:grpSpPr>
-          <p:sp>
-            <p:nvSpPr>
-              <p:cNvPr id="73" name="Flowchart: Decision 96">
-                <a:extLst>
-                  <a:ext uri="{FF2B5EF4-FFF2-40B4-BE49-F238E27FC236}">
-                    <a16:creationId xmlns:a16="http://schemas.microsoft.com/office/drawing/2014/main" id="{74C506E3-DFCF-47D2-AE0A-99ED4D326302}"/>
-                  </a:ext>
-                </a:extLst>
-              </p:cNvPr>
-              <p:cNvSpPr/>
-              <p:nvPr/>
-            </p:nvSpPr>
-            <p:spPr>
-              <a:xfrm>
-                <a:off x="6096000" y="2296490"/>
-                <a:ext cx="241080" cy="173380"/>
-              </a:xfrm>
-              <a:prstGeom prst="flowChartDecision">
-                <a:avLst/>
-              </a:prstGeom>
+            <a:off x="3724378" y="2696571"/>
+            <a:ext cx="1156969" cy="285783"/>
+          </a:xfrm>
+          <a:prstGeom prst="rect">
+            <a:avLst/>
+          </a:prstGeom>
+          <a:ln w="19050">
+            <a:solidFill>
+              <a:srgbClr val="7030A0"/>
+            </a:solidFill>
+          </a:ln>
+          <a:effectLst/>
+        </p:spPr>
+        <p:style>
+          <a:lnRef idx="1">
+            <a:schemeClr val="accent4"/>
+          </a:lnRef>
+          <a:fillRef idx="2">
+            <a:schemeClr val="accent4"/>
+          </a:fillRef>
+          <a:effectRef idx="1">
+            <a:schemeClr val="accent4"/>
+          </a:effectRef>
+          <a:fontRef idx="minor">
+            <a:schemeClr val="dk1"/>
+          </a:fontRef>
+        </p:style>
+        <p:txBody>
+          <a:bodyPr rtlCol="0" anchor="ctr"/>
+          <a:lstStyle/>
+          <a:p>
+            <a:pPr algn="ctr"/>
+            <a:r>
+              <a:rPr lang="en-US" sz="1050" dirty="0" err="1">
+                <a:solidFill>
+                  <a:srgbClr val="7030A0"/>
+                </a:solidFill>
+              </a:rPr>
+              <a:t>UniqueTagList</a:t>
+            </a:r>
+            <a:endParaRPr lang="en-SG" sz="1050" dirty="0">
               <a:solidFill>
                 <a:srgbClr val="7030A0"/>
               </a:solidFill>
-              <a:ln w="19050">
+            </a:endParaRPr>
+          </a:p>
+        </p:txBody>
+      </p:sp>
+      <p:cxnSp>
+        <p:nvCxnSpPr>
+          <p:cNvPr id="53" name="Elbow Connector 78">
+            <a:extLst>
+              <a:ext uri="{FF2B5EF4-FFF2-40B4-BE49-F238E27FC236}">
+                <a16:creationId xmlns:a16="http://schemas.microsoft.com/office/drawing/2014/main" id="{B97967F8-618A-448B-81FD-CDFD4AF0EC64}"/>
+              </a:ext>
+            </a:extLst>
+          </p:cNvPr>
+          <p:cNvCxnSpPr>
+            <a:cxnSpLocks/>
+            <a:stCxn id="54" idx="0"/>
+            <a:endCxn id="52" idx="1"/>
+          </p:cNvCxnSpPr>
+          <p:nvPr/>
+        </p:nvCxnSpPr>
+        <p:spPr>
+          <a:xfrm rot="5400000" flipH="1" flipV="1">
+            <a:off x="3201687" y="3025884"/>
+            <a:ext cx="709111" cy="336271"/>
+          </a:xfrm>
+          <a:prstGeom prst="bentConnector2">
+            <a:avLst/>
+          </a:prstGeom>
+          <a:ln w="19050">
+            <a:solidFill>
+              <a:srgbClr val="7030A0"/>
+            </a:solidFill>
+            <a:headEnd type="none" w="med" len="med"/>
+            <a:tailEnd type="arrow" w="med" len="med"/>
+          </a:ln>
+          <a:effectLst/>
+        </p:spPr>
+        <p:style>
+          <a:lnRef idx="1">
+            <a:schemeClr val="accent2"/>
+          </a:lnRef>
+          <a:fillRef idx="2">
+            <a:schemeClr val="accent2"/>
+          </a:fillRef>
+          <a:effectRef idx="1">
+            <a:schemeClr val="accent2"/>
+          </a:effectRef>
+          <a:fontRef idx="minor">
+            <a:schemeClr val="dk1"/>
+          </a:fontRef>
+        </p:style>
+      </p:cxnSp>
+      <p:sp>
+        <p:nvSpPr>
+          <p:cNvPr id="50" name="TextBox 49">
+            <a:extLst>
+              <a:ext uri="{FF2B5EF4-FFF2-40B4-BE49-F238E27FC236}">
+                <a16:creationId xmlns:a16="http://schemas.microsoft.com/office/drawing/2014/main" id="{B3FA9D57-880F-49C4-AD0B-A64E30D6F403}"/>
+              </a:ext>
+            </a:extLst>
+          </p:cNvPr>
+          <p:cNvSpPr txBox="1"/>
+          <p:nvPr/>
+        </p:nvSpPr>
+        <p:spPr>
+          <a:xfrm>
+            <a:off x="5682850" y="2920431"/>
+            <a:ext cx="189257" cy="178683"/>
+          </a:xfrm>
+          <a:prstGeom prst="rect">
+            <a:avLst/>
+          </a:prstGeom>
+          <a:noFill/>
+        </p:spPr>
+        <p:txBody>
+          <a:bodyPr wrap="square" lIns="0" tIns="0" rIns="0" bIns="0" rtlCol="0">
+            <a:noAutofit/>
+          </a:bodyPr>
+          <a:lstStyle/>
+          <a:p>
+            <a:pPr algn="ctr"/>
+            <a:r>
+              <a:rPr lang="en-US" sz="1100" dirty="0">
                 <a:solidFill>
                   <a:srgbClr val="7030A0"/>
                 </a:solidFill>
-              </a:ln>
-              <a:effectLst/>
-            </p:spPr>
-            <p:style>
-              <a:lnRef idx="1">
-                <a:schemeClr val="accent6"/>
-              </a:lnRef>
-              <a:fillRef idx="2">
-                <a:schemeClr val="accent6"/>
-              </a:fillRef>
-              <a:effectRef idx="1">
-                <a:schemeClr val="accent6"/>
-              </a:effectRef>
-              <a:fontRef idx="minor">
-                <a:schemeClr val="dk1"/>
-              </a:fontRef>
-            </p:style>
-            <p:txBody>
-              <a:bodyPr rtlCol="0" anchor="ctr"/>
-              <a:lstStyle/>
-              <a:p>
-                <a:pPr algn="ctr"/>
-                <a:endParaRPr lang="en-US" sz="1050" b="1" dirty="0"/>
-              </a:p>
-            </p:txBody>
-          </p:sp>
-          <p:grpSp>
-            <p:nvGrpSpPr>
-              <p:cNvPr id="40" name="Group 39">
-                <a:extLst>
-                  <a:ext uri="{FF2B5EF4-FFF2-40B4-BE49-F238E27FC236}">
-                    <a16:creationId xmlns:a16="http://schemas.microsoft.com/office/drawing/2014/main" id="{9FAB192C-7407-40F7-8425-4DC4E7B4A2F5}"/>
-                  </a:ext>
-                </a:extLst>
-              </p:cNvPr>
-              <p:cNvGrpSpPr/>
-              <p:nvPr/>
-            </p:nvGrpSpPr>
-            <p:grpSpPr>
-              <a:xfrm>
-                <a:off x="2362200" y="1081192"/>
-                <a:ext cx="3974880" cy="1475368"/>
-                <a:chOff x="2362200" y="1081192"/>
-                <a:chExt cx="3974880" cy="1475368"/>
-              </a:xfrm>
-            </p:grpSpPr>
-            <p:sp>
-              <p:nvSpPr>
-                <p:cNvPr id="56" name="Rectangle 8">
-                  <a:extLst>
-                    <a:ext uri="{FF2B5EF4-FFF2-40B4-BE49-F238E27FC236}">
-                      <a16:creationId xmlns:a16="http://schemas.microsoft.com/office/drawing/2014/main" id="{CAB969BA-DAFC-4D81-A6DC-E2A49EB5BBAB}"/>
-                    </a:ext>
-                  </a:extLst>
-                </p:cNvPr>
-                <p:cNvSpPr/>
-                <p:nvPr/>
-              </p:nvSpPr>
-              <p:spPr>
-                <a:xfrm>
-                  <a:off x="4533732" y="2209800"/>
-                  <a:ext cx="1562268" cy="346760"/>
-                </a:xfrm>
-                <a:prstGeom prst="rect">
-                  <a:avLst/>
-                </a:prstGeom>
-                <a:ln w="19050">
-                  <a:solidFill>
-                    <a:srgbClr val="7030A0"/>
-                  </a:solidFill>
-                </a:ln>
-                <a:effectLst/>
-              </p:spPr>
-              <p:style>
-                <a:lnRef idx="1">
-                  <a:schemeClr val="accent4"/>
-                </a:lnRef>
-                <a:fillRef idx="2">
-                  <a:schemeClr val="accent4"/>
-                </a:fillRef>
-                <a:effectRef idx="1">
-                  <a:schemeClr val="accent4"/>
-                </a:effectRef>
-                <a:fontRef idx="minor">
-                  <a:schemeClr val="dk1"/>
-                </a:fontRef>
-              </p:style>
-              <p:txBody>
-                <a:bodyPr rtlCol="0" anchor="ctr"/>
-                <a:lstStyle/>
-                <a:p>
-                  <a:pPr algn="ctr"/>
-                  <a:r>
-                    <a:rPr lang="en-US" sz="1050" b="1" dirty="0" err="1">
-                      <a:solidFill>
-                        <a:srgbClr val="7030A0"/>
-                      </a:solidFill>
-                    </a:rPr>
-                    <a:t>CompositeRequirement</a:t>
-                  </a:r>
-                  <a:endParaRPr lang="en-SG" sz="1050" b="1" dirty="0">
-                    <a:solidFill>
-                      <a:srgbClr val="7030A0"/>
-                    </a:solidFill>
-                  </a:endParaRPr>
-                </a:p>
-              </p:txBody>
-            </p:sp>
-            <p:grpSp>
-              <p:nvGrpSpPr>
-                <p:cNvPr id="38" name="Group 37">
-                  <a:extLst>
-                    <a:ext uri="{FF2B5EF4-FFF2-40B4-BE49-F238E27FC236}">
-                      <a16:creationId xmlns:a16="http://schemas.microsoft.com/office/drawing/2014/main" id="{02598709-3CB8-4D30-BBE3-F77447B817D7}"/>
-                    </a:ext>
-                  </a:extLst>
-                </p:cNvPr>
-                <p:cNvGrpSpPr/>
-                <p:nvPr/>
-              </p:nvGrpSpPr>
-              <p:grpSpPr>
-                <a:xfrm>
-                  <a:off x="2362200" y="1081192"/>
-                  <a:ext cx="3974880" cy="1475368"/>
-                  <a:chOff x="2362200" y="1081192"/>
-                  <a:chExt cx="3974880" cy="1475368"/>
-                </a:xfrm>
-              </p:grpSpPr>
-              <p:sp>
-                <p:nvSpPr>
-                  <p:cNvPr id="46" name="Rectangle 8"/>
-                  <p:cNvSpPr/>
-                  <p:nvPr/>
-                </p:nvSpPr>
-                <p:spPr>
-                  <a:xfrm>
-                    <a:off x="2362200" y="2209800"/>
-                    <a:ext cx="1562268" cy="346760"/>
-                  </a:xfrm>
-                  <a:prstGeom prst="rect">
-                    <a:avLst/>
-                  </a:prstGeom>
-                  <a:ln w="19050">
-                    <a:solidFill>
-                      <a:srgbClr val="7030A0"/>
-                    </a:solidFill>
-                  </a:ln>
-                  <a:effectLst/>
-                </p:spPr>
-                <p:style>
-                  <a:lnRef idx="1">
-                    <a:schemeClr val="accent4"/>
-                  </a:lnRef>
-                  <a:fillRef idx="2">
-                    <a:schemeClr val="accent4"/>
-                  </a:fillRef>
-                  <a:effectRef idx="1">
-                    <a:schemeClr val="accent4"/>
-                  </a:effectRef>
-                  <a:fontRef idx="minor">
-                    <a:schemeClr val="dk1"/>
-                  </a:fontRef>
-                </p:style>
-                <p:txBody>
-                  <a:bodyPr rtlCol="0" anchor="ctr"/>
-                  <a:lstStyle/>
-                  <a:p>
-                    <a:pPr algn="ctr"/>
-                    <a:r>
-                      <a:rPr lang="en-US" sz="1050" b="1" dirty="0" err="1">
-                        <a:solidFill>
-                          <a:srgbClr val="7030A0"/>
-                        </a:solidFill>
-                      </a:rPr>
-                      <a:t>PrimitiveRequirement</a:t>
-                    </a:r>
-                    <a:endParaRPr lang="en-SG" sz="1050" b="1" dirty="0">
-                      <a:solidFill>
-                        <a:srgbClr val="7030A0"/>
-                      </a:solidFill>
-                    </a:endParaRPr>
-                  </a:p>
-                </p:txBody>
-              </p:sp>
-              <p:cxnSp>
-                <p:nvCxnSpPr>
-                  <p:cNvPr id="7" name="Connector: Elbow 6">
-                    <a:extLst>
-                      <a:ext uri="{FF2B5EF4-FFF2-40B4-BE49-F238E27FC236}">
-                        <a16:creationId xmlns:a16="http://schemas.microsoft.com/office/drawing/2014/main" id="{EFC510B9-E196-4496-9ACC-EAC80AE156F6}"/>
-                      </a:ext>
-                    </a:extLst>
-                  </p:cNvPr>
-                  <p:cNvCxnSpPr>
-                    <a:cxnSpLocks/>
-                    <a:stCxn id="46" idx="0"/>
-                    <a:endCxn id="3" idx="3"/>
-                  </p:cNvCxnSpPr>
-                  <p:nvPr/>
-                </p:nvCxnSpPr>
-                <p:spPr>
-                  <a:xfrm rot="5400000" flipH="1" flipV="1">
-                    <a:off x="3400467" y="1419267"/>
-                    <a:ext cx="533400" cy="1047666"/>
-                  </a:xfrm>
-                  <a:prstGeom prst="bentConnector3">
-                    <a:avLst>
-                      <a:gd name="adj1" fmla="val 50000"/>
-                    </a:avLst>
-                  </a:prstGeom>
-                  <a:ln w="19050" cap="flat" cmpd="sng" algn="ctr">
-                    <a:solidFill>
-                      <a:schemeClr val="accent4"/>
-                    </a:solidFill>
-                    <a:prstDash val="dash"/>
-                    <a:round/>
-                    <a:headEnd type="none" w="med" len="med"/>
-                    <a:tailEnd type="none" w="med" len="med"/>
-                  </a:ln>
-                </p:spPr>
-                <p:style>
-                  <a:lnRef idx="0">
-                    <a:scrgbClr r="0" g="0" b="0"/>
-                  </a:lnRef>
-                  <a:fillRef idx="0">
-                    <a:scrgbClr r="0" g="0" b="0"/>
-                  </a:fillRef>
-                  <a:effectRef idx="0">
-                    <a:scrgbClr r="0" g="0" b="0"/>
-                  </a:effectRef>
-                  <a:fontRef idx="minor">
-                    <a:schemeClr val="tx1"/>
-                  </a:fontRef>
-                </p:style>
-              </p:cxnSp>
-              <p:grpSp>
-                <p:nvGrpSpPr>
-                  <p:cNvPr id="37" name="Group 36">
-                    <a:extLst>
-                      <a:ext uri="{FF2B5EF4-FFF2-40B4-BE49-F238E27FC236}">
-                        <a16:creationId xmlns:a16="http://schemas.microsoft.com/office/drawing/2014/main" id="{10B3FD14-09BF-4FE2-83C6-39DF5D062AED}"/>
-                      </a:ext>
-                    </a:extLst>
-                  </p:cNvPr>
-                  <p:cNvGrpSpPr/>
-                  <p:nvPr/>
-                </p:nvGrpSpPr>
-                <p:grpSpPr>
-                  <a:xfrm>
-                    <a:off x="3467128" y="1081192"/>
-                    <a:ext cx="1447688" cy="595208"/>
-                    <a:chOff x="3467128" y="1081192"/>
-                    <a:chExt cx="1447688" cy="595208"/>
-                  </a:xfrm>
-                </p:grpSpPr>
-                <p:sp>
-                  <p:nvSpPr>
-                    <p:cNvPr id="3" name="Isosceles Triangle 2">
-                      <a:extLst>
-                        <a:ext uri="{FF2B5EF4-FFF2-40B4-BE49-F238E27FC236}">
-                          <a16:creationId xmlns:a16="http://schemas.microsoft.com/office/drawing/2014/main" id="{300F60FC-B297-4EE3-A4FC-6BCF26A85C42}"/>
-                        </a:ext>
-                      </a:extLst>
-                    </p:cNvPr>
-                    <p:cNvSpPr/>
-                    <p:nvPr/>
-                  </p:nvSpPr>
-                  <p:spPr>
-                    <a:xfrm>
-                      <a:off x="4038600" y="1447800"/>
-                      <a:ext cx="304800" cy="228600"/>
-                    </a:xfrm>
-                    <a:prstGeom prst="triangle">
-                      <a:avLst/>
-                    </a:prstGeom>
-                    <a:solidFill>
-                      <a:schemeClr val="accent4">
-                        <a:lumMod val="60000"/>
-                        <a:lumOff val="40000"/>
-                      </a:schemeClr>
-                    </a:solidFill>
-                    <a:ln>
-                      <a:solidFill>
-                        <a:srgbClr val="7030A0"/>
-                      </a:solidFill>
-                    </a:ln>
-                  </p:spPr>
-                  <p:style>
-                    <a:lnRef idx="2">
-                      <a:schemeClr val="accent1">
-                        <a:shade val="50000"/>
-                      </a:schemeClr>
-                    </a:lnRef>
-                    <a:fillRef idx="1">
-                      <a:schemeClr val="accent1"/>
-                    </a:fillRef>
-                    <a:effectRef idx="0">
-                      <a:schemeClr val="accent1"/>
-                    </a:effectRef>
-                    <a:fontRef idx="minor">
-                      <a:schemeClr val="lt1"/>
-                    </a:fontRef>
-                  </p:style>
-                  <p:txBody>
-                    <a:bodyPr rtlCol="0" anchor="ctr"/>
-                    <a:lstStyle/>
-                    <a:p>
-                      <a:pPr algn="ctr"/>
-                      <a:endParaRPr lang="en-SG" b="1"/>
-                    </a:p>
-                  </p:txBody>
-                </p:sp>
-                <p:sp>
-                  <p:nvSpPr>
-                    <p:cNvPr id="43" name="Rectangle 8">
-                      <a:extLst>
-                        <a:ext uri="{FF2B5EF4-FFF2-40B4-BE49-F238E27FC236}">
-                          <a16:creationId xmlns:a16="http://schemas.microsoft.com/office/drawing/2014/main" id="{512CB70F-C230-4DEB-ABC6-A3BCDB90D67C}"/>
-                        </a:ext>
-                      </a:extLst>
-                    </p:cNvPr>
-                    <p:cNvSpPr/>
-                    <p:nvPr/>
-                  </p:nvSpPr>
-                  <p:spPr>
-                    <a:xfrm>
-                      <a:off x="3467128" y="1081192"/>
-                      <a:ext cx="1447688" cy="346760"/>
-                    </a:xfrm>
-                    <a:prstGeom prst="rect">
-                      <a:avLst/>
-                    </a:prstGeom>
-                    <a:ln w="19050">
-                      <a:solidFill>
-                        <a:srgbClr val="7030A0"/>
-                      </a:solidFill>
-                    </a:ln>
-                    <a:effectLst/>
-                  </p:spPr>
-                  <p:style>
-                    <a:lnRef idx="1">
-                      <a:schemeClr val="accent4"/>
-                    </a:lnRef>
-                    <a:fillRef idx="2">
-                      <a:schemeClr val="accent4"/>
-                    </a:fillRef>
-                    <a:effectRef idx="1">
-                      <a:schemeClr val="accent4"/>
-                    </a:effectRef>
-                    <a:fontRef idx="minor">
-                      <a:schemeClr val="dk1"/>
-                    </a:fontRef>
-                  </p:style>
-                  <p:txBody>
-                    <a:bodyPr rtlCol="0" anchor="ctr"/>
-                    <a:lstStyle/>
-                    <a:p>
-                      <a:pPr algn="ctr"/>
-                      <a:r>
-                        <a:rPr lang="en-US" sz="1050" b="1" dirty="0">
-                          <a:solidFill>
-                            <a:srgbClr val="7030A0"/>
-                          </a:solidFill>
-                        </a:rPr>
-                        <a:t>&lt;&lt;interface&gt;&gt;</a:t>
-                      </a:r>
-                    </a:p>
-                    <a:p>
-                      <a:pPr algn="ctr"/>
-                      <a:r>
-                        <a:rPr lang="en-US" sz="1050" b="1" dirty="0" err="1">
-                          <a:solidFill>
-                            <a:srgbClr val="7030A0"/>
-                          </a:solidFill>
-                        </a:rPr>
-                        <a:t>CourseRequirement</a:t>
-                      </a:r>
-                      <a:endParaRPr lang="en-SG" sz="1050" b="1" dirty="0">
-                        <a:solidFill>
-                          <a:srgbClr val="7030A0"/>
-                        </a:solidFill>
-                      </a:endParaRPr>
-                    </a:p>
-                  </p:txBody>
-                </p:sp>
-              </p:grpSp>
-              <p:cxnSp>
-                <p:nvCxnSpPr>
-                  <p:cNvPr id="57" name="Connector: Elbow 56">
-                    <a:extLst>
-                      <a:ext uri="{FF2B5EF4-FFF2-40B4-BE49-F238E27FC236}">
-                        <a16:creationId xmlns:a16="http://schemas.microsoft.com/office/drawing/2014/main" id="{12CB6F8F-6C38-4CCD-92F0-A4B7AC8C6238}"/>
-                      </a:ext>
-                    </a:extLst>
-                  </p:cNvPr>
-                  <p:cNvCxnSpPr>
-                    <a:cxnSpLocks/>
-                    <a:stCxn id="56" idx="0"/>
-                    <a:endCxn id="3" idx="3"/>
-                  </p:cNvCxnSpPr>
-                  <p:nvPr/>
-                </p:nvCxnSpPr>
-                <p:spPr>
-                  <a:xfrm rot="16200000" flipV="1">
-                    <a:off x="4486233" y="1381167"/>
-                    <a:ext cx="533400" cy="1123866"/>
-                  </a:xfrm>
-                  <a:prstGeom prst="bentConnector3">
-                    <a:avLst>
-                      <a:gd name="adj1" fmla="val 50000"/>
-                    </a:avLst>
-                  </a:prstGeom>
-                  <a:ln w="19050" cap="flat" cmpd="sng" algn="ctr">
-                    <a:solidFill>
-                      <a:schemeClr val="accent4"/>
-                    </a:solidFill>
-                    <a:prstDash val="dash"/>
-                    <a:round/>
-                    <a:headEnd type="none" w="med" len="med"/>
-                    <a:tailEnd type="none" w="med" len="med"/>
-                  </a:ln>
-                </p:spPr>
-                <p:style>
-                  <a:lnRef idx="0">
-                    <a:scrgbClr r="0" g="0" b="0"/>
-                  </a:lnRef>
-                  <a:fillRef idx="0">
-                    <a:scrgbClr r="0" g="0" b="0"/>
-                  </a:fillRef>
-                  <a:effectRef idx="0">
-                    <a:scrgbClr r="0" g="0" b="0"/>
-                  </a:effectRef>
-                  <a:fontRef idx="minor">
-                    <a:schemeClr val="tx1"/>
-                  </a:fontRef>
-                </p:style>
-              </p:cxnSp>
-              <p:cxnSp>
-                <p:nvCxnSpPr>
-                  <p:cNvPr id="74" name="Connector: Elbow 73">
-                    <a:extLst>
-                      <a:ext uri="{FF2B5EF4-FFF2-40B4-BE49-F238E27FC236}">
-                        <a16:creationId xmlns:a16="http://schemas.microsoft.com/office/drawing/2014/main" id="{7B11940B-2868-4E0D-80FA-5E39116CB4F1}"/>
-                      </a:ext>
-                    </a:extLst>
-                  </p:cNvPr>
-                  <p:cNvCxnSpPr>
-                    <a:cxnSpLocks/>
-                  </p:cNvCxnSpPr>
-                  <p:nvPr/>
-                </p:nvCxnSpPr>
-                <p:spPr>
-                  <a:xfrm flipH="1" flipV="1">
-                    <a:off x="4914816" y="1251278"/>
-                    <a:ext cx="1422264" cy="1128608"/>
-                  </a:xfrm>
-                  <a:prstGeom prst="bentConnector3">
-                    <a:avLst>
-                      <a:gd name="adj1" fmla="val -16073"/>
-                    </a:avLst>
-                  </a:prstGeom>
-                  <a:ln w="19050" cap="flat" cmpd="sng" algn="ctr">
-                    <a:solidFill>
-                      <a:schemeClr val="accent4"/>
-                    </a:solidFill>
-                    <a:prstDash val="solid"/>
-                    <a:round/>
-                    <a:headEnd type="none" w="med" len="med"/>
-                    <a:tailEnd type="arrow" w="med" len="med"/>
-                  </a:ln>
-                </p:spPr>
-                <p:style>
-                  <a:lnRef idx="0">
-                    <a:scrgbClr r="0" g="0" b="0"/>
-                  </a:lnRef>
-                  <a:fillRef idx="0">
-                    <a:scrgbClr r="0" g="0" b="0"/>
-                  </a:fillRef>
-                  <a:effectRef idx="0">
-                    <a:scrgbClr r="0" g="0" b="0"/>
-                  </a:effectRef>
-                  <a:fontRef idx="minor">
-                    <a:schemeClr val="tx1"/>
-                  </a:fontRef>
-                </p:style>
-              </p:cxnSp>
-            </p:grpSp>
-          </p:grpSp>
-        </p:grpSp>
-        <p:sp>
-          <p:nvSpPr>
-            <p:cNvPr id="34" name="TextBox 33">
-              <a:extLst>
-                <a:ext uri="{FF2B5EF4-FFF2-40B4-BE49-F238E27FC236}">
-                  <a16:creationId xmlns:a16="http://schemas.microsoft.com/office/drawing/2014/main" id="{053E223F-AAC3-41CA-B983-768936C4BD3C}"/>
-                </a:ext>
-              </a:extLst>
-            </p:cNvPr>
-            <p:cNvSpPr txBox="1"/>
-            <p:nvPr/>
-          </p:nvSpPr>
-          <p:spPr>
-            <a:xfrm>
-              <a:off x="5035317" y="1014425"/>
-              <a:ext cx="228600" cy="276999"/>
-            </a:xfrm>
-            <a:prstGeom prst="rect">
-              <a:avLst/>
-            </a:prstGeom>
-            <a:noFill/>
-          </p:spPr>
-          <p:txBody>
-            <a:bodyPr wrap="square" rtlCol="0">
-              <a:spAutoFit/>
-            </a:bodyPr>
-            <a:lstStyle/>
-            <a:p>
-              <a:r>
-                <a:rPr lang="en-US" sz="1200" b="1" dirty="0"/>
-                <a:t>2</a:t>
-              </a:r>
-              <a:endParaRPr lang="en-SG" sz="1200" b="1" dirty="0"/>
-            </a:p>
-          </p:txBody>
-        </p:sp>
-      </p:grpSp>
+              </a:rPr>
+              <a:t>*</a:t>
+            </a:r>
+            <a:endParaRPr lang="en-SG" sz="1100" dirty="0">
+              <a:solidFill>
+                <a:srgbClr val="7030A0"/>
+              </a:solidFill>
+            </a:endParaRPr>
+          </a:p>
+        </p:txBody>
+      </p:sp>
+      <p:sp>
+        <p:nvSpPr>
+          <p:cNvPr id="55" name="Flowchart: Decision 96">
+            <a:extLst>
+              <a:ext uri="{FF2B5EF4-FFF2-40B4-BE49-F238E27FC236}">
+                <a16:creationId xmlns:a16="http://schemas.microsoft.com/office/drawing/2014/main" id="{B9F96195-942D-4692-91B7-CF34229E7461}"/>
+              </a:ext>
+            </a:extLst>
+          </p:cNvPr>
+          <p:cNvSpPr/>
+          <p:nvPr/>
+        </p:nvSpPr>
+        <p:spPr>
+          <a:xfrm rot="16200000">
+            <a:off x="5521988" y="3154431"/>
+            <a:ext cx="236048" cy="173380"/>
+          </a:xfrm>
+          <a:prstGeom prst="flowChartDecision">
+            <a:avLst/>
+          </a:prstGeom>
+          <a:noFill/>
+          <a:ln w="19050">
+            <a:solidFill>
+              <a:srgbClr val="7030A0"/>
+            </a:solidFill>
+          </a:ln>
+          <a:effectLst/>
+        </p:spPr>
+        <p:style>
+          <a:lnRef idx="1">
+            <a:schemeClr val="accent6"/>
+          </a:lnRef>
+          <a:fillRef idx="2">
+            <a:schemeClr val="accent6"/>
+          </a:fillRef>
+          <a:effectRef idx="1">
+            <a:schemeClr val="accent6"/>
+          </a:effectRef>
+          <a:fontRef idx="minor">
+            <a:schemeClr val="dk1"/>
+          </a:fontRef>
+        </p:style>
+        <p:txBody>
+          <a:bodyPr rtlCol="0" anchor="ctr"/>
+          <a:lstStyle/>
+          <a:p>
+            <a:pPr algn="ctr"/>
+            <a:endParaRPr lang="en-US" sz="1050"/>
+          </a:p>
+        </p:txBody>
+      </p:sp>
+      <p:cxnSp>
+        <p:nvCxnSpPr>
+          <p:cNvPr id="59" name="Elbow Connector 63">
+            <a:extLst>
+              <a:ext uri="{FF2B5EF4-FFF2-40B4-BE49-F238E27FC236}">
+                <a16:creationId xmlns:a16="http://schemas.microsoft.com/office/drawing/2014/main" id="{E2D6A56C-A223-4236-A1F0-7EFEBA2FC940}"/>
+              </a:ext>
+            </a:extLst>
+          </p:cNvPr>
+          <p:cNvCxnSpPr>
+            <a:cxnSpLocks/>
+            <a:endCxn id="67" idx="1"/>
+          </p:cNvCxnSpPr>
+          <p:nvPr/>
+        </p:nvCxnSpPr>
+        <p:spPr>
+          <a:xfrm flipV="1">
+            <a:off x="4852786" y="2722716"/>
+            <a:ext cx="432916" cy="111294"/>
+          </a:xfrm>
+          <a:prstGeom prst="bentConnector3">
+            <a:avLst/>
+          </a:prstGeom>
+          <a:ln w="19050">
+            <a:solidFill>
+              <a:srgbClr val="7030A0"/>
+            </a:solidFill>
+            <a:headEnd type="none" w="med" len="med"/>
+            <a:tailEnd type="arrow" w="med" len="med"/>
+          </a:ln>
+          <a:effectLst/>
+        </p:spPr>
+        <p:style>
+          <a:lnRef idx="1">
+            <a:schemeClr val="accent2"/>
+          </a:lnRef>
+          <a:fillRef idx="2">
+            <a:schemeClr val="accent2"/>
+          </a:fillRef>
+          <a:effectRef idx="1">
+            <a:schemeClr val="accent2"/>
+          </a:effectRef>
+          <a:fontRef idx="minor">
+            <a:schemeClr val="dk1"/>
+          </a:fontRef>
+        </p:style>
+      </p:cxnSp>
+      <p:sp>
+        <p:nvSpPr>
+          <p:cNvPr id="67" name="Rectangle 8">
+            <a:extLst>
+              <a:ext uri="{FF2B5EF4-FFF2-40B4-BE49-F238E27FC236}">
+                <a16:creationId xmlns:a16="http://schemas.microsoft.com/office/drawing/2014/main" id="{36D68104-33BB-4C8F-B764-F3F0B25E592B}"/>
+              </a:ext>
+            </a:extLst>
+          </p:cNvPr>
+          <p:cNvSpPr/>
+          <p:nvPr/>
+        </p:nvSpPr>
+        <p:spPr>
+          <a:xfrm>
+            <a:off x="5285702" y="2549336"/>
+            <a:ext cx="708186" cy="346760"/>
+          </a:xfrm>
+          <a:prstGeom prst="rect">
+            <a:avLst/>
+          </a:prstGeom>
+          <a:ln w="19050">
+            <a:solidFill>
+              <a:srgbClr val="7030A0"/>
+            </a:solidFill>
+          </a:ln>
+          <a:effectLst/>
+        </p:spPr>
+        <p:style>
+          <a:lnRef idx="1">
+            <a:schemeClr val="accent4"/>
+          </a:lnRef>
+          <a:fillRef idx="2">
+            <a:schemeClr val="accent4"/>
+          </a:fillRef>
+          <a:effectRef idx="1">
+            <a:schemeClr val="accent4"/>
+          </a:effectRef>
+          <a:fontRef idx="minor">
+            <a:schemeClr val="dk1"/>
+          </a:fontRef>
+        </p:style>
+        <p:txBody>
+          <a:bodyPr rtlCol="0" anchor="ctr"/>
+          <a:lstStyle/>
+          <a:p>
+            <a:pPr algn="ctr"/>
+            <a:r>
+              <a:rPr lang="en-US" sz="1050" dirty="0">
+                <a:solidFill>
+                  <a:srgbClr val="7030A0"/>
+                </a:solidFill>
+              </a:rPr>
+              <a:t>Tag</a:t>
+            </a:r>
+            <a:endParaRPr lang="en-SG" sz="1050" dirty="0">
+              <a:solidFill>
+                <a:srgbClr val="7030A0"/>
+              </a:solidFill>
+            </a:endParaRPr>
+          </a:p>
+        </p:txBody>
+      </p:sp>
+      <p:sp>
+        <p:nvSpPr>
+          <p:cNvPr id="68" name="TextBox 67">
+            <a:extLst>
+              <a:ext uri="{FF2B5EF4-FFF2-40B4-BE49-F238E27FC236}">
+                <a16:creationId xmlns:a16="http://schemas.microsoft.com/office/drawing/2014/main" id="{18A2ABF0-4DA8-43EE-BACE-A737C4E4CFEC}"/>
+              </a:ext>
+            </a:extLst>
+          </p:cNvPr>
+          <p:cNvSpPr txBox="1"/>
+          <p:nvPr/>
+        </p:nvSpPr>
+        <p:spPr>
+          <a:xfrm>
+            <a:off x="5103762" y="2767724"/>
+            <a:ext cx="189257" cy="178683"/>
+          </a:xfrm>
+          <a:prstGeom prst="rect">
+            <a:avLst/>
+          </a:prstGeom>
+          <a:noFill/>
+        </p:spPr>
+        <p:txBody>
+          <a:bodyPr wrap="square" lIns="0" tIns="0" rIns="0" bIns="0" rtlCol="0">
+            <a:noAutofit/>
+          </a:bodyPr>
+          <a:lstStyle/>
+          <a:p>
+            <a:pPr algn="ctr"/>
+            <a:r>
+              <a:rPr lang="en-US" sz="1100" dirty="0">
+                <a:solidFill>
+                  <a:srgbClr val="7030A0"/>
+                </a:solidFill>
+              </a:rPr>
+              <a:t>*</a:t>
+            </a:r>
+            <a:endParaRPr lang="en-SG" sz="1100" dirty="0">
+              <a:solidFill>
+                <a:srgbClr val="7030A0"/>
+              </a:solidFill>
+            </a:endParaRPr>
+          </a:p>
+        </p:txBody>
+      </p:sp>
+      <p:sp>
+        <p:nvSpPr>
+          <p:cNvPr id="69" name="TextBox 68">
+            <a:extLst>
+              <a:ext uri="{FF2B5EF4-FFF2-40B4-BE49-F238E27FC236}">
+                <a16:creationId xmlns:a16="http://schemas.microsoft.com/office/drawing/2014/main" id="{8CF9406A-39C7-4163-8880-BB65541FC08E}"/>
+              </a:ext>
+            </a:extLst>
+          </p:cNvPr>
+          <p:cNvSpPr txBox="1"/>
+          <p:nvPr/>
+        </p:nvSpPr>
+        <p:spPr>
+          <a:xfrm>
+            <a:off x="3335606" y="2662682"/>
+            <a:ext cx="189257" cy="178683"/>
+          </a:xfrm>
+          <a:prstGeom prst="rect">
+            <a:avLst/>
+          </a:prstGeom>
+          <a:noFill/>
+        </p:spPr>
+        <p:txBody>
+          <a:bodyPr wrap="square" lIns="0" tIns="0" rIns="0" bIns="0" rtlCol="0">
+            <a:noAutofit/>
+          </a:bodyPr>
+          <a:lstStyle/>
+          <a:p>
+            <a:pPr algn="ctr"/>
+            <a:r>
+              <a:rPr lang="en-US" sz="1100" dirty="0">
+                <a:solidFill>
+                  <a:srgbClr val="7030A0"/>
+                </a:solidFill>
+              </a:rPr>
+              <a:t>1</a:t>
+            </a:r>
+            <a:endParaRPr lang="en-SG" sz="1100" dirty="0">
+              <a:solidFill>
+                <a:srgbClr val="7030A0"/>
+              </a:solidFill>
+            </a:endParaRPr>
+          </a:p>
+        </p:txBody>
+      </p:sp>
+      <p:sp>
+        <p:nvSpPr>
+          <p:cNvPr id="71" name="Flowchart: Decision 96">
+            <a:extLst>
+              <a:ext uri="{FF2B5EF4-FFF2-40B4-BE49-F238E27FC236}">
+                <a16:creationId xmlns:a16="http://schemas.microsoft.com/office/drawing/2014/main" id="{233007D4-EEA2-4CA6-ACFE-1517B654224E}"/>
+              </a:ext>
+            </a:extLst>
+          </p:cNvPr>
+          <p:cNvSpPr/>
+          <p:nvPr/>
+        </p:nvSpPr>
+        <p:spPr>
+          <a:xfrm>
+            <a:off x="4879835" y="2751791"/>
+            <a:ext cx="236048" cy="173380"/>
+          </a:xfrm>
+          <a:prstGeom prst="flowChartDecision">
+            <a:avLst/>
+          </a:prstGeom>
+          <a:solidFill>
+            <a:srgbClr val="7030A0"/>
+          </a:solidFill>
+          <a:ln w="19050">
+            <a:solidFill>
+              <a:srgbClr val="7030A0"/>
+            </a:solidFill>
+          </a:ln>
+          <a:effectLst/>
+        </p:spPr>
+        <p:style>
+          <a:lnRef idx="1">
+            <a:schemeClr val="accent6"/>
+          </a:lnRef>
+          <a:fillRef idx="2">
+            <a:schemeClr val="accent6"/>
+          </a:fillRef>
+          <a:effectRef idx="1">
+            <a:schemeClr val="accent6"/>
+          </a:effectRef>
+          <a:fontRef idx="minor">
+            <a:schemeClr val="dk1"/>
+          </a:fontRef>
+        </p:style>
+        <p:txBody>
+          <a:bodyPr rtlCol="0" anchor="ctr"/>
+          <a:lstStyle/>
+          <a:p>
+            <a:pPr algn="ctr"/>
+            <a:endParaRPr lang="en-US" sz="1050"/>
+          </a:p>
+        </p:txBody>
+      </p:sp>
+      <p:cxnSp>
+        <p:nvCxnSpPr>
+          <p:cNvPr id="72" name="Elbow Connector 78">
+            <a:extLst>
+              <a:ext uri="{FF2B5EF4-FFF2-40B4-BE49-F238E27FC236}">
+                <a16:creationId xmlns:a16="http://schemas.microsoft.com/office/drawing/2014/main" id="{D5DFB8C5-B0B0-46C1-967B-4449112ABD6F}"/>
+              </a:ext>
+            </a:extLst>
+          </p:cNvPr>
+          <p:cNvCxnSpPr>
+            <a:cxnSpLocks/>
+            <a:stCxn id="55" idx="3"/>
+            <a:endCxn id="67" idx="2"/>
+          </p:cNvCxnSpPr>
+          <p:nvPr/>
+        </p:nvCxnSpPr>
+        <p:spPr>
+          <a:xfrm rot="16200000" flipV="1">
+            <a:off x="5526404" y="3009488"/>
+            <a:ext cx="227001" cy="217"/>
+          </a:xfrm>
+          <a:prstGeom prst="bentConnector3">
+            <a:avLst>
+              <a:gd name="adj1" fmla="val 50000"/>
+            </a:avLst>
+          </a:prstGeom>
+          <a:ln w="19050">
+            <a:solidFill>
+              <a:srgbClr val="7030A0"/>
+            </a:solidFill>
+            <a:headEnd type="none" w="med" len="med"/>
+            <a:tailEnd type="arrow" w="med" len="med"/>
+          </a:ln>
+          <a:effectLst/>
+        </p:spPr>
+        <p:style>
+          <a:lnRef idx="1">
+            <a:schemeClr val="accent2"/>
+          </a:lnRef>
+          <a:fillRef idx="2">
+            <a:schemeClr val="accent2"/>
+          </a:fillRef>
+          <a:effectRef idx="1">
+            <a:schemeClr val="accent2"/>
+          </a:effectRef>
+          <a:fontRef idx="minor">
+            <a:schemeClr val="dk1"/>
+          </a:fontRef>
+        </p:style>
+      </p:cxnSp>
     </p:spTree>
     <p:extLst>
       <p:ext uri="{BB962C8B-B14F-4D97-AF65-F5344CB8AC3E}">

</xml_diff>

<commit_message>
Final updates to developers guide for v1.4
</commit_message>
<xml_diff>
--- a/docs/diagrams/ModelComponentClassBetterOopDiagram.pptx
+++ b/docs/diagrams/ModelComponentClassBetterOopDiagram.pptx
@@ -208,7 +208,7 @@
           <a:p>
             <a:fld id="{F5CC4B3F-88C1-4FFA-B1B6-F41C21DC6924}" type="datetimeFigureOut">
               <a:rPr lang="en-US" smtClean="0"/>
-              <a:t>3/17/2019</a:t>
+              <a:t>4/15/2019</a:t>
             </a:fld>
             <a:endParaRPr lang="en-US"/>
           </a:p>
@@ -654,7 +654,7 @@
           <a:p>
             <a:fld id="{78C97017-6FC3-485B-9764-EAC9E56C1D49}" type="datetimeFigureOut">
               <a:rPr lang="en-US" smtClean="0"/>
-              <a:t>3/17/2019</a:t>
+              <a:t>4/15/2019</a:t>
             </a:fld>
             <a:endParaRPr lang="en-US"/>
           </a:p>
@@ -822,7 +822,7 @@
           <a:p>
             <a:fld id="{78C97017-6FC3-485B-9764-EAC9E56C1D49}" type="datetimeFigureOut">
               <a:rPr lang="en-US" smtClean="0"/>
-              <a:t>3/17/2019</a:t>
+              <a:t>4/15/2019</a:t>
             </a:fld>
             <a:endParaRPr lang="en-US"/>
           </a:p>
@@ -1000,7 +1000,7 @@
           <a:p>
             <a:fld id="{78C97017-6FC3-485B-9764-EAC9E56C1D49}" type="datetimeFigureOut">
               <a:rPr lang="en-US" smtClean="0"/>
-              <a:t>3/17/2019</a:t>
+              <a:t>4/15/2019</a:t>
             </a:fld>
             <a:endParaRPr lang="en-US"/>
           </a:p>
@@ -1168,7 +1168,7 @@
           <a:p>
             <a:fld id="{78C97017-6FC3-485B-9764-EAC9E56C1D49}" type="datetimeFigureOut">
               <a:rPr lang="en-US" smtClean="0"/>
-              <a:t>3/17/2019</a:t>
+              <a:t>4/15/2019</a:t>
             </a:fld>
             <a:endParaRPr lang="en-US"/>
           </a:p>
@@ -1413,7 +1413,7 @@
           <a:p>
             <a:fld id="{78C97017-6FC3-485B-9764-EAC9E56C1D49}" type="datetimeFigureOut">
               <a:rPr lang="en-US" smtClean="0"/>
-              <a:t>3/17/2019</a:t>
+              <a:t>4/15/2019</a:t>
             </a:fld>
             <a:endParaRPr lang="en-US"/>
           </a:p>
@@ -1698,7 +1698,7 @@
           <a:p>
             <a:fld id="{78C97017-6FC3-485B-9764-EAC9E56C1D49}" type="datetimeFigureOut">
               <a:rPr lang="en-US" smtClean="0"/>
-              <a:t>3/17/2019</a:t>
+              <a:t>4/15/2019</a:t>
             </a:fld>
             <a:endParaRPr lang="en-US"/>
           </a:p>
@@ -2117,7 +2117,7 @@
           <a:p>
             <a:fld id="{78C97017-6FC3-485B-9764-EAC9E56C1D49}" type="datetimeFigureOut">
               <a:rPr lang="en-US" smtClean="0"/>
-              <a:t>3/17/2019</a:t>
+              <a:t>4/15/2019</a:t>
             </a:fld>
             <a:endParaRPr lang="en-US"/>
           </a:p>
@@ -2234,7 +2234,7 @@
           <a:p>
             <a:fld id="{78C97017-6FC3-485B-9764-EAC9E56C1D49}" type="datetimeFigureOut">
               <a:rPr lang="en-US" smtClean="0"/>
-              <a:t>3/17/2019</a:t>
+              <a:t>4/15/2019</a:t>
             </a:fld>
             <a:endParaRPr lang="en-US"/>
           </a:p>
@@ -2329,7 +2329,7 @@
           <a:p>
             <a:fld id="{78C97017-6FC3-485B-9764-EAC9E56C1D49}" type="datetimeFigureOut">
               <a:rPr lang="en-US" smtClean="0"/>
-              <a:t>3/17/2019</a:t>
+              <a:t>4/15/2019</a:t>
             </a:fld>
             <a:endParaRPr lang="en-US"/>
           </a:p>
@@ -2604,7 +2604,7 @@
           <a:p>
             <a:fld id="{78C97017-6FC3-485B-9764-EAC9E56C1D49}" type="datetimeFigureOut">
               <a:rPr lang="en-US" smtClean="0"/>
-              <a:t>3/17/2019</a:t>
+              <a:t>4/15/2019</a:t>
             </a:fld>
             <a:endParaRPr lang="en-US"/>
           </a:p>
@@ -2856,7 +2856,7 @@
           <a:p>
             <a:fld id="{78C97017-6FC3-485B-9764-EAC9E56C1D49}" type="datetimeFigureOut">
               <a:rPr lang="en-US" smtClean="0"/>
-              <a:t>3/17/2019</a:t>
+              <a:t>4/15/2019</a:t>
             </a:fld>
             <a:endParaRPr lang="en-US"/>
           </a:p>
@@ -3067,7 +3067,7 @@
           <a:p>
             <a:fld id="{78C97017-6FC3-485B-9764-EAC9E56C1D49}" type="datetimeFigureOut">
               <a:rPr lang="en-US" smtClean="0"/>
-              <a:t>3/17/2019</a:t>
+              <a:t>4/15/2019</a:t>
             </a:fld>
             <a:endParaRPr lang="en-US"/>
           </a:p>
@@ -4833,7 +4833,6 @@
           <p:cNvCxnSpPr>
             <a:cxnSpLocks/>
             <a:stCxn id="78" idx="3"/>
-            <a:endCxn id="44" idx="1"/>
           </p:cNvCxnSpPr>
           <p:nvPr/>
         </p:nvCxnSpPr>
@@ -4873,10 +4872,55 @@
       </p:cxnSp>
       <p:sp>
         <p:nvSpPr>
-          <p:cNvPr id="44" name="Rectangle 8">
+          <p:cNvPr id="47" name="TextBox 46">
             <a:extLst>
               <a:ext uri="{FF2B5EF4-FFF2-40B4-BE49-F238E27FC236}">
-                <a16:creationId xmlns:a16="http://schemas.microsoft.com/office/drawing/2014/main" id="{537203D7-2A9E-4C8C-A72A-204BA82BF9D0}"/>
+                <a16:creationId xmlns:a16="http://schemas.microsoft.com/office/drawing/2014/main" id="{EF9E703D-C40D-483E-97DD-94EA44483C07}"/>
+              </a:ext>
+            </a:extLst>
+          </p:cNvPr>
+          <p:cNvSpPr txBox="1"/>
+          <p:nvPr/>
+        </p:nvSpPr>
+        <p:spPr>
+          <a:xfrm>
+            <a:off x="6446747" y="4362417"/>
+            <a:ext cx="189257" cy="178683"/>
+          </a:xfrm>
+          <a:prstGeom prst="rect">
+            <a:avLst/>
+          </a:prstGeom>
+          <a:noFill/>
+        </p:spPr>
+        <p:txBody>
+          <a:bodyPr wrap="square" lIns="0" tIns="0" rIns="0" bIns="0" rtlCol="0">
+            <a:noAutofit/>
+          </a:bodyPr>
+          <a:lstStyle/>
+          <a:p>
+            <a:pPr algn="ctr"/>
+            <a:r>
+              <a:rPr lang="en-US" sz="1100" dirty="0">
+                <a:solidFill>
+                  <a:srgbClr val="7030A0"/>
+                </a:solidFill>
+              </a:rPr>
+              <a:t>*</a:t>
+            </a:r>
+            <a:endParaRPr lang="en-SG" sz="1100" dirty="0">
+              <a:solidFill>
+                <a:srgbClr val="7030A0"/>
+              </a:solidFill>
+            </a:endParaRPr>
+          </a:p>
+        </p:txBody>
+      </p:sp>
+      <p:sp>
+        <p:nvSpPr>
+          <p:cNvPr id="38" name="Rectangle 8">
+            <a:extLst>
+              <a:ext uri="{FF2B5EF4-FFF2-40B4-BE49-F238E27FC236}">
+                <a16:creationId xmlns:a16="http://schemas.microsoft.com/office/drawing/2014/main" id="{C0BB7C36-941D-4691-B904-25FDAF73D6C2}"/>
               </a:ext>
             </a:extLst>
           </p:cNvPr>
@@ -4885,7 +4929,7 @@
         </p:nvSpPr>
         <p:spPr>
           <a:xfrm>
-            <a:off x="6680903" y="4362417"/>
+            <a:off x="6680903" y="4356031"/>
             <a:ext cx="708186" cy="285783"/>
           </a:xfrm>
           <a:prstGeom prst="rect">
@@ -4933,48 +4977,261 @@
           </a:p>
         </p:txBody>
       </p:sp>
-      <p:sp>
-        <p:nvSpPr>
-          <p:cNvPr id="47" name="TextBox 46">
+      <p:cxnSp>
+        <p:nvCxnSpPr>
+          <p:cNvPr id="39" name="Elbow Connector 80">
             <a:extLst>
               <a:ext uri="{FF2B5EF4-FFF2-40B4-BE49-F238E27FC236}">
-                <a16:creationId xmlns:a16="http://schemas.microsoft.com/office/drawing/2014/main" id="{EF9E703D-C40D-483E-97DD-94EA44483C07}"/>
+                <a16:creationId xmlns:a16="http://schemas.microsoft.com/office/drawing/2014/main" id="{F620E5ED-284A-4C05-A782-D0B98BD0920F}"/>
               </a:ext>
             </a:extLst>
           </p:cNvPr>
-          <p:cNvSpPr txBox="1"/>
+          <p:cNvCxnSpPr>
+            <a:cxnSpLocks/>
+          </p:cNvCxnSpPr>
           <p:nvPr/>
+        </p:nvCxnSpPr>
+        <p:spPr>
+          <a:xfrm rot="16200000" flipV="1">
+            <a:off x="7365012" y="4204185"/>
+            <a:ext cx="318814" cy="270660"/>
+          </a:xfrm>
+          <a:prstGeom prst="bentConnector2">
+            <a:avLst/>
+          </a:prstGeom>
+          <a:ln w="19050">
+            <a:solidFill>
+              <a:srgbClr val="7030A0"/>
+            </a:solidFill>
+            <a:headEnd type="none" w="med" len="med"/>
+            <a:tailEnd type="arrow" w="med" len="med"/>
+          </a:ln>
+          <a:effectLst/>
+        </p:spPr>
+        <p:style>
+          <a:lnRef idx="1">
+            <a:schemeClr val="accent2"/>
+          </a:lnRef>
+          <a:fillRef idx="2">
+            <a:schemeClr val="accent2"/>
+          </a:fillRef>
+          <a:effectRef idx="1">
+            <a:schemeClr val="accent2"/>
+          </a:effectRef>
+          <a:fontRef idx="minor">
+            <a:schemeClr val="dk1"/>
+          </a:fontRef>
+        </p:style>
+      </p:cxnSp>
+      <p:cxnSp>
+        <p:nvCxnSpPr>
+          <p:cNvPr id="40" name="Elbow Connector 80">
+            <a:extLst>
+              <a:ext uri="{FF2B5EF4-FFF2-40B4-BE49-F238E27FC236}">
+                <a16:creationId xmlns:a16="http://schemas.microsoft.com/office/drawing/2014/main" id="{376D8DA7-7BEC-4B55-AF26-5EB02D25F7DE}"/>
+              </a:ext>
+            </a:extLst>
+          </p:cNvPr>
+          <p:cNvCxnSpPr>
+            <a:cxnSpLocks/>
+          </p:cNvCxnSpPr>
+          <p:nvPr/>
+        </p:nvCxnSpPr>
+        <p:spPr>
+          <a:xfrm flipH="1" flipV="1">
+            <a:off x="7389089" y="3857131"/>
+            <a:ext cx="253354" cy="641791"/>
+          </a:xfrm>
+          <a:prstGeom prst="bentConnector3">
+            <a:avLst>
+              <a:gd name="adj1" fmla="val -6579"/>
+            </a:avLst>
+          </a:prstGeom>
+          <a:ln w="19050">
+            <a:solidFill>
+              <a:srgbClr val="7030A0"/>
+            </a:solidFill>
+            <a:headEnd type="none" w="med" len="med"/>
+            <a:tailEnd type="arrow" w="med" len="med"/>
+          </a:ln>
+          <a:effectLst/>
+        </p:spPr>
+        <p:style>
+          <a:lnRef idx="1">
+            <a:schemeClr val="accent2"/>
+          </a:lnRef>
+          <a:fillRef idx="2">
+            <a:schemeClr val="accent2"/>
+          </a:fillRef>
+          <a:effectRef idx="1">
+            <a:schemeClr val="accent2"/>
+          </a:effectRef>
+          <a:fontRef idx="minor">
+            <a:schemeClr val="dk1"/>
+          </a:fontRef>
+        </p:style>
+      </p:cxnSp>
+      <p:cxnSp>
+        <p:nvCxnSpPr>
+          <p:cNvPr id="42" name="Elbow Connector 80">
+            <a:extLst>
+              <a:ext uri="{FF2B5EF4-FFF2-40B4-BE49-F238E27FC236}">
+                <a16:creationId xmlns:a16="http://schemas.microsoft.com/office/drawing/2014/main" id="{E041CA92-5B9A-416A-B429-F35669A4FD4B}"/>
+              </a:ext>
+            </a:extLst>
+          </p:cNvPr>
+          <p:cNvCxnSpPr>
+            <a:cxnSpLocks/>
+            <a:endCxn id="43" idx="3"/>
+          </p:cNvCxnSpPr>
+          <p:nvPr/>
+        </p:nvCxnSpPr>
+        <p:spPr>
+          <a:xfrm rot="10800000" flipV="1">
+            <a:off x="7185933" y="4498923"/>
+            <a:ext cx="473818" cy="459072"/>
+          </a:xfrm>
+          <a:prstGeom prst="bentConnector3">
+            <a:avLst>
+              <a:gd name="adj1" fmla="val 247"/>
+            </a:avLst>
+          </a:prstGeom>
+          <a:ln w="19050">
+            <a:solidFill>
+              <a:srgbClr val="7030A0"/>
+            </a:solidFill>
+            <a:headEnd type="none" w="med" len="med"/>
+            <a:tailEnd type="arrow" w="med" len="med"/>
+          </a:ln>
+          <a:effectLst/>
+        </p:spPr>
+        <p:style>
+          <a:lnRef idx="1">
+            <a:schemeClr val="accent2"/>
+          </a:lnRef>
+          <a:fillRef idx="2">
+            <a:schemeClr val="accent2"/>
+          </a:fillRef>
+          <a:effectRef idx="1">
+            <a:schemeClr val="accent2"/>
+          </a:effectRef>
+          <a:fontRef idx="minor">
+            <a:schemeClr val="dk1"/>
+          </a:fontRef>
+        </p:style>
+      </p:cxnSp>
+      <p:sp>
+        <p:nvSpPr>
+          <p:cNvPr id="43" name="Rectangle 8">
+            <a:extLst>
+              <a:ext uri="{FF2B5EF4-FFF2-40B4-BE49-F238E27FC236}">
+                <a16:creationId xmlns:a16="http://schemas.microsoft.com/office/drawing/2014/main" id="{C8A171F1-FC55-4762-ADF0-6D89D8323010}"/>
+              </a:ext>
+            </a:extLst>
+          </p:cNvPr>
+          <p:cNvSpPr/>
+          <p:nvPr/>
         </p:nvSpPr>
         <p:spPr>
           <a:xfrm>
-            <a:off x="6446747" y="4362417"/>
-            <a:ext cx="189257" cy="178683"/>
+            <a:off x="6200058" y="4815103"/>
+            <a:ext cx="985875" cy="285783"/>
           </a:xfrm>
           <a:prstGeom prst="rect">
             <a:avLst/>
           </a:prstGeom>
-          <a:noFill/>
-        </p:spPr>
-        <p:txBody>
-          <a:bodyPr wrap="square" lIns="0" tIns="0" rIns="0" bIns="0" rtlCol="0">
-            <a:noAutofit/>
-          </a:bodyPr>
+          <a:ln w="19050">
+            <a:solidFill>
+              <a:srgbClr val="7030A0"/>
+            </a:solidFill>
+          </a:ln>
+          <a:effectLst/>
+        </p:spPr>
+        <p:style>
+          <a:lnRef idx="1">
+            <a:schemeClr val="accent4"/>
+          </a:lnRef>
+          <a:fillRef idx="2">
+            <a:schemeClr val="accent4"/>
+          </a:fillRef>
+          <a:effectRef idx="1">
+            <a:schemeClr val="accent4"/>
+          </a:effectRef>
+          <a:fontRef idx="minor">
+            <a:schemeClr val="dk1"/>
+          </a:fontRef>
+        </p:style>
+        <p:txBody>
+          <a:bodyPr rtlCol="0" anchor="ctr"/>
           <a:lstStyle/>
           <a:p>
             <a:pPr algn="ctr"/>
             <a:r>
-              <a:rPr lang="en-US" sz="1100" dirty="0">
+              <a:rPr lang="en-US" sz="1050" dirty="0" err="1">
                 <a:solidFill>
                   <a:srgbClr val="7030A0"/>
                 </a:solidFill>
               </a:rPr>
-              <a:t>*</a:t>
-            </a:r>
-            <a:endParaRPr lang="en-SG" sz="1100" dirty="0">
+              <a:t>BatchNumber</a:t>
+            </a:r>
+            <a:endParaRPr lang="en-SG" sz="1050" dirty="0">
               <a:solidFill>
                 <a:srgbClr val="7030A0"/>
               </a:solidFill>
             </a:endParaRPr>
+          </a:p>
+        </p:txBody>
+      </p:sp>
+      <p:sp>
+        <p:nvSpPr>
+          <p:cNvPr id="45" name="Flowchart: Decision 96">
+            <a:extLst>
+              <a:ext uri="{FF2B5EF4-FFF2-40B4-BE49-F238E27FC236}">
+                <a16:creationId xmlns:a16="http://schemas.microsoft.com/office/drawing/2014/main" id="{ACF8F116-98FA-4D2E-9CA9-954C087C0154}"/>
+              </a:ext>
+            </a:extLst>
+          </p:cNvPr>
+          <p:cNvSpPr/>
+          <p:nvPr/>
+        </p:nvSpPr>
+        <p:spPr>
+          <a:xfrm>
+            <a:off x="7415048" y="4418619"/>
+            <a:ext cx="236048" cy="173380"/>
+          </a:xfrm>
+          <a:prstGeom prst="flowChartDecision">
+            <a:avLst/>
+          </a:prstGeom>
+          <a:solidFill>
+            <a:srgbClr val="7030A0"/>
+          </a:solidFill>
+          <a:ln w="19050">
+            <a:solidFill>
+              <a:srgbClr val="7030A0"/>
+            </a:solidFill>
+          </a:ln>
+          <a:effectLst/>
+        </p:spPr>
+        <p:style>
+          <a:lnRef idx="1">
+            <a:schemeClr val="accent6"/>
+          </a:lnRef>
+          <a:fillRef idx="2">
+            <a:schemeClr val="accent6"/>
+          </a:fillRef>
+          <a:effectRef idx="1">
+            <a:schemeClr val="accent6"/>
+          </a:effectRef>
+          <a:fontRef idx="minor">
+            <a:schemeClr val="dk1"/>
+          </a:fontRef>
+        </p:style>
+        <p:txBody>
+          <a:bodyPr rtlCol="0" anchor="ctr"/>
+          <a:lstStyle/>
+          <a:p>
+            <a:pPr algn="ctr"/>
+            <a:endParaRPr lang="en-US" sz="1050"/>
           </a:p>
         </p:txBody>
       </p:sp>

</xml_diff>

<commit_message>
Docs srs stats (#94)
* Docs: developer guide undo redo

* add Proficiency in model class diagram

* docs: dev guide for SRS and Stats

* Docs: add diagram for StatsCommand
</commit_message>
<xml_diff>
--- a/docs/diagrams/ModelComponentClassBetterOopDiagram.pptx
+++ b/docs/diagrams/ModelComponentClassBetterOopDiagram.pptx
@@ -208,7 +208,7 @@
           <a:p>
             <a:fld id="{F5CC4B3F-88C1-4FFA-B1B6-F41C21DC6924}" type="datetimeFigureOut">
               <a:rPr lang="en-US" smtClean="0"/>
-              <a:t>4/14/19</a:t>
+              <a:t>4/15/19</a:t>
             </a:fld>
             <a:endParaRPr lang="en-US"/>
           </a:p>
@@ -654,7 +654,7 @@
           <a:p>
             <a:fld id="{78C97017-6FC3-485B-9764-EAC9E56C1D49}" type="datetimeFigureOut">
               <a:rPr lang="en-US" smtClean="0"/>
-              <a:t>4/14/19</a:t>
+              <a:t>4/15/19</a:t>
             </a:fld>
             <a:endParaRPr lang="en-US"/>
           </a:p>
@@ -822,7 +822,7 @@
           <a:p>
             <a:fld id="{78C97017-6FC3-485B-9764-EAC9E56C1D49}" type="datetimeFigureOut">
               <a:rPr lang="en-US" smtClean="0"/>
-              <a:t>4/14/19</a:t>
+              <a:t>4/15/19</a:t>
             </a:fld>
             <a:endParaRPr lang="en-US"/>
           </a:p>
@@ -1000,7 +1000,7 @@
           <a:p>
             <a:fld id="{78C97017-6FC3-485B-9764-EAC9E56C1D49}" type="datetimeFigureOut">
               <a:rPr lang="en-US" smtClean="0"/>
-              <a:t>4/14/19</a:t>
+              <a:t>4/15/19</a:t>
             </a:fld>
             <a:endParaRPr lang="en-US"/>
           </a:p>
@@ -1168,7 +1168,7 @@
           <a:p>
             <a:fld id="{78C97017-6FC3-485B-9764-EAC9E56C1D49}" type="datetimeFigureOut">
               <a:rPr lang="en-US" smtClean="0"/>
-              <a:t>4/14/19</a:t>
+              <a:t>4/15/19</a:t>
             </a:fld>
             <a:endParaRPr lang="en-US"/>
           </a:p>
@@ -1413,7 +1413,7 @@
           <a:p>
             <a:fld id="{78C97017-6FC3-485B-9764-EAC9E56C1D49}" type="datetimeFigureOut">
               <a:rPr lang="en-US" smtClean="0"/>
-              <a:t>4/14/19</a:t>
+              <a:t>4/15/19</a:t>
             </a:fld>
             <a:endParaRPr lang="en-US"/>
           </a:p>
@@ -1698,7 +1698,7 @@
           <a:p>
             <a:fld id="{78C97017-6FC3-485B-9764-EAC9E56C1D49}" type="datetimeFigureOut">
               <a:rPr lang="en-US" smtClean="0"/>
-              <a:t>4/14/19</a:t>
+              <a:t>4/15/19</a:t>
             </a:fld>
             <a:endParaRPr lang="en-US"/>
           </a:p>
@@ -2117,7 +2117,7 @@
           <a:p>
             <a:fld id="{78C97017-6FC3-485B-9764-EAC9E56C1D49}" type="datetimeFigureOut">
               <a:rPr lang="en-US" smtClean="0"/>
-              <a:t>4/14/19</a:t>
+              <a:t>4/15/19</a:t>
             </a:fld>
             <a:endParaRPr lang="en-US"/>
           </a:p>
@@ -2234,7 +2234,7 @@
           <a:p>
             <a:fld id="{78C97017-6FC3-485B-9764-EAC9E56C1D49}" type="datetimeFigureOut">
               <a:rPr lang="en-US" smtClean="0"/>
-              <a:t>4/14/19</a:t>
+              <a:t>4/15/19</a:t>
             </a:fld>
             <a:endParaRPr lang="en-US"/>
           </a:p>
@@ -2329,7 +2329,7 @@
           <a:p>
             <a:fld id="{78C97017-6FC3-485B-9764-EAC9E56C1D49}" type="datetimeFigureOut">
               <a:rPr lang="en-US" smtClean="0"/>
-              <a:t>4/14/19</a:t>
+              <a:t>4/15/19</a:t>
             </a:fld>
             <a:endParaRPr lang="en-US"/>
           </a:p>
@@ -2604,7 +2604,7 @@
           <a:p>
             <a:fld id="{78C97017-6FC3-485B-9764-EAC9E56C1D49}" type="datetimeFigureOut">
               <a:rPr lang="en-US" smtClean="0"/>
-              <a:t>4/14/19</a:t>
+              <a:t>4/15/19</a:t>
             </a:fld>
             <a:endParaRPr lang="en-US"/>
           </a:p>
@@ -2856,7 +2856,7 @@
           <a:p>
             <a:fld id="{78C97017-6FC3-485B-9764-EAC9E56C1D49}" type="datetimeFigureOut">
               <a:rPr lang="en-US" smtClean="0"/>
-              <a:t>4/14/19</a:t>
+              <a:t>4/15/19</a:t>
             </a:fld>
             <a:endParaRPr lang="en-US"/>
           </a:p>
@@ -3067,7 +3067,7 @@
           <a:p>
             <a:fld id="{78C97017-6FC3-485B-9764-EAC9E56C1D49}" type="datetimeFigureOut">
               <a:rPr lang="en-US" smtClean="0"/>
-              <a:t>4/14/19</a:t>
+              <a:t>4/15/19</a:t>
             </a:fld>
             <a:endParaRPr lang="en-US"/>
           </a:p>
@@ -3753,7 +3753,7 @@
         <p:spPr>
           <a:xfrm>
             <a:off x="6911814" y="3053948"/>
-            <a:ext cx="756000" cy="285783"/>
+            <a:ext cx="865280" cy="285783"/>
           </a:xfrm>
           <a:prstGeom prst="rect">
             <a:avLst/>
@@ -3896,7 +3896,7 @@
         <p:spPr>
           <a:xfrm>
             <a:off x="6911814" y="3376926"/>
-            <a:ext cx="756000" cy="285783"/>
+            <a:ext cx="865280" cy="285783"/>
           </a:xfrm>
           <a:prstGeom prst="rect">
             <a:avLst/>
@@ -3947,6 +3947,7 @@
         <p:nvCxnSpPr>
           <p:cNvPr id="81" name="Elbow Connector 80"/>
           <p:cNvCxnSpPr>
+            <a:cxnSpLocks/>
             <a:stCxn id="78" idx="3"/>
             <a:endCxn id="80" idx="1"/>
           </p:cNvCxnSpPr>
@@ -3993,7 +3994,7 @@
         <p:spPr>
           <a:xfrm>
             <a:off x="6911814" y="3699904"/>
-            <a:ext cx="756000" cy="285783"/>
+            <a:ext cx="865280" cy="285783"/>
           </a:xfrm>
           <a:prstGeom prst="rect">
             <a:avLst/>
@@ -4044,6 +4045,7 @@
         <p:nvCxnSpPr>
           <p:cNvPr id="84" name="Elbow Connector 83"/>
           <p:cNvCxnSpPr>
+            <a:cxnSpLocks/>
             <a:stCxn id="78" idx="3"/>
             <a:endCxn id="83" idx="1"/>
           </p:cNvCxnSpPr>
@@ -4090,7 +4092,7 @@
         <p:spPr>
           <a:xfrm>
             <a:off x="6911814" y="4022881"/>
-            <a:ext cx="756000" cy="285783"/>
+            <a:ext cx="865280" cy="285783"/>
           </a:xfrm>
           <a:prstGeom prst="rect">
             <a:avLst/>
@@ -4802,6 +4804,118 @@
           </a:effectRef>
           <a:fontRef idx="minor">
             <a:schemeClr val="tx1"/>
+          </a:fontRef>
+        </p:style>
+      </p:cxnSp>
+      <p:sp>
+        <p:nvSpPr>
+          <p:cNvPr id="36" name="Rectangle 8">
+            <a:extLst>
+              <a:ext uri="{FF2B5EF4-FFF2-40B4-BE49-F238E27FC236}">
+                <a16:creationId xmlns:a16="http://schemas.microsoft.com/office/drawing/2014/main" id="{DE62164C-28D9-1445-B709-08117B1FD7B5}"/>
+              </a:ext>
+            </a:extLst>
+          </p:cNvPr>
+          <p:cNvSpPr/>
+          <p:nvPr/>
+        </p:nvSpPr>
+        <p:spPr>
+          <a:xfrm>
+            <a:off x="6911814" y="4361296"/>
+            <a:ext cx="865280" cy="285783"/>
+          </a:xfrm>
+          <a:prstGeom prst="rect">
+            <a:avLst/>
+          </a:prstGeom>
+          <a:ln w="19050">
+            <a:solidFill>
+              <a:srgbClr val="7030A0"/>
+            </a:solidFill>
+          </a:ln>
+          <a:effectLst/>
+        </p:spPr>
+        <p:style>
+          <a:lnRef idx="1">
+            <a:schemeClr val="accent4"/>
+          </a:lnRef>
+          <a:fillRef idx="2">
+            <a:schemeClr val="accent4"/>
+          </a:fillRef>
+          <a:effectRef idx="1">
+            <a:schemeClr val="accent4"/>
+          </a:effectRef>
+          <a:fontRef idx="minor">
+            <a:schemeClr val="dk1"/>
+          </a:fontRef>
+        </p:style>
+        <p:txBody>
+          <a:bodyPr rtlCol="0" anchor="ctr"/>
+          <a:lstStyle/>
+          <a:p>
+            <a:pPr algn="ctr"/>
+            <a:r>
+              <a:rPr lang="en-US" sz="1050" dirty="0">
+                <a:solidFill>
+                  <a:srgbClr val="7030A0"/>
+                </a:solidFill>
+              </a:rPr>
+              <a:t>Proficiency</a:t>
+            </a:r>
+            <a:endParaRPr lang="en-SG" sz="1050" dirty="0">
+              <a:solidFill>
+                <a:srgbClr val="7030A0"/>
+              </a:solidFill>
+            </a:endParaRPr>
+          </a:p>
+        </p:txBody>
+      </p:sp>
+      <p:cxnSp>
+        <p:nvCxnSpPr>
+          <p:cNvPr id="37" name="Elbow Connector 36">
+            <a:extLst>
+              <a:ext uri="{FF2B5EF4-FFF2-40B4-BE49-F238E27FC236}">
+                <a16:creationId xmlns:a16="http://schemas.microsoft.com/office/drawing/2014/main" id="{535655ED-83C3-D94F-8D0F-828C3A284F3A}"/>
+              </a:ext>
+            </a:extLst>
+          </p:cNvPr>
+          <p:cNvCxnSpPr>
+            <a:cxnSpLocks/>
+            <a:stCxn id="78" idx="3"/>
+            <a:endCxn id="36" idx="1"/>
+          </p:cNvCxnSpPr>
+          <p:nvPr/>
+        </p:nvCxnSpPr>
+        <p:spPr>
+          <a:xfrm>
+            <a:off x="6477412" y="3524601"/>
+            <a:ext cx="434402" cy="979587"/>
+          </a:xfrm>
+          <a:prstGeom prst="bentConnector3">
+            <a:avLst>
+              <a:gd name="adj1" fmla="val 50000"/>
+            </a:avLst>
+          </a:prstGeom>
+          <a:ln w="19050">
+            <a:solidFill>
+              <a:srgbClr val="7030A0"/>
+            </a:solidFill>
+            <a:headEnd type="none" w="med" len="med"/>
+            <a:tailEnd type="arrow" w="med" len="med"/>
+          </a:ln>
+          <a:effectLst/>
+        </p:spPr>
+        <p:style>
+          <a:lnRef idx="1">
+            <a:schemeClr val="accent2"/>
+          </a:lnRef>
+          <a:fillRef idx="2">
+            <a:schemeClr val="accent2"/>
+          </a:fillRef>
+          <a:effectRef idx="1">
+            <a:schemeClr val="accent2"/>
+          </a:effectRef>
+          <a:fontRef idx="minor">
+            <a:schemeClr val="dk1"/>
           </a:fontRef>
         </p:style>
       </p:cxnSp>

</xml_diff>